<commit_message>
Added EDA slides and report template
</commit_message>
<xml_diff>
--- a/wine_presentation.pptx
+++ b/wine_presentation.pptx
@@ -8,11 +8,11 @@
     <p:sldId id="256" r:id="rId2"/>
     <p:sldId id="257" r:id="rId3"/>
     <p:sldId id="258" r:id="rId4"/>
-    <p:sldId id="259" r:id="rId5"/>
-    <p:sldId id="260" r:id="rId6"/>
-    <p:sldId id="261" r:id="rId7"/>
-    <p:sldId id="262" r:id="rId8"/>
-    <p:sldId id="263" r:id="rId9"/>
+    <p:sldId id="264" r:id="rId5"/>
+    <p:sldId id="259" r:id="rId6"/>
+    <p:sldId id="260" r:id="rId7"/>
+    <p:sldId id="261" r:id="rId8"/>
+    <p:sldId id="262" r:id="rId9"/>
   </p:sldIdLst>
   <p:sldSz cx="12192000" cy="6858000"/>
   <p:notesSz cx="6858000" cy="9144000"/>
@@ -111,6 +111,11 @@
       </a:defRPr>
     </a:lvl9pPr>
   </p:defaultTextStyle>
+  <p:extLst>
+    <p:ext uri="{EFAFB233-063F-42B5-8137-9DF3F51BA10A}">
+      <p15:sldGuideLst xmlns:p15="http://schemas.microsoft.com/office/powerpoint/2012/main"/>
+    </p:ext>
+  </p:extLst>
 </p:presentation>
 </file>
 
@@ -371,7 +376,7 @@
           <a:p>
             <a:fld id="{3341EE12-F28E-4B03-A404-A8FCAE0F6316}" type="datetime1">
               <a:rPr lang="en-US" smtClean="0"/>
-              <a:t>4/20/23</a:t>
+              <a:t>4/22/23</a:t>
             </a:fld>
             <a:endParaRPr lang="en-US" dirty="0"/>
           </a:p>
@@ -656,7 +661,7 @@
           <a:p>
             <a:fld id="{B68B8189-0D9C-48A6-9FA3-862227B094CE}" type="datetime1">
               <a:rPr lang="en-US" smtClean="0"/>
-              <a:t>4/20/23</a:t>
+              <a:t>4/22/23</a:t>
             </a:fld>
             <a:endParaRPr lang="en-US"/>
           </a:p>
@@ -1020,7 +1025,7 @@
           <a:p>
             <a:fld id="{26ADDCAE-6443-42C3-9C19-F95985500186}" type="datetime1">
               <a:rPr lang="en-US" smtClean="0"/>
-              <a:t>4/20/23</a:t>
+              <a:t>4/22/23</a:t>
             </a:fld>
             <a:endParaRPr lang="en-US" dirty="0"/>
           </a:p>
@@ -1282,7 +1287,7 @@
           <a:p>
             <a:fld id="{1962799E-EB8E-4038-8063-81BB57C732D4}" type="datetime1">
               <a:rPr lang="en-US" smtClean="0"/>
-              <a:t>4/20/23</a:t>
+              <a:t>4/22/23</a:t>
             </a:fld>
             <a:endParaRPr lang="en-US"/>
           </a:p>
@@ -1712,7 +1717,7 @@
           <a:p>
             <a:fld id="{217A73C3-B243-44D3-809D-EF8FDFBD85D4}" type="datetime1">
               <a:rPr lang="en-US" smtClean="0"/>
-              <a:t>4/20/23</a:t>
+              <a:t>4/22/23</a:t>
             </a:fld>
             <a:endParaRPr lang="en-US" dirty="0"/>
           </a:p>
@@ -2043,7 +2048,7 @@
           <a:p>
             <a:fld id="{C9B6D3E3-28E2-4380-A113-67698215C5F8}" type="datetime1">
               <a:rPr lang="en-US" smtClean="0"/>
-              <a:t>4/20/23</a:t>
+              <a:t>4/22/23</a:t>
             </a:fld>
             <a:endParaRPr lang="en-US" dirty="0"/>
           </a:p>
@@ -2476,7 +2481,7 @@
           <a:p>
             <a:fld id="{A9EFCB61-04AD-47C9-BF79-2BD8B9CEC07A}" type="datetime1">
               <a:rPr lang="en-US" smtClean="0"/>
-              <a:t>4/20/23</a:t>
+              <a:t>4/22/23</a:t>
             </a:fld>
             <a:endParaRPr lang="en-US" dirty="0"/>
           </a:p>
@@ -2628,7 +2633,7 @@
           <a:p>
             <a:fld id="{A4535E0C-D585-492F-8146-7493F4086301}" type="datetime1">
               <a:rPr lang="en-US" smtClean="0"/>
-              <a:t>4/20/23</a:t>
+              <a:t>4/22/23</a:t>
             </a:fld>
             <a:endParaRPr lang="en-US"/>
           </a:p>
@@ -2791,7 +2796,7 @@
           <a:p>
             <a:fld id="{8CE48390-48B5-49AB-B019-A7C8FB8C31F6}" type="datetime1">
               <a:rPr lang="en-US" smtClean="0"/>
-              <a:t>4/20/23</a:t>
+              <a:t>4/22/23</a:t>
             </a:fld>
             <a:endParaRPr lang="en-US"/>
           </a:p>
@@ -3320,7 +3325,7 @@
           <a:p>
             <a:fld id="{962E767E-8A14-4E70-91B9-2101CBC4D7BD}" type="datetime1">
               <a:rPr lang="en-US" smtClean="0"/>
-              <a:t>4/20/23</a:t>
+              <a:t>4/22/23</a:t>
             </a:fld>
             <a:endParaRPr lang="en-US" dirty="0"/>
           </a:p>
@@ -3841,7 +3846,7 @@
           <a:p>
             <a:fld id="{01AF0C4B-5A4A-45CA-ABEC-10F107160D33}" type="datetime1">
               <a:rPr lang="en-US" smtClean="0"/>
-              <a:t>4/20/23</a:t>
+              <a:t>4/22/23</a:t>
             </a:fld>
             <a:endParaRPr lang="en-US" dirty="0"/>
           </a:p>
@@ -4391,7 +4396,7 @@
           <a:p>
             <a:fld id="{6989806E-8E94-473C-AEE7-BE6F15F85533}" type="datetime1">
               <a:rPr lang="en-US" smtClean="0"/>
-              <a:t>4/20/23</a:t>
+              <a:t>4/22/23</a:t>
             </a:fld>
             <a:endParaRPr lang="en-US" dirty="0"/>
           </a:p>
@@ -5125,11 +5130,36 @@
         </p:spPr>
         <p:txBody>
           <a:bodyPr anchor="ctr">
-            <a:normAutofit/>
+            <a:normAutofit fontScale="55000" lnSpcReduction="20000"/>
           </a:bodyPr>
           <a:lstStyle/>
           <a:p>
-            <a:endParaRPr lang="en-US"/>
+            <a:pPr algn="r"/>
+            <a:r>
+              <a:rPr lang="en-US" dirty="0"/>
+              <a:t>Group 1:</a:t>
+            </a:r>
+          </a:p>
+          <a:p>
+            <a:pPr algn="r"/>
+            <a:r>
+              <a:rPr lang="en-US" dirty="0"/>
+              <a:t>Ethan Chase</a:t>
+            </a:r>
+          </a:p>
+          <a:p>
+            <a:pPr algn="r"/>
+            <a:r>
+              <a:rPr lang="en-US" dirty="0"/>
+              <a:t>Matthew McClure</a:t>
+            </a:r>
+          </a:p>
+          <a:p>
+            <a:pPr algn="r"/>
+            <a:r>
+              <a:rPr lang="en-US" dirty="0"/>
+              <a:t>Payton Parrish</a:t>
+            </a:r>
           </a:p>
         </p:txBody>
       </p:sp>
@@ -5237,37 +5267,62 @@
           <a:lstStyle/>
           <a:p>
             <a:r>
-              <a:rPr lang="en-US" dirty="0"/>
-              <a:t>Joke</a:t>
-            </a:r>
-          </a:p>
-        </p:txBody>
-      </p:sp>
-      <p:sp>
-        <p:nvSpPr>
-          <p:cNvPr id="3" name="Content Placeholder 2">
-            <a:extLst>
-              <a:ext uri="{FF2B5EF4-FFF2-40B4-BE49-F238E27FC236}">
-                <a16:creationId xmlns:a16="http://schemas.microsoft.com/office/drawing/2014/main" id="{FE21ED57-0752-8370-FBC6-A92454273E77}"/>
-              </a:ext>
-            </a:extLst>
-          </p:cNvPr>
-          <p:cNvSpPr>
-            <a:spLocks noGrp="1"/>
-          </p:cNvSpPr>
+              <a:rPr lang="en-US"/>
+              <a:t>Wine Joke</a:t>
+            </a:r>
+            <a:endParaRPr lang="en-US" dirty="0"/>
+          </a:p>
+        </p:txBody>
+      </p:sp>
+      <p:pic>
+        <p:nvPicPr>
+          <p:cNvPr id="1026" name="Picture 2" descr="Wine Joke #25 | Wine jokes, Wine cartoon, Wine">
+            <a:extLst>
+              <a:ext uri="{FF2B5EF4-FFF2-40B4-BE49-F238E27FC236}">
+                <a16:creationId xmlns:a16="http://schemas.microsoft.com/office/drawing/2014/main" id="{00E1B1EA-6AB1-6ECF-2970-E727A2759DDE}"/>
+              </a:ext>
+            </a:extLst>
+          </p:cNvPr>
+          <p:cNvPicPr>
+            <a:picLocks noGrp="1" noChangeAspect="1" noChangeArrowheads="1"/>
+          </p:cNvPicPr>
           <p:nvPr>
             <p:ph idx="1"/>
           </p:nvPr>
-        </p:nvSpPr>
-        <p:spPr/>
-        <p:txBody>
-          <a:bodyPr/>
-          <a:lstStyle/>
-          <a:p>
-            <a:endParaRPr lang="en-US"/>
-          </a:p>
-        </p:txBody>
-      </p:sp>
+        </p:nvPicPr>
+        <p:blipFill>
+          <a:blip r:embed="rId2">
+            <a:extLst>
+              <a:ext uri="{28A0092B-C50C-407E-A947-70E740481C1C}">
+                <a14:useLocalDpi xmlns:a14="http://schemas.microsoft.com/office/drawing/2010/main" val="0"/>
+              </a:ext>
+            </a:extLst>
+          </a:blip>
+          <a:srcRect/>
+          <a:stretch>
+            <a:fillRect/>
+          </a:stretch>
+        </p:blipFill>
+        <p:spPr bwMode="auto">
+          <a:xfrm>
+            <a:off x="3794159" y="2749550"/>
+            <a:ext cx="4316344" cy="3262313"/>
+          </a:xfrm>
+          <a:prstGeom prst="rect">
+            <a:avLst/>
+          </a:prstGeom>
+          <a:noFill/>
+          <a:extLst>
+            <a:ext uri="{909E8E84-426E-40DD-AFC4-6F175D3DCCD1}">
+              <a14:hiddenFill xmlns:a14="http://schemas.microsoft.com/office/drawing/2010/main">
+                <a:solidFill>
+                  <a:srgbClr val="FFFFFF"/>
+                </a:solidFill>
+              </a14:hiddenFill>
+            </a:ext>
+          </a:extLst>
+        </p:spPr>
+      </p:pic>
     </p:spTree>
     <p:extLst>
       <p:ext uri="{BB962C8B-B14F-4D97-AF65-F5344CB8AC3E}">
@@ -5321,7 +5376,7 @@
           <a:p>
             <a:r>
               <a:rPr lang="en-US" dirty="0"/>
-              <a:t>EDA</a:t>
+              <a:t>White Wine EDA</a:t>
             </a:r>
           </a:p>
         </p:txBody>
@@ -5342,15 +5397,99 @@
             <p:ph idx="1"/>
           </p:nvPr>
         </p:nvSpPr>
-        <p:spPr/>
-        <p:txBody>
-          <a:bodyPr/>
-          <a:lstStyle/>
-          <a:p>
-            <a:endParaRPr lang="en-US"/>
-          </a:p>
-        </p:txBody>
-      </p:sp>
+        <p:spPr>
+          <a:xfrm>
+            <a:off x="761799" y="2750126"/>
+            <a:ext cx="5601931" cy="3261789"/>
+          </a:xfrm>
+        </p:spPr>
+        <p:txBody>
+          <a:bodyPr>
+            <a:normAutofit fontScale="92500" lnSpcReduction="10000"/>
+          </a:bodyPr>
+          <a:lstStyle/>
+          <a:p>
+            <a:pPr marL="342900" indent="-342900">
+              <a:buFontTx/>
+              <a:buChar char="-"/>
+            </a:pPr>
+            <a:r>
+              <a:rPr lang="en-US" dirty="0"/>
+              <a:t>Shape: 4898 rows, 12 columns</a:t>
+            </a:r>
+          </a:p>
+          <a:p>
+            <a:pPr marL="342900" indent="-342900">
+              <a:buFontTx/>
+              <a:buChar char="-"/>
+            </a:pPr>
+            <a:r>
+              <a:rPr lang="en-US" dirty="0"/>
+              <a:t>Quality count roughly follows normal distribution</a:t>
+            </a:r>
+          </a:p>
+          <a:p>
+            <a:pPr marL="342900" indent="-342900">
+              <a:buFontTx/>
+              <a:buChar char="-"/>
+            </a:pPr>
+            <a:r>
+              <a:rPr lang="en-US" dirty="0"/>
+              <a:t>Quality values range from 3-9</a:t>
+            </a:r>
+          </a:p>
+          <a:p>
+            <a:pPr marL="342900" indent="-342900">
+              <a:buFontTx/>
+              <a:buChar char="-"/>
+            </a:pPr>
+            <a:r>
+              <a:rPr lang="en-US" dirty="0"/>
+              <a:t>Strong positive correlation between residual sugar and density</a:t>
+            </a:r>
+          </a:p>
+          <a:p>
+            <a:pPr marL="342900" indent="-342900">
+              <a:buFontTx/>
+              <a:buChar char="-"/>
+            </a:pPr>
+            <a:r>
+              <a:rPr lang="en-US" dirty="0"/>
+              <a:t>Strong negative correlation between alcohol and density</a:t>
+            </a:r>
+          </a:p>
+        </p:txBody>
+      </p:sp>
+      <p:pic>
+        <p:nvPicPr>
+          <p:cNvPr id="7" name="Picture 6">
+            <a:extLst>
+              <a:ext uri="{FF2B5EF4-FFF2-40B4-BE49-F238E27FC236}">
+                <a16:creationId xmlns:a16="http://schemas.microsoft.com/office/drawing/2014/main" id="{DEBED294-A9FF-37E5-D501-0D52424EF4AC}"/>
+              </a:ext>
+            </a:extLst>
+          </p:cNvPr>
+          <p:cNvPicPr>
+            <a:picLocks noChangeAspect="1"/>
+          </p:cNvPicPr>
+          <p:nvPr/>
+        </p:nvPicPr>
+        <p:blipFill>
+          <a:blip r:embed="rId2"/>
+          <a:stretch>
+            <a:fillRect/>
+          </a:stretch>
+        </p:blipFill>
+        <p:spPr>
+          <a:xfrm>
+            <a:off x="6843671" y="2669983"/>
+            <a:ext cx="4586530" cy="3422074"/>
+          </a:xfrm>
+          <a:prstGeom prst="rect">
+            <a:avLst/>
+          </a:prstGeom>
+        </p:spPr>
+      </p:pic>
     </p:spTree>
     <p:extLst>
       <p:ext uri="{BB962C8B-B14F-4D97-AF65-F5344CB8AC3E}">
@@ -5386,7 +5525,7 @@
           <p:cNvPr id="2" name="Title 1">
             <a:extLst>
               <a:ext uri="{FF2B5EF4-FFF2-40B4-BE49-F238E27FC236}">
-                <a16:creationId xmlns:a16="http://schemas.microsoft.com/office/drawing/2014/main" id="{2BB72172-B774-152E-C59C-6F3041583449}"/>
+                <a16:creationId xmlns:a16="http://schemas.microsoft.com/office/drawing/2014/main" id="{76A4C560-5189-FF16-5BF8-7572E9861807}"/>
               </a:ext>
             </a:extLst>
           </p:cNvPr>
@@ -5404,7 +5543,7 @@
           <a:p>
             <a:r>
               <a:rPr lang="en-US" dirty="0"/>
-              <a:t>Regression</a:t>
+              <a:t>Red Wine EDA</a:t>
             </a:r>
           </a:p>
         </p:txBody>
@@ -5414,7 +5553,7 @@
           <p:cNvPr id="3" name="Content Placeholder 2">
             <a:extLst>
               <a:ext uri="{FF2B5EF4-FFF2-40B4-BE49-F238E27FC236}">
-                <a16:creationId xmlns:a16="http://schemas.microsoft.com/office/drawing/2014/main" id="{694A5C5B-2A6B-273E-A882-009625E9BC43}"/>
+                <a16:creationId xmlns:a16="http://schemas.microsoft.com/office/drawing/2014/main" id="{C8A114E7-08FB-839E-E298-C4DE7AC6F99C}"/>
               </a:ext>
             </a:extLst>
           </p:cNvPr>
@@ -5425,19 +5564,93 @@
             <p:ph idx="1"/>
           </p:nvPr>
         </p:nvSpPr>
-        <p:spPr/>
-        <p:txBody>
-          <a:bodyPr/>
-          <a:lstStyle/>
-          <a:p>
-            <a:endParaRPr lang="en-US"/>
-          </a:p>
-        </p:txBody>
-      </p:sp>
+        <p:spPr>
+          <a:xfrm>
+            <a:off x="761799" y="2750126"/>
+            <a:ext cx="5601931" cy="3261789"/>
+          </a:xfrm>
+        </p:spPr>
+        <p:txBody>
+          <a:bodyPr>
+            <a:normAutofit/>
+          </a:bodyPr>
+          <a:lstStyle/>
+          <a:p>
+            <a:pPr marL="342900" indent="-342900">
+              <a:buFontTx/>
+              <a:buChar char="-"/>
+            </a:pPr>
+            <a:r>
+              <a:rPr lang="en-US" dirty="0"/>
+              <a:t>Shape: 1599 rows, 12 columns</a:t>
+            </a:r>
+          </a:p>
+          <a:p>
+            <a:pPr marL="342900" indent="-342900">
+              <a:buFontTx/>
+              <a:buChar char="-"/>
+            </a:pPr>
+            <a:r>
+              <a:rPr lang="en-US" dirty="0"/>
+              <a:t>Quality count roughly follows normal distribution, but not as well as White Wine</a:t>
+            </a:r>
+          </a:p>
+          <a:p>
+            <a:pPr marL="342900" indent="-342900">
+              <a:buFontTx/>
+              <a:buChar char="-"/>
+            </a:pPr>
+            <a:r>
+              <a:rPr lang="en-US" dirty="0"/>
+              <a:t>Quality values range from 3-8</a:t>
+            </a:r>
+          </a:p>
+          <a:p>
+            <a:pPr marL="342900" indent="-342900">
+              <a:buFontTx/>
+              <a:buChar char="-"/>
+            </a:pPr>
+            <a:r>
+              <a:rPr lang="en-US" dirty="0"/>
+              <a:t>No strong correlations &gt;= |0.7|</a:t>
+            </a:r>
+          </a:p>
+        </p:txBody>
+      </p:sp>
+      <p:pic>
+        <p:nvPicPr>
+          <p:cNvPr id="4" name="Picture 3">
+            <a:extLst>
+              <a:ext uri="{FF2B5EF4-FFF2-40B4-BE49-F238E27FC236}">
+                <a16:creationId xmlns:a16="http://schemas.microsoft.com/office/drawing/2014/main" id="{917504D7-B5B4-17B9-177E-29D1560C51B0}"/>
+              </a:ext>
+            </a:extLst>
+          </p:cNvPr>
+          <p:cNvPicPr>
+            <a:picLocks noChangeAspect="1"/>
+          </p:cNvPicPr>
+          <p:nvPr/>
+        </p:nvPicPr>
+        <p:blipFill>
+          <a:blip r:embed="rId2"/>
+          <a:stretch>
+            <a:fillRect/>
+          </a:stretch>
+        </p:blipFill>
+        <p:spPr>
+          <a:xfrm>
+            <a:off x="7006281" y="2750126"/>
+            <a:ext cx="4556038" cy="3447161"/>
+          </a:xfrm>
+          <a:prstGeom prst="rect">
+            <a:avLst/>
+          </a:prstGeom>
+        </p:spPr>
+      </p:pic>
     </p:spTree>
     <p:extLst>
       <p:ext uri="{BB962C8B-B14F-4D97-AF65-F5344CB8AC3E}">
-        <p14:creationId xmlns:p14="http://schemas.microsoft.com/office/powerpoint/2010/main" val="3684920532"/>
+        <p14:creationId xmlns:p14="http://schemas.microsoft.com/office/powerpoint/2010/main" val="362244503"/>
       </p:ext>
     </p:extLst>
   </p:cSld>
@@ -5469,7 +5682,7 @@
           <p:cNvPr id="2" name="Title 1">
             <a:extLst>
               <a:ext uri="{FF2B5EF4-FFF2-40B4-BE49-F238E27FC236}">
-                <a16:creationId xmlns:a16="http://schemas.microsoft.com/office/drawing/2014/main" id="{458E2A23-4EC0-DD48-D58B-C597B2314E7A}"/>
+                <a16:creationId xmlns:a16="http://schemas.microsoft.com/office/drawing/2014/main" id="{2BB72172-B774-152E-C59C-6F3041583449}"/>
               </a:ext>
             </a:extLst>
           </p:cNvPr>
@@ -5487,7 +5700,7 @@
           <a:p>
             <a:r>
               <a:rPr lang="en-US" dirty="0"/>
-              <a:t>Classification</a:t>
+              <a:t>Regression</a:t>
             </a:r>
           </a:p>
         </p:txBody>
@@ -5497,7 +5710,7 @@
           <p:cNvPr id="3" name="Content Placeholder 2">
             <a:extLst>
               <a:ext uri="{FF2B5EF4-FFF2-40B4-BE49-F238E27FC236}">
-                <a16:creationId xmlns:a16="http://schemas.microsoft.com/office/drawing/2014/main" id="{CB91CDDE-6488-E61C-873F-C2946E979507}"/>
+                <a16:creationId xmlns:a16="http://schemas.microsoft.com/office/drawing/2014/main" id="{694A5C5B-2A6B-273E-A882-009625E9BC43}"/>
               </a:ext>
             </a:extLst>
           </p:cNvPr>
@@ -5520,7 +5733,7 @@
     </p:spTree>
     <p:extLst>
       <p:ext uri="{BB962C8B-B14F-4D97-AF65-F5344CB8AC3E}">
-        <p14:creationId xmlns:p14="http://schemas.microsoft.com/office/powerpoint/2010/main" val="2625553828"/>
+        <p14:creationId xmlns:p14="http://schemas.microsoft.com/office/powerpoint/2010/main" val="3684920532"/>
       </p:ext>
     </p:extLst>
   </p:cSld>
@@ -5552,7 +5765,7 @@
           <p:cNvPr id="2" name="Title 1">
             <a:extLst>
               <a:ext uri="{FF2B5EF4-FFF2-40B4-BE49-F238E27FC236}">
-                <a16:creationId xmlns:a16="http://schemas.microsoft.com/office/drawing/2014/main" id="{93A61788-529C-EFC1-BCAC-7334FE1E783F}"/>
+                <a16:creationId xmlns:a16="http://schemas.microsoft.com/office/drawing/2014/main" id="{458E2A23-4EC0-DD48-D58B-C597B2314E7A}"/>
               </a:ext>
             </a:extLst>
           </p:cNvPr>
@@ -5570,7 +5783,7 @@
           <a:p>
             <a:r>
               <a:rPr lang="en-US" dirty="0"/>
-              <a:t>Comparison</a:t>
+              <a:t>Classification</a:t>
             </a:r>
           </a:p>
         </p:txBody>
@@ -5580,7 +5793,7 @@
           <p:cNvPr id="3" name="Content Placeholder 2">
             <a:extLst>
               <a:ext uri="{FF2B5EF4-FFF2-40B4-BE49-F238E27FC236}">
-                <a16:creationId xmlns:a16="http://schemas.microsoft.com/office/drawing/2014/main" id="{C17DBF7A-6F8E-1914-4278-74227E17BB5E}"/>
+                <a16:creationId xmlns:a16="http://schemas.microsoft.com/office/drawing/2014/main" id="{CB91CDDE-6488-E61C-873F-C2946E979507}"/>
               </a:ext>
             </a:extLst>
           </p:cNvPr>
@@ -5603,7 +5816,7 @@
     </p:spTree>
     <p:extLst>
       <p:ext uri="{BB962C8B-B14F-4D97-AF65-F5344CB8AC3E}">
-        <p14:creationId xmlns:p14="http://schemas.microsoft.com/office/powerpoint/2010/main" val="3966302403"/>
+        <p14:creationId xmlns:p14="http://schemas.microsoft.com/office/powerpoint/2010/main" val="2625553828"/>
       </p:ext>
     </p:extLst>
   </p:cSld>
@@ -5635,7 +5848,7 @@
           <p:cNvPr id="2" name="Title 1">
             <a:extLst>
               <a:ext uri="{FF2B5EF4-FFF2-40B4-BE49-F238E27FC236}">
-                <a16:creationId xmlns:a16="http://schemas.microsoft.com/office/drawing/2014/main" id="{E6A24E04-8590-F04C-DDF9-517A2900459A}"/>
+                <a16:creationId xmlns:a16="http://schemas.microsoft.com/office/drawing/2014/main" id="{93A61788-529C-EFC1-BCAC-7334FE1E783F}"/>
               </a:ext>
             </a:extLst>
           </p:cNvPr>
@@ -5653,7 +5866,7 @@
           <a:p>
             <a:r>
               <a:rPr lang="en-US" dirty="0"/>
-              <a:t>Conclusion</a:t>
+              <a:t>Comparison</a:t>
             </a:r>
           </a:p>
         </p:txBody>
@@ -5663,7 +5876,7 @@
           <p:cNvPr id="3" name="Content Placeholder 2">
             <a:extLst>
               <a:ext uri="{FF2B5EF4-FFF2-40B4-BE49-F238E27FC236}">
-                <a16:creationId xmlns:a16="http://schemas.microsoft.com/office/drawing/2014/main" id="{0EDB5184-4431-E9A8-3E13-355720B096CF}"/>
+                <a16:creationId xmlns:a16="http://schemas.microsoft.com/office/drawing/2014/main" id="{C17DBF7A-6F8E-1914-4278-74227E17BB5E}"/>
               </a:ext>
             </a:extLst>
           </p:cNvPr>
@@ -5686,7 +5899,7 @@
     </p:spTree>
     <p:extLst>
       <p:ext uri="{BB962C8B-B14F-4D97-AF65-F5344CB8AC3E}">
-        <p14:creationId xmlns:p14="http://schemas.microsoft.com/office/powerpoint/2010/main" val="970218582"/>
+        <p14:creationId xmlns:p14="http://schemas.microsoft.com/office/powerpoint/2010/main" val="3966302403"/>
       </p:ext>
     </p:extLst>
   </p:cSld>
@@ -5718,7 +5931,7 @@
           <p:cNvPr id="2" name="Title 1">
             <a:extLst>
               <a:ext uri="{FF2B5EF4-FFF2-40B4-BE49-F238E27FC236}">
-                <a16:creationId xmlns:a16="http://schemas.microsoft.com/office/drawing/2014/main" id="{EE6FBFD7-A27C-81FA-59F6-112B6940526B}"/>
+                <a16:creationId xmlns:a16="http://schemas.microsoft.com/office/drawing/2014/main" id="{E6A24E04-8590-F04C-DDF9-517A2900459A}"/>
               </a:ext>
             </a:extLst>
           </p:cNvPr>
@@ -5731,14 +5944,12 @@
         </p:nvSpPr>
         <p:spPr/>
         <p:txBody>
-          <a:bodyPr>
-            <a:normAutofit fontScale="90000"/>
-          </a:bodyPr>
+          <a:bodyPr/>
           <a:lstStyle/>
           <a:p>
             <a:r>
               <a:rPr lang="en-US" dirty="0"/>
-              <a:t>Things we considered but were actually useless</a:t>
+              <a:t>Conclusion</a:t>
             </a:r>
           </a:p>
         </p:txBody>
@@ -5748,7 +5959,7 @@
           <p:cNvPr id="3" name="Content Placeholder 2">
             <a:extLst>
               <a:ext uri="{FF2B5EF4-FFF2-40B4-BE49-F238E27FC236}">
-                <a16:creationId xmlns:a16="http://schemas.microsoft.com/office/drawing/2014/main" id="{D0693C2B-EEB4-55C4-C1F6-B4265D7D2A86}"/>
+                <a16:creationId xmlns:a16="http://schemas.microsoft.com/office/drawing/2014/main" id="{0EDB5184-4431-E9A8-3E13-355720B096CF}"/>
               </a:ext>
             </a:extLst>
           </p:cNvPr>
@@ -5771,7 +5982,7 @@
     </p:spTree>
     <p:extLst>
       <p:ext uri="{BB962C8B-B14F-4D97-AF65-F5344CB8AC3E}">
-        <p14:creationId xmlns:p14="http://schemas.microsoft.com/office/powerpoint/2010/main" val="183335478"/>
+        <p14:creationId xmlns:p14="http://schemas.microsoft.com/office/powerpoint/2010/main" val="970218582"/>
       </p:ext>
     </p:extLst>
   </p:cSld>

</xml_diff>

<commit_message>
Added regression slides to powerpoint
</commit_message>
<xml_diff>
--- a/wine_presentation.pptx
+++ b/wine_presentation.pptx
@@ -10,9 +10,11 @@
     <p:sldId id="258" r:id="rId4"/>
     <p:sldId id="264" r:id="rId5"/>
     <p:sldId id="259" r:id="rId6"/>
-    <p:sldId id="260" r:id="rId7"/>
-    <p:sldId id="261" r:id="rId8"/>
-    <p:sldId id="262" r:id="rId9"/>
+    <p:sldId id="265" r:id="rId7"/>
+    <p:sldId id="266" r:id="rId8"/>
+    <p:sldId id="260" r:id="rId9"/>
+    <p:sldId id="261" r:id="rId10"/>
+    <p:sldId id="262" r:id="rId11"/>
   </p:sldIdLst>
   <p:sldSz cx="12192000" cy="6858000"/>
   <p:notesSz cx="6858000" cy="9144000"/>
@@ -119,6 +121,1734 @@
 </p:presentation>
 </file>
 
+<file path=ppt/charts/chart1.xml><?xml version="1.0" encoding="utf-8"?>
+<c:chartSpace xmlns:c="http://schemas.openxmlformats.org/drawingml/2006/chart" xmlns:a="http://schemas.openxmlformats.org/drawingml/2006/main" xmlns:r="http://schemas.openxmlformats.org/officeDocument/2006/relationships" xmlns:c16r2="http://schemas.microsoft.com/office/drawing/2015/06/chart">
+  <c:date1904 val="0"/>
+  <c:lang val="en-US"/>
+  <c:roundedCorners val="0"/>
+  <mc:AlternateContent xmlns:mc="http://schemas.openxmlformats.org/markup-compatibility/2006">
+    <mc:Choice xmlns:c14="http://schemas.microsoft.com/office/drawing/2007/8/2/chart" Requires="c14">
+      <c14:style val="102"/>
+    </mc:Choice>
+    <mc:Fallback>
+      <c:style val="2"/>
+    </mc:Fallback>
+  </mc:AlternateContent>
+  <c:chart>
+    <c:title>
+      <c:tx>
+        <c:rich>
+          <a:bodyPr rot="0" spcFirstLastPara="1" vertOverflow="ellipsis" vert="horz" wrap="square" anchor="ctr" anchorCtr="1"/>
+          <a:lstStyle/>
+          <a:p>
+            <a:pPr>
+              <a:defRPr sz="1400" b="0" i="0" u="none" strike="noStrike" kern="1200" spc="0" baseline="0">
+                <a:solidFill>
+                  <a:schemeClr val="tx1">
+                    <a:lumMod val="65000"/>
+                    <a:lumOff val="35000"/>
+                  </a:schemeClr>
+                </a:solidFill>
+                <a:latin typeface="+mn-lt"/>
+                <a:ea typeface="+mn-ea"/>
+                <a:cs typeface="+mn-cs"/>
+              </a:defRPr>
+            </a:pPr>
+            <a:r>
+              <a:rPr lang="en-US"/>
+              <a:t>White Wine Predictions</a:t>
+            </a:r>
+          </a:p>
+        </c:rich>
+      </c:tx>
+      <c:layout>
+        <c:manualLayout>
+          <c:xMode val="edge"/>
+          <c:yMode val="edge"/>
+          <c:x val="0.16706882714040908"/>
+          <c:y val="5.5555555555555552E-2"/>
+        </c:manualLayout>
+      </c:layout>
+      <c:overlay val="0"/>
+      <c:spPr>
+        <a:noFill/>
+        <a:ln>
+          <a:noFill/>
+        </a:ln>
+        <a:effectLst/>
+      </c:spPr>
+      <c:txPr>
+        <a:bodyPr rot="0" spcFirstLastPara="1" vertOverflow="ellipsis" vert="horz" wrap="square" anchor="ctr" anchorCtr="1"/>
+        <a:lstStyle/>
+        <a:p>
+          <a:pPr>
+            <a:defRPr sz="1400" b="0" i="0" u="none" strike="noStrike" kern="1200" spc="0" baseline="0">
+              <a:solidFill>
+                <a:schemeClr val="tx1">
+                  <a:lumMod val="65000"/>
+                  <a:lumOff val="35000"/>
+                </a:schemeClr>
+              </a:solidFill>
+              <a:latin typeface="+mn-lt"/>
+              <a:ea typeface="+mn-ea"/>
+              <a:cs typeface="+mn-cs"/>
+            </a:defRPr>
+          </a:pPr>
+          <a:endParaRPr lang="en-US"/>
+        </a:p>
+      </c:txPr>
+    </c:title>
+    <c:autoTitleDeleted val="0"/>
+    <c:plotArea>
+      <c:layout/>
+      <c:pieChart>
+        <c:varyColors val="1"/>
+        <c:ser>
+          <c:idx val="0"/>
+          <c:order val="0"/>
+          <c:dPt>
+            <c:idx val="0"/>
+            <c:bubble3D val="0"/>
+            <c:spPr>
+              <a:solidFill>
+                <a:schemeClr val="accent1"/>
+              </a:solidFill>
+              <a:ln w="19050">
+                <a:solidFill>
+                  <a:schemeClr val="lt1"/>
+                </a:solidFill>
+              </a:ln>
+              <a:effectLst/>
+            </c:spPr>
+            <c:extLst>
+              <c:ext xmlns:c16="http://schemas.microsoft.com/office/drawing/2014/chart" uri="{C3380CC4-5D6E-409C-BE32-E72D297353CC}">
+                <c16:uniqueId val="{00000001-4177-4632-8CB6-49B680BC6583}"/>
+              </c:ext>
+            </c:extLst>
+          </c:dPt>
+          <c:dPt>
+            <c:idx val="1"/>
+            <c:bubble3D val="0"/>
+            <c:spPr>
+              <a:solidFill>
+                <a:schemeClr val="accent3"/>
+              </a:solidFill>
+              <a:ln w="19050">
+                <a:solidFill>
+                  <a:schemeClr val="lt1"/>
+                </a:solidFill>
+              </a:ln>
+              <a:effectLst/>
+            </c:spPr>
+            <c:extLst>
+              <c:ext xmlns:c16="http://schemas.microsoft.com/office/drawing/2014/chart" uri="{C3380CC4-5D6E-409C-BE32-E72D297353CC}">
+                <c16:uniqueId val="{00000003-4177-4632-8CB6-49B680BC6583}"/>
+              </c:ext>
+            </c:extLst>
+          </c:dPt>
+          <c:dPt>
+            <c:idx val="2"/>
+            <c:bubble3D val="0"/>
+            <c:spPr>
+              <a:solidFill>
+                <a:schemeClr val="accent5"/>
+              </a:solidFill>
+              <a:ln w="19050">
+                <a:solidFill>
+                  <a:schemeClr val="lt1"/>
+                </a:solidFill>
+              </a:ln>
+              <a:effectLst/>
+            </c:spPr>
+            <c:extLst>
+              <c:ext xmlns:c16="http://schemas.microsoft.com/office/drawing/2014/chart" uri="{C3380CC4-5D6E-409C-BE32-E72D297353CC}">
+                <c16:uniqueId val="{00000005-4177-4632-8CB6-49B680BC6583}"/>
+              </c:ext>
+            </c:extLst>
+          </c:dPt>
+          <c:dPt>
+            <c:idx val="3"/>
+            <c:bubble3D val="0"/>
+            <c:spPr>
+              <a:solidFill>
+                <a:schemeClr val="accent1">
+                  <a:lumMod val="60000"/>
+                </a:schemeClr>
+              </a:solidFill>
+              <a:ln w="19050">
+                <a:solidFill>
+                  <a:schemeClr val="lt1"/>
+                </a:solidFill>
+              </a:ln>
+              <a:effectLst/>
+            </c:spPr>
+            <c:extLst>
+              <c:ext xmlns:c16="http://schemas.microsoft.com/office/drawing/2014/chart" uri="{C3380CC4-5D6E-409C-BE32-E72D297353CC}">
+                <c16:uniqueId val="{00000007-4177-4632-8CB6-49B680BC6583}"/>
+              </c:ext>
+            </c:extLst>
+          </c:dPt>
+          <c:cat>
+            <c:strRef>
+              <c:f>Sheet1!$B$15:$B$18</c:f>
+              <c:strCache>
+                <c:ptCount val="4"/>
+                <c:pt idx="0">
+                  <c:v>Correct</c:v>
+                </c:pt>
+                <c:pt idx="1">
+                  <c:v>Off by 1</c:v>
+                </c:pt>
+                <c:pt idx="2">
+                  <c:v>Off by 2</c:v>
+                </c:pt>
+                <c:pt idx="3">
+                  <c:v>Off by 3</c:v>
+                </c:pt>
+              </c:strCache>
+            </c:strRef>
+          </c:cat>
+          <c:val>
+            <c:numRef>
+              <c:f>Sheet1!$G$15:$G$18</c:f>
+              <c:numCache>
+                <c:formatCode>General</c:formatCode>
+                <c:ptCount val="4"/>
+                <c:pt idx="0">
+                  <c:v>640</c:v>
+                </c:pt>
+                <c:pt idx="1">
+                  <c:v>524</c:v>
+                </c:pt>
+                <c:pt idx="2">
+                  <c:v>57</c:v>
+                </c:pt>
+                <c:pt idx="3">
+                  <c:v>4</c:v>
+                </c:pt>
+              </c:numCache>
+            </c:numRef>
+          </c:val>
+          <c:extLst>
+            <c:ext xmlns:c16="http://schemas.microsoft.com/office/drawing/2014/chart" uri="{C3380CC4-5D6E-409C-BE32-E72D297353CC}">
+              <c16:uniqueId val="{00000008-4177-4632-8CB6-49B680BC6583}"/>
+            </c:ext>
+          </c:extLst>
+        </c:ser>
+        <c:dLbls>
+          <c:showLegendKey val="0"/>
+          <c:showVal val="0"/>
+          <c:showCatName val="0"/>
+          <c:showSerName val="0"/>
+          <c:showPercent val="0"/>
+          <c:showBubbleSize val="0"/>
+          <c:showLeaderLines val="1"/>
+        </c:dLbls>
+        <c:firstSliceAng val="0"/>
+      </c:pieChart>
+      <c:spPr>
+        <a:noFill/>
+        <a:ln>
+          <a:noFill/>
+        </a:ln>
+        <a:effectLst/>
+      </c:spPr>
+    </c:plotArea>
+    <c:legend>
+      <c:legendPos val="r"/>
+      <c:layout>
+        <c:manualLayout>
+          <c:xMode val="edge"/>
+          <c:yMode val="edge"/>
+          <c:x val="0.70135485130474395"/>
+          <c:y val="0.22318059200933216"/>
+          <c:w val="0.2435487299624737"/>
+          <c:h val="0.42442548848060657"/>
+        </c:manualLayout>
+      </c:layout>
+      <c:overlay val="0"/>
+      <c:spPr>
+        <a:noFill/>
+        <a:ln>
+          <a:noFill/>
+        </a:ln>
+        <a:effectLst/>
+      </c:spPr>
+      <c:txPr>
+        <a:bodyPr rot="0" spcFirstLastPara="1" vertOverflow="ellipsis" vert="horz" wrap="square" anchor="ctr" anchorCtr="1"/>
+        <a:lstStyle/>
+        <a:p>
+          <a:pPr>
+            <a:defRPr sz="1400" b="0" i="0" u="none" strike="noStrike" kern="1200" baseline="0">
+              <a:solidFill>
+                <a:schemeClr val="tx1">
+                  <a:lumMod val="65000"/>
+                  <a:lumOff val="35000"/>
+                </a:schemeClr>
+              </a:solidFill>
+              <a:latin typeface="+mn-lt"/>
+              <a:ea typeface="+mn-ea"/>
+              <a:cs typeface="+mn-cs"/>
+            </a:defRPr>
+          </a:pPr>
+          <a:endParaRPr lang="en-US"/>
+        </a:p>
+      </c:txPr>
+    </c:legend>
+    <c:plotVisOnly val="1"/>
+    <c:dispBlanksAs val="gap"/>
+    <c:extLst>
+      <c:ext xmlns:c16r3="http://schemas.microsoft.com/office/drawing/2017/03/chart" uri="{56B9EC1D-385E-4148-901F-78D8002777C0}">
+        <c16r3:dataDisplayOptions16>
+          <c16r3:dispNaAsBlank val="1"/>
+        </c16r3:dataDisplayOptions16>
+      </c:ext>
+    </c:extLst>
+    <c:showDLblsOverMax val="0"/>
+  </c:chart>
+  <c:spPr>
+    <a:noFill/>
+    <a:ln>
+      <a:noFill/>
+    </a:ln>
+    <a:effectLst/>
+  </c:spPr>
+  <c:txPr>
+    <a:bodyPr/>
+    <a:lstStyle/>
+    <a:p>
+      <a:pPr>
+        <a:defRPr/>
+      </a:pPr>
+      <a:endParaRPr lang="en-US"/>
+    </a:p>
+  </c:txPr>
+  <c:externalData r:id="rId3">
+    <c:autoUpdate val="0"/>
+  </c:externalData>
+</c:chartSpace>
+</file>
+
+<file path=ppt/charts/chart2.xml><?xml version="1.0" encoding="utf-8"?>
+<c:chartSpace xmlns:c="http://schemas.openxmlformats.org/drawingml/2006/chart" xmlns:a="http://schemas.openxmlformats.org/drawingml/2006/main" xmlns:r="http://schemas.openxmlformats.org/officeDocument/2006/relationships" xmlns:c16r2="http://schemas.microsoft.com/office/drawing/2015/06/chart">
+  <c:date1904 val="0"/>
+  <c:lang val="en-US"/>
+  <c:roundedCorners val="0"/>
+  <mc:AlternateContent xmlns:mc="http://schemas.openxmlformats.org/markup-compatibility/2006">
+    <mc:Choice xmlns:c14="http://schemas.microsoft.com/office/drawing/2007/8/2/chart" Requires="c14">
+      <c14:style val="102"/>
+    </mc:Choice>
+    <mc:Fallback>
+      <c:style val="2"/>
+    </mc:Fallback>
+  </mc:AlternateContent>
+  <c:chart>
+    <c:title>
+      <c:tx>
+        <c:rich>
+          <a:bodyPr rot="0" spcFirstLastPara="1" vertOverflow="ellipsis" vert="horz" wrap="square" anchor="ctr" anchorCtr="1"/>
+          <a:lstStyle/>
+          <a:p>
+            <a:pPr>
+              <a:defRPr sz="1400" b="0" i="0" u="none" strike="noStrike" kern="1200" spc="0" baseline="0">
+                <a:solidFill>
+                  <a:schemeClr val="tx1">
+                    <a:lumMod val="65000"/>
+                    <a:lumOff val="35000"/>
+                  </a:schemeClr>
+                </a:solidFill>
+                <a:latin typeface="+mn-lt"/>
+                <a:ea typeface="+mn-ea"/>
+                <a:cs typeface="+mn-cs"/>
+              </a:defRPr>
+            </a:pPr>
+            <a:r>
+              <a:rPr lang="en-US"/>
+              <a:t>Red Wine Predictions</a:t>
+            </a:r>
+          </a:p>
+        </c:rich>
+      </c:tx>
+      <c:layout>
+        <c:manualLayout>
+          <c:xMode val="edge"/>
+          <c:yMode val="edge"/>
+          <c:x val="0.16706882714040908"/>
+          <c:y val="5.5555555555555552E-2"/>
+        </c:manualLayout>
+      </c:layout>
+      <c:overlay val="0"/>
+      <c:spPr>
+        <a:noFill/>
+        <a:ln>
+          <a:noFill/>
+        </a:ln>
+        <a:effectLst/>
+      </c:spPr>
+      <c:txPr>
+        <a:bodyPr rot="0" spcFirstLastPara="1" vertOverflow="ellipsis" vert="horz" wrap="square" anchor="ctr" anchorCtr="1"/>
+        <a:lstStyle/>
+        <a:p>
+          <a:pPr>
+            <a:defRPr sz="1400" b="0" i="0" u="none" strike="noStrike" kern="1200" spc="0" baseline="0">
+              <a:solidFill>
+                <a:schemeClr val="tx1">
+                  <a:lumMod val="65000"/>
+                  <a:lumOff val="35000"/>
+                </a:schemeClr>
+              </a:solidFill>
+              <a:latin typeface="+mn-lt"/>
+              <a:ea typeface="+mn-ea"/>
+              <a:cs typeface="+mn-cs"/>
+            </a:defRPr>
+          </a:pPr>
+          <a:endParaRPr lang="en-US"/>
+        </a:p>
+      </c:txPr>
+    </c:title>
+    <c:autoTitleDeleted val="0"/>
+    <c:plotArea>
+      <c:layout/>
+      <c:pieChart>
+        <c:varyColors val="1"/>
+        <c:ser>
+          <c:idx val="0"/>
+          <c:order val="0"/>
+          <c:dPt>
+            <c:idx val="0"/>
+            <c:bubble3D val="0"/>
+            <c:spPr>
+              <a:solidFill>
+                <a:schemeClr val="accent1"/>
+              </a:solidFill>
+              <a:ln w="19050">
+                <a:solidFill>
+                  <a:schemeClr val="lt1"/>
+                </a:solidFill>
+              </a:ln>
+              <a:effectLst/>
+            </c:spPr>
+            <c:extLst>
+              <c:ext xmlns:c16="http://schemas.microsoft.com/office/drawing/2014/chart" uri="{C3380CC4-5D6E-409C-BE32-E72D297353CC}">
+                <c16:uniqueId val="{00000001-7082-4277-B8F6-64245E896F9D}"/>
+              </c:ext>
+            </c:extLst>
+          </c:dPt>
+          <c:dPt>
+            <c:idx val="1"/>
+            <c:bubble3D val="0"/>
+            <c:spPr>
+              <a:solidFill>
+                <a:schemeClr val="accent3"/>
+              </a:solidFill>
+              <a:ln w="19050">
+                <a:solidFill>
+                  <a:schemeClr val="lt1"/>
+                </a:solidFill>
+              </a:ln>
+              <a:effectLst/>
+            </c:spPr>
+            <c:extLst>
+              <c:ext xmlns:c16="http://schemas.microsoft.com/office/drawing/2014/chart" uri="{C3380CC4-5D6E-409C-BE32-E72D297353CC}">
+                <c16:uniqueId val="{00000003-7082-4277-B8F6-64245E896F9D}"/>
+              </c:ext>
+            </c:extLst>
+          </c:dPt>
+          <c:dPt>
+            <c:idx val="2"/>
+            <c:bubble3D val="0"/>
+            <c:spPr>
+              <a:solidFill>
+                <a:schemeClr val="accent5"/>
+              </a:solidFill>
+              <a:ln w="19050">
+                <a:solidFill>
+                  <a:schemeClr val="lt1"/>
+                </a:solidFill>
+              </a:ln>
+              <a:effectLst/>
+            </c:spPr>
+            <c:extLst>
+              <c:ext xmlns:c16="http://schemas.microsoft.com/office/drawing/2014/chart" uri="{C3380CC4-5D6E-409C-BE32-E72D297353CC}">
+                <c16:uniqueId val="{00000005-7082-4277-B8F6-64245E896F9D}"/>
+              </c:ext>
+            </c:extLst>
+          </c:dPt>
+          <c:dPt>
+            <c:idx val="3"/>
+            <c:bubble3D val="0"/>
+            <c:spPr>
+              <a:solidFill>
+                <a:schemeClr val="accent1">
+                  <a:lumMod val="60000"/>
+                </a:schemeClr>
+              </a:solidFill>
+              <a:ln w="19050">
+                <a:solidFill>
+                  <a:schemeClr val="lt1"/>
+                </a:solidFill>
+              </a:ln>
+              <a:effectLst/>
+            </c:spPr>
+            <c:extLst>
+              <c:ext xmlns:c16="http://schemas.microsoft.com/office/drawing/2014/chart" uri="{C3380CC4-5D6E-409C-BE32-E72D297353CC}">
+                <c16:uniqueId val="{00000007-7082-4277-B8F6-64245E896F9D}"/>
+              </c:ext>
+            </c:extLst>
+          </c:dPt>
+          <c:cat>
+            <c:strRef>
+              <c:f>Sheet1!$B$15:$B$18</c:f>
+              <c:strCache>
+                <c:ptCount val="4"/>
+                <c:pt idx="0">
+                  <c:v>Correct</c:v>
+                </c:pt>
+                <c:pt idx="1">
+                  <c:v>Off by 1</c:v>
+                </c:pt>
+                <c:pt idx="2">
+                  <c:v>Off by 2</c:v>
+                </c:pt>
+                <c:pt idx="3">
+                  <c:v>Off by 3</c:v>
+                </c:pt>
+              </c:strCache>
+            </c:strRef>
+          </c:cat>
+          <c:val>
+            <c:numRef>
+              <c:f>Sheet1!$C$15:$C$18</c:f>
+              <c:numCache>
+                <c:formatCode>General</c:formatCode>
+                <c:ptCount val="4"/>
+                <c:pt idx="0">
+                  <c:v>247</c:v>
+                </c:pt>
+                <c:pt idx="1">
+                  <c:v>143</c:v>
+                </c:pt>
+                <c:pt idx="2">
+                  <c:v>9</c:v>
+                </c:pt>
+                <c:pt idx="3">
+                  <c:v>3</c:v>
+                </c:pt>
+              </c:numCache>
+            </c:numRef>
+          </c:val>
+          <c:extLst>
+            <c:ext xmlns:c16="http://schemas.microsoft.com/office/drawing/2014/chart" uri="{C3380CC4-5D6E-409C-BE32-E72D297353CC}">
+              <c16:uniqueId val="{00000008-7082-4277-B8F6-64245E896F9D}"/>
+            </c:ext>
+          </c:extLst>
+        </c:ser>
+        <c:dLbls>
+          <c:showLegendKey val="0"/>
+          <c:showVal val="0"/>
+          <c:showCatName val="0"/>
+          <c:showSerName val="0"/>
+          <c:showPercent val="0"/>
+          <c:showBubbleSize val="0"/>
+          <c:showLeaderLines val="1"/>
+        </c:dLbls>
+        <c:firstSliceAng val="0"/>
+      </c:pieChart>
+      <c:spPr>
+        <a:noFill/>
+        <a:ln>
+          <a:noFill/>
+        </a:ln>
+        <a:effectLst/>
+      </c:spPr>
+    </c:plotArea>
+    <c:legend>
+      <c:legendPos val="r"/>
+      <c:layout>
+        <c:manualLayout>
+          <c:xMode val="edge"/>
+          <c:yMode val="edge"/>
+          <c:x val="0.72168326066679678"/>
+          <c:y val="0.26525335374744824"/>
+          <c:w val="0.25627817184009022"/>
+          <c:h val="0.45139107611548557"/>
+        </c:manualLayout>
+      </c:layout>
+      <c:overlay val="0"/>
+      <c:spPr>
+        <a:noFill/>
+        <a:ln>
+          <a:noFill/>
+        </a:ln>
+        <a:effectLst/>
+      </c:spPr>
+      <c:txPr>
+        <a:bodyPr rot="0" spcFirstLastPara="1" vertOverflow="ellipsis" vert="horz" wrap="square" anchor="ctr" anchorCtr="1"/>
+        <a:lstStyle/>
+        <a:p>
+          <a:pPr>
+            <a:defRPr sz="1400" b="0" i="0" u="none" strike="noStrike" kern="1200" baseline="0">
+              <a:solidFill>
+                <a:schemeClr val="tx1">
+                  <a:lumMod val="65000"/>
+                  <a:lumOff val="35000"/>
+                </a:schemeClr>
+              </a:solidFill>
+              <a:latin typeface="+mn-lt"/>
+              <a:ea typeface="+mn-ea"/>
+              <a:cs typeface="+mn-cs"/>
+            </a:defRPr>
+          </a:pPr>
+          <a:endParaRPr lang="en-US"/>
+        </a:p>
+      </c:txPr>
+    </c:legend>
+    <c:plotVisOnly val="1"/>
+    <c:dispBlanksAs val="gap"/>
+    <c:extLst>
+      <c:ext xmlns:c16r3="http://schemas.microsoft.com/office/drawing/2017/03/chart" uri="{56B9EC1D-385E-4148-901F-78D8002777C0}">
+        <c16r3:dataDisplayOptions16>
+          <c16r3:dispNaAsBlank val="1"/>
+        </c16r3:dataDisplayOptions16>
+      </c:ext>
+    </c:extLst>
+    <c:showDLblsOverMax val="0"/>
+  </c:chart>
+  <c:spPr>
+    <a:noFill/>
+    <a:ln>
+      <a:noFill/>
+    </a:ln>
+    <a:effectLst/>
+  </c:spPr>
+  <c:txPr>
+    <a:bodyPr/>
+    <a:lstStyle/>
+    <a:p>
+      <a:pPr>
+        <a:defRPr/>
+      </a:pPr>
+      <a:endParaRPr lang="en-US"/>
+    </a:p>
+  </c:txPr>
+  <c:externalData r:id="rId3">
+    <c:autoUpdate val="0"/>
+  </c:externalData>
+</c:chartSpace>
+</file>
+
+<file path=ppt/charts/colors1.xml><?xml version="1.0" encoding="utf-8"?>
+<cs:colorStyle xmlns:cs="http://schemas.microsoft.com/office/drawing/2012/chartStyle" xmlns:a="http://schemas.openxmlformats.org/drawingml/2006/main" meth="cycle" id="11">
+  <a:schemeClr val="accent1"/>
+  <a:schemeClr val="accent3"/>
+  <a:schemeClr val="accent5"/>
+  <cs:variation/>
+  <cs:variation>
+    <a:lumMod val="60000"/>
+  </cs:variation>
+  <cs:variation>
+    <a:lumMod val="80000"/>
+    <a:lumOff val="20000"/>
+  </cs:variation>
+  <cs:variation>
+    <a:lumMod val="80000"/>
+  </cs:variation>
+  <cs:variation>
+    <a:lumMod val="60000"/>
+    <a:lumOff val="40000"/>
+  </cs:variation>
+  <cs:variation>
+    <a:lumMod val="50000"/>
+  </cs:variation>
+  <cs:variation>
+    <a:lumMod val="70000"/>
+    <a:lumOff val="30000"/>
+  </cs:variation>
+  <cs:variation>
+    <a:lumMod val="70000"/>
+  </cs:variation>
+  <cs:variation>
+    <a:lumMod val="50000"/>
+    <a:lumOff val="50000"/>
+  </cs:variation>
+</cs:colorStyle>
+</file>
+
+<file path=ppt/charts/colors2.xml><?xml version="1.0" encoding="utf-8"?>
+<cs:colorStyle xmlns:cs="http://schemas.microsoft.com/office/drawing/2012/chartStyle" xmlns:a="http://schemas.openxmlformats.org/drawingml/2006/main" meth="cycle" id="11">
+  <a:schemeClr val="accent1"/>
+  <a:schemeClr val="accent3"/>
+  <a:schemeClr val="accent5"/>
+  <cs:variation/>
+  <cs:variation>
+    <a:lumMod val="60000"/>
+  </cs:variation>
+  <cs:variation>
+    <a:lumMod val="80000"/>
+    <a:lumOff val="20000"/>
+  </cs:variation>
+  <cs:variation>
+    <a:lumMod val="80000"/>
+  </cs:variation>
+  <cs:variation>
+    <a:lumMod val="60000"/>
+    <a:lumOff val="40000"/>
+  </cs:variation>
+  <cs:variation>
+    <a:lumMod val="50000"/>
+  </cs:variation>
+  <cs:variation>
+    <a:lumMod val="70000"/>
+    <a:lumOff val="30000"/>
+  </cs:variation>
+  <cs:variation>
+    <a:lumMod val="70000"/>
+  </cs:variation>
+  <cs:variation>
+    <a:lumMod val="50000"/>
+    <a:lumOff val="50000"/>
+  </cs:variation>
+</cs:colorStyle>
+</file>
+
+<file path=ppt/charts/style1.xml><?xml version="1.0" encoding="utf-8"?>
+<cs:chartStyle xmlns:cs="http://schemas.microsoft.com/office/drawing/2012/chartStyle" xmlns:a="http://schemas.openxmlformats.org/drawingml/2006/main" id="251">
+  <cs:axisTitle>
+    <cs:lnRef idx="0"/>
+    <cs:fillRef idx="0"/>
+    <cs:effectRef idx="0"/>
+    <cs:fontRef idx="minor">
+      <a:schemeClr val="tx1">
+        <a:lumMod val="65000"/>
+        <a:lumOff val="35000"/>
+      </a:schemeClr>
+    </cs:fontRef>
+    <cs:defRPr sz="1000" kern="1200"/>
+  </cs:axisTitle>
+  <cs:categoryAxis>
+    <cs:lnRef idx="0"/>
+    <cs:fillRef idx="0"/>
+    <cs:effectRef idx="0"/>
+    <cs:fontRef idx="minor">
+      <a:schemeClr val="tx1">
+        <a:lumMod val="65000"/>
+        <a:lumOff val="35000"/>
+      </a:schemeClr>
+    </cs:fontRef>
+    <cs:spPr>
+      <a:ln w="9525" cap="flat" cmpd="sng" algn="ctr">
+        <a:solidFill>
+          <a:schemeClr val="tx1">
+            <a:lumMod val="15000"/>
+            <a:lumOff val="85000"/>
+          </a:schemeClr>
+        </a:solidFill>
+        <a:round/>
+      </a:ln>
+    </cs:spPr>
+    <cs:defRPr sz="900" kern="1200"/>
+  </cs:categoryAxis>
+  <cs:chartArea mods="allowNoFillOverride allowNoLineOverride">
+    <cs:lnRef idx="0"/>
+    <cs:fillRef idx="0"/>
+    <cs:effectRef idx="0"/>
+    <cs:fontRef idx="minor">
+      <a:schemeClr val="tx1"/>
+    </cs:fontRef>
+    <cs:spPr>
+      <a:solidFill>
+        <a:schemeClr val="bg1"/>
+      </a:solidFill>
+      <a:ln w="9525" cap="flat" cmpd="sng" algn="ctr">
+        <a:solidFill>
+          <a:schemeClr val="tx1">
+            <a:lumMod val="15000"/>
+            <a:lumOff val="85000"/>
+          </a:schemeClr>
+        </a:solidFill>
+        <a:round/>
+      </a:ln>
+    </cs:spPr>
+    <cs:defRPr sz="900" kern="1200"/>
+  </cs:chartArea>
+  <cs:dataLabel>
+    <cs:lnRef idx="0"/>
+    <cs:fillRef idx="0"/>
+    <cs:effectRef idx="0"/>
+    <cs:fontRef idx="minor">
+      <a:schemeClr val="tx1">
+        <a:lumMod val="75000"/>
+        <a:lumOff val="25000"/>
+      </a:schemeClr>
+    </cs:fontRef>
+    <cs:defRPr sz="900" kern="1200"/>
+  </cs:dataLabel>
+  <cs:dataLabelCallout>
+    <cs:lnRef idx="0"/>
+    <cs:fillRef idx="0"/>
+    <cs:effectRef idx="0"/>
+    <cs:fontRef idx="minor">
+      <a:schemeClr val="dk1">
+        <a:lumMod val="65000"/>
+        <a:lumOff val="35000"/>
+      </a:schemeClr>
+    </cs:fontRef>
+    <cs:spPr>
+      <a:solidFill>
+        <a:schemeClr val="lt1"/>
+      </a:solidFill>
+      <a:ln>
+        <a:solidFill>
+          <a:schemeClr val="dk1">
+            <a:lumMod val="25000"/>
+            <a:lumOff val="75000"/>
+          </a:schemeClr>
+        </a:solidFill>
+      </a:ln>
+    </cs:spPr>
+    <cs:defRPr sz="900" kern="1200"/>
+    <cs:bodyPr rot="0" spcFirstLastPara="1" vertOverflow="clip" horzOverflow="clip" vert="horz" wrap="square" lIns="36576" tIns="18288" rIns="36576" bIns="18288" anchor="ctr" anchorCtr="1">
+      <a:spAutoFit/>
+    </cs:bodyPr>
+  </cs:dataLabelCallout>
+  <cs:dataPoint>
+    <cs:lnRef idx="0"/>
+    <cs:fillRef idx="1">
+      <cs:styleClr val="auto"/>
+    </cs:fillRef>
+    <cs:effectRef idx="0"/>
+    <cs:fontRef idx="minor">
+      <a:schemeClr val="tx1"/>
+    </cs:fontRef>
+    <cs:spPr>
+      <a:ln w="19050">
+        <a:solidFill>
+          <a:schemeClr val="lt1"/>
+        </a:solidFill>
+      </a:ln>
+    </cs:spPr>
+  </cs:dataPoint>
+  <cs:dataPoint3D>
+    <cs:lnRef idx="0"/>
+    <cs:fillRef idx="1">
+      <cs:styleClr val="auto"/>
+    </cs:fillRef>
+    <cs:effectRef idx="0"/>
+    <cs:fontRef idx="minor">
+      <a:schemeClr val="tx1"/>
+    </cs:fontRef>
+    <cs:spPr>
+      <a:ln w="25400">
+        <a:solidFill>
+          <a:schemeClr val="lt1"/>
+        </a:solidFill>
+      </a:ln>
+    </cs:spPr>
+  </cs:dataPoint3D>
+  <cs:dataPointLine>
+    <cs:lnRef idx="0">
+      <cs:styleClr val="auto"/>
+    </cs:lnRef>
+    <cs:fillRef idx="0"/>
+    <cs:effectRef idx="0"/>
+    <cs:fontRef idx="minor">
+      <a:schemeClr val="tx1"/>
+    </cs:fontRef>
+    <cs:spPr>
+      <a:ln w="28575" cap="rnd">
+        <a:solidFill>
+          <a:schemeClr val="phClr"/>
+        </a:solidFill>
+        <a:round/>
+      </a:ln>
+    </cs:spPr>
+  </cs:dataPointLine>
+  <cs:dataPointMarker>
+    <cs:lnRef idx="0">
+      <cs:styleClr val="auto"/>
+    </cs:lnRef>
+    <cs:fillRef idx="1">
+      <cs:styleClr val="auto"/>
+    </cs:fillRef>
+    <cs:effectRef idx="0"/>
+    <cs:fontRef idx="minor">
+      <a:schemeClr val="tx1"/>
+    </cs:fontRef>
+    <cs:spPr>
+      <a:ln w="9525">
+        <a:solidFill>
+          <a:schemeClr val="phClr"/>
+        </a:solidFill>
+      </a:ln>
+    </cs:spPr>
+  </cs:dataPointMarker>
+  <cs:dataPointMarkerLayout symbol="circle" size="5"/>
+  <cs:dataPointWireframe>
+    <cs:lnRef idx="0">
+      <cs:styleClr val="auto"/>
+    </cs:lnRef>
+    <cs:fillRef idx="0"/>
+    <cs:effectRef idx="0"/>
+    <cs:fontRef idx="minor">
+      <a:schemeClr val="tx1"/>
+    </cs:fontRef>
+    <cs:spPr>
+      <a:ln w="9525" cap="rnd">
+        <a:solidFill>
+          <a:schemeClr val="phClr"/>
+        </a:solidFill>
+        <a:round/>
+      </a:ln>
+    </cs:spPr>
+  </cs:dataPointWireframe>
+  <cs:dataTable>
+    <cs:lnRef idx="0"/>
+    <cs:fillRef idx="0"/>
+    <cs:effectRef idx="0"/>
+    <cs:fontRef idx="minor">
+      <a:schemeClr val="tx1">
+        <a:lumMod val="65000"/>
+        <a:lumOff val="35000"/>
+      </a:schemeClr>
+    </cs:fontRef>
+    <cs:spPr>
+      <a:noFill/>
+      <a:ln w="9525" cap="flat" cmpd="sng" algn="ctr">
+        <a:solidFill>
+          <a:schemeClr val="tx1">
+            <a:lumMod val="15000"/>
+            <a:lumOff val="85000"/>
+          </a:schemeClr>
+        </a:solidFill>
+        <a:round/>
+      </a:ln>
+    </cs:spPr>
+    <cs:defRPr sz="900" kern="1200"/>
+  </cs:dataTable>
+  <cs:downBar>
+    <cs:lnRef idx="0"/>
+    <cs:fillRef idx="0"/>
+    <cs:effectRef idx="0"/>
+    <cs:fontRef idx="minor">
+      <a:schemeClr val="tx1"/>
+    </cs:fontRef>
+    <cs:spPr>
+      <a:solidFill>
+        <a:schemeClr val="dk1">
+          <a:lumMod val="75000"/>
+          <a:lumOff val="25000"/>
+        </a:schemeClr>
+      </a:solidFill>
+      <a:ln w="9525" cap="flat" cmpd="sng" algn="ctr">
+        <a:solidFill>
+          <a:schemeClr val="tx1">
+            <a:lumMod val="65000"/>
+            <a:lumOff val="35000"/>
+          </a:schemeClr>
+        </a:solidFill>
+        <a:round/>
+      </a:ln>
+    </cs:spPr>
+  </cs:downBar>
+  <cs:dropLine>
+    <cs:lnRef idx="0"/>
+    <cs:fillRef idx="0"/>
+    <cs:effectRef idx="0"/>
+    <cs:fontRef idx="minor">
+      <a:schemeClr val="tx1"/>
+    </cs:fontRef>
+    <cs:spPr>
+      <a:ln w="9525" cap="flat" cmpd="sng" algn="ctr">
+        <a:solidFill>
+          <a:schemeClr val="tx1">
+            <a:lumMod val="35000"/>
+            <a:lumOff val="65000"/>
+          </a:schemeClr>
+        </a:solidFill>
+        <a:round/>
+      </a:ln>
+    </cs:spPr>
+  </cs:dropLine>
+  <cs:errorBar>
+    <cs:lnRef idx="0"/>
+    <cs:fillRef idx="0"/>
+    <cs:effectRef idx="0"/>
+    <cs:fontRef idx="minor">
+      <a:schemeClr val="tx1"/>
+    </cs:fontRef>
+    <cs:spPr>
+      <a:ln w="9525" cap="flat" cmpd="sng" algn="ctr">
+        <a:solidFill>
+          <a:schemeClr val="tx1">
+            <a:lumMod val="65000"/>
+            <a:lumOff val="35000"/>
+          </a:schemeClr>
+        </a:solidFill>
+        <a:round/>
+      </a:ln>
+    </cs:spPr>
+  </cs:errorBar>
+  <cs:floor>
+    <cs:lnRef idx="0"/>
+    <cs:fillRef idx="0"/>
+    <cs:effectRef idx="0"/>
+    <cs:fontRef idx="minor">
+      <a:schemeClr val="tx1"/>
+    </cs:fontRef>
+    <cs:spPr>
+      <a:noFill/>
+      <a:ln>
+        <a:noFill/>
+      </a:ln>
+    </cs:spPr>
+  </cs:floor>
+  <cs:gridlineMajor>
+    <cs:lnRef idx="0"/>
+    <cs:fillRef idx="0"/>
+    <cs:effectRef idx="0"/>
+    <cs:fontRef idx="minor">
+      <a:schemeClr val="tx1"/>
+    </cs:fontRef>
+    <cs:spPr>
+      <a:ln w="9525" cap="flat" cmpd="sng" algn="ctr">
+        <a:solidFill>
+          <a:schemeClr val="tx1">
+            <a:lumMod val="15000"/>
+            <a:lumOff val="85000"/>
+          </a:schemeClr>
+        </a:solidFill>
+        <a:round/>
+      </a:ln>
+    </cs:spPr>
+  </cs:gridlineMajor>
+  <cs:gridlineMinor>
+    <cs:lnRef idx="0"/>
+    <cs:fillRef idx="0"/>
+    <cs:effectRef idx="0"/>
+    <cs:fontRef idx="minor">
+      <a:schemeClr val="tx1"/>
+    </cs:fontRef>
+    <cs:spPr>
+      <a:ln w="9525" cap="flat" cmpd="sng" algn="ctr">
+        <a:solidFill>
+          <a:schemeClr val="tx1">
+            <a:lumMod val="5000"/>
+            <a:lumOff val="95000"/>
+          </a:schemeClr>
+        </a:solidFill>
+        <a:round/>
+      </a:ln>
+    </cs:spPr>
+  </cs:gridlineMinor>
+  <cs:hiLoLine>
+    <cs:lnRef idx="0"/>
+    <cs:fillRef idx="0"/>
+    <cs:effectRef idx="0"/>
+    <cs:fontRef idx="minor">
+      <a:schemeClr val="tx1"/>
+    </cs:fontRef>
+    <cs:spPr>
+      <a:ln w="9525" cap="flat" cmpd="sng" algn="ctr">
+        <a:solidFill>
+          <a:schemeClr val="tx1">
+            <a:lumMod val="50000"/>
+            <a:lumOff val="50000"/>
+          </a:schemeClr>
+        </a:solidFill>
+        <a:round/>
+      </a:ln>
+    </cs:spPr>
+  </cs:hiLoLine>
+  <cs:leaderLine>
+    <cs:lnRef idx="0"/>
+    <cs:fillRef idx="0"/>
+    <cs:effectRef idx="0"/>
+    <cs:fontRef idx="minor">
+      <a:schemeClr val="tx1"/>
+    </cs:fontRef>
+    <cs:spPr>
+      <a:ln w="9525" cap="flat" cmpd="sng" algn="ctr">
+        <a:solidFill>
+          <a:schemeClr val="tx1">
+            <a:lumMod val="35000"/>
+            <a:lumOff val="65000"/>
+          </a:schemeClr>
+        </a:solidFill>
+        <a:round/>
+      </a:ln>
+    </cs:spPr>
+  </cs:leaderLine>
+  <cs:legend>
+    <cs:lnRef idx="0"/>
+    <cs:fillRef idx="0"/>
+    <cs:effectRef idx="0"/>
+    <cs:fontRef idx="minor">
+      <a:schemeClr val="tx1">
+        <a:lumMod val="65000"/>
+        <a:lumOff val="35000"/>
+      </a:schemeClr>
+    </cs:fontRef>
+    <cs:defRPr sz="900" kern="1200"/>
+  </cs:legend>
+  <cs:plotArea mods="allowNoFillOverride allowNoLineOverride">
+    <cs:lnRef idx="0"/>
+    <cs:fillRef idx="0"/>
+    <cs:effectRef idx="0"/>
+    <cs:fontRef idx="minor">
+      <a:schemeClr val="tx1"/>
+    </cs:fontRef>
+  </cs:plotArea>
+  <cs:plotArea3D mods="allowNoFillOverride allowNoLineOverride">
+    <cs:lnRef idx="0"/>
+    <cs:fillRef idx="0"/>
+    <cs:effectRef idx="0"/>
+    <cs:fontRef idx="minor">
+      <a:schemeClr val="tx1"/>
+    </cs:fontRef>
+  </cs:plotArea3D>
+  <cs:seriesAxis>
+    <cs:lnRef idx="0"/>
+    <cs:fillRef idx="0"/>
+    <cs:effectRef idx="0"/>
+    <cs:fontRef idx="minor">
+      <a:schemeClr val="tx1">
+        <a:lumMod val="65000"/>
+        <a:lumOff val="35000"/>
+      </a:schemeClr>
+    </cs:fontRef>
+    <cs:defRPr sz="900" kern="1200"/>
+  </cs:seriesAxis>
+  <cs:seriesLine>
+    <cs:lnRef idx="0"/>
+    <cs:fillRef idx="0"/>
+    <cs:effectRef idx="0"/>
+    <cs:fontRef idx="minor">
+      <a:schemeClr val="tx1"/>
+    </cs:fontRef>
+    <cs:spPr>
+      <a:ln w="9525" cap="flat" cmpd="sng" algn="ctr">
+        <a:solidFill>
+          <a:schemeClr val="tx1">
+            <a:lumMod val="35000"/>
+            <a:lumOff val="65000"/>
+          </a:schemeClr>
+        </a:solidFill>
+        <a:round/>
+      </a:ln>
+    </cs:spPr>
+  </cs:seriesLine>
+  <cs:title>
+    <cs:lnRef idx="0"/>
+    <cs:fillRef idx="0"/>
+    <cs:effectRef idx="0"/>
+    <cs:fontRef idx="minor">
+      <a:schemeClr val="tx1">
+        <a:lumMod val="65000"/>
+        <a:lumOff val="35000"/>
+      </a:schemeClr>
+    </cs:fontRef>
+    <cs:defRPr sz="1400" b="0" kern="1200" spc="0" baseline="0"/>
+  </cs:title>
+  <cs:trendline>
+    <cs:lnRef idx="0">
+      <cs:styleClr val="auto"/>
+    </cs:lnRef>
+    <cs:fillRef idx="0"/>
+    <cs:effectRef idx="0"/>
+    <cs:fontRef idx="minor">
+      <a:schemeClr val="tx1"/>
+    </cs:fontRef>
+    <cs:spPr>
+      <a:ln w="19050" cap="rnd">
+        <a:solidFill>
+          <a:schemeClr val="phClr"/>
+        </a:solidFill>
+        <a:prstDash val="sysDot"/>
+      </a:ln>
+    </cs:spPr>
+  </cs:trendline>
+  <cs:trendlineLabel>
+    <cs:lnRef idx="0"/>
+    <cs:fillRef idx="0"/>
+    <cs:effectRef idx="0"/>
+    <cs:fontRef idx="minor">
+      <a:schemeClr val="tx1">
+        <a:lumMod val="65000"/>
+        <a:lumOff val="35000"/>
+      </a:schemeClr>
+    </cs:fontRef>
+    <cs:defRPr sz="900" kern="1200"/>
+  </cs:trendlineLabel>
+  <cs:upBar>
+    <cs:lnRef idx="0"/>
+    <cs:fillRef idx="0"/>
+    <cs:effectRef idx="0"/>
+    <cs:fontRef idx="minor">
+      <a:schemeClr val="tx1"/>
+    </cs:fontRef>
+    <cs:spPr>
+      <a:solidFill>
+        <a:schemeClr val="lt1"/>
+      </a:solidFill>
+      <a:ln w="9525" cap="flat" cmpd="sng" algn="ctr">
+        <a:solidFill>
+          <a:schemeClr val="tx1">
+            <a:lumMod val="65000"/>
+            <a:lumOff val="35000"/>
+          </a:schemeClr>
+        </a:solidFill>
+        <a:round/>
+      </a:ln>
+    </cs:spPr>
+  </cs:upBar>
+  <cs:valueAxis>
+    <cs:lnRef idx="0"/>
+    <cs:fillRef idx="0"/>
+    <cs:effectRef idx="0"/>
+    <cs:fontRef idx="minor">
+      <a:schemeClr val="tx1">
+        <a:lumMod val="65000"/>
+        <a:lumOff val="35000"/>
+      </a:schemeClr>
+    </cs:fontRef>
+    <cs:defRPr sz="900" kern="1200"/>
+  </cs:valueAxis>
+  <cs:wall>
+    <cs:lnRef idx="0"/>
+    <cs:fillRef idx="0"/>
+    <cs:effectRef idx="0"/>
+    <cs:fontRef idx="minor">
+      <a:schemeClr val="tx1"/>
+    </cs:fontRef>
+    <cs:spPr>
+      <a:noFill/>
+      <a:ln>
+        <a:noFill/>
+      </a:ln>
+    </cs:spPr>
+  </cs:wall>
+</cs:chartStyle>
+</file>
+
+<file path=ppt/charts/style2.xml><?xml version="1.0" encoding="utf-8"?>
+<cs:chartStyle xmlns:cs="http://schemas.microsoft.com/office/drawing/2012/chartStyle" xmlns:a="http://schemas.openxmlformats.org/drawingml/2006/main" id="251">
+  <cs:axisTitle>
+    <cs:lnRef idx="0"/>
+    <cs:fillRef idx="0"/>
+    <cs:effectRef idx="0"/>
+    <cs:fontRef idx="minor">
+      <a:schemeClr val="tx1">
+        <a:lumMod val="65000"/>
+        <a:lumOff val="35000"/>
+      </a:schemeClr>
+    </cs:fontRef>
+    <cs:defRPr sz="1000" kern="1200"/>
+  </cs:axisTitle>
+  <cs:categoryAxis>
+    <cs:lnRef idx="0"/>
+    <cs:fillRef idx="0"/>
+    <cs:effectRef idx="0"/>
+    <cs:fontRef idx="minor">
+      <a:schemeClr val="tx1">
+        <a:lumMod val="65000"/>
+        <a:lumOff val="35000"/>
+      </a:schemeClr>
+    </cs:fontRef>
+    <cs:spPr>
+      <a:ln w="9525" cap="flat" cmpd="sng" algn="ctr">
+        <a:solidFill>
+          <a:schemeClr val="tx1">
+            <a:lumMod val="15000"/>
+            <a:lumOff val="85000"/>
+          </a:schemeClr>
+        </a:solidFill>
+        <a:round/>
+      </a:ln>
+    </cs:spPr>
+    <cs:defRPr sz="900" kern="1200"/>
+  </cs:categoryAxis>
+  <cs:chartArea mods="allowNoFillOverride allowNoLineOverride">
+    <cs:lnRef idx="0"/>
+    <cs:fillRef idx="0"/>
+    <cs:effectRef idx="0"/>
+    <cs:fontRef idx="minor">
+      <a:schemeClr val="tx1"/>
+    </cs:fontRef>
+    <cs:spPr>
+      <a:solidFill>
+        <a:schemeClr val="bg1"/>
+      </a:solidFill>
+      <a:ln w="9525" cap="flat" cmpd="sng" algn="ctr">
+        <a:solidFill>
+          <a:schemeClr val="tx1">
+            <a:lumMod val="15000"/>
+            <a:lumOff val="85000"/>
+          </a:schemeClr>
+        </a:solidFill>
+        <a:round/>
+      </a:ln>
+    </cs:spPr>
+    <cs:defRPr sz="900" kern="1200"/>
+  </cs:chartArea>
+  <cs:dataLabel>
+    <cs:lnRef idx="0"/>
+    <cs:fillRef idx="0"/>
+    <cs:effectRef idx="0"/>
+    <cs:fontRef idx="minor">
+      <a:schemeClr val="tx1">
+        <a:lumMod val="75000"/>
+        <a:lumOff val="25000"/>
+      </a:schemeClr>
+    </cs:fontRef>
+    <cs:defRPr sz="900" kern="1200"/>
+  </cs:dataLabel>
+  <cs:dataLabelCallout>
+    <cs:lnRef idx="0"/>
+    <cs:fillRef idx="0"/>
+    <cs:effectRef idx="0"/>
+    <cs:fontRef idx="minor">
+      <a:schemeClr val="dk1">
+        <a:lumMod val="65000"/>
+        <a:lumOff val="35000"/>
+      </a:schemeClr>
+    </cs:fontRef>
+    <cs:spPr>
+      <a:solidFill>
+        <a:schemeClr val="lt1"/>
+      </a:solidFill>
+      <a:ln>
+        <a:solidFill>
+          <a:schemeClr val="dk1">
+            <a:lumMod val="25000"/>
+            <a:lumOff val="75000"/>
+          </a:schemeClr>
+        </a:solidFill>
+      </a:ln>
+    </cs:spPr>
+    <cs:defRPr sz="900" kern="1200"/>
+    <cs:bodyPr rot="0" spcFirstLastPara="1" vertOverflow="clip" horzOverflow="clip" vert="horz" wrap="square" lIns="36576" tIns="18288" rIns="36576" bIns="18288" anchor="ctr" anchorCtr="1">
+      <a:spAutoFit/>
+    </cs:bodyPr>
+  </cs:dataLabelCallout>
+  <cs:dataPoint>
+    <cs:lnRef idx="0"/>
+    <cs:fillRef idx="1">
+      <cs:styleClr val="auto"/>
+    </cs:fillRef>
+    <cs:effectRef idx="0"/>
+    <cs:fontRef idx="minor">
+      <a:schemeClr val="tx1"/>
+    </cs:fontRef>
+    <cs:spPr>
+      <a:ln w="19050">
+        <a:solidFill>
+          <a:schemeClr val="lt1"/>
+        </a:solidFill>
+      </a:ln>
+    </cs:spPr>
+  </cs:dataPoint>
+  <cs:dataPoint3D>
+    <cs:lnRef idx="0"/>
+    <cs:fillRef idx="1">
+      <cs:styleClr val="auto"/>
+    </cs:fillRef>
+    <cs:effectRef idx="0"/>
+    <cs:fontRef idx="minor">
+      <a:schemeClr val="tx1"/>
+    </cs:fontRef>
+    <cs:spPr>
+      <a:ln w="25400">
+        <a:solidFill>
+          <a:schemeClr val="lt1"/>
+        </a:solidFill>
+      </a:ln>
+    </cs:spPr>
+  </cs:dataPoint3D>
+  <cs:dataPointLine>
+    <cs:lnRef idx="0">
+      <cs:styleClr val="auto"/>
+    </cs:lnRef>
+    <cs:fillRef idx="0"/>
+    <cs:effectRef idx="0"/>
+    <cs:fontRef idx="minor">
+      <a:schemeClr val="tx1"/>
+    </cs:fontRef>
+    <cs:spPr>
+      <a:ln w="28575" cap="rnd">
+        <a:solidFill>
+          <a:schemeClr val="phClr"/>
+        </a:solidFill>
+        <a:round/>
+      </a:ln>
+    </cs:spPr>
+  </cs:dataPointLine>
+  <cs:dataPointMarker>
+    <cs:lnRef idx="0">
+      <cs:styleClr val="auto"/>
+    </cs:lnRef>
+    <cs:fillRef idx="1">
+      <cs:styleClr val="auto"/>
+    </cs:fillRef>
+    <cs:effectRef idx="0"/>
+    <cs:fontRef idx="minor">
+      <a:schemeClr val="tx1"/>
+    </cs:fontRef>
+    <cs:spPr>
+      <a:ln w="9525">
+        <a:solidFill>
+          <a:schemeClr val="phClr"/>
+        </a:solidFill>
+      </a:ln>
+    </cs:spPr>
+  </cs:dataPointMarker>
+  <cs:dataPointMarkerLayout symbol="circle" size="5"/>
+  <cs:dataPointWireframe>
+    <cs:lnRef idx="0">
+      <cs:styleClr val="auto"/>
+    </cs:lnRef>
+    <cs:fillRef idx="0"/>
+    <cs:effectRef idx="0"/>
+    <cs:fontRef idx="minor">
+      <a:schemeClr val="tx1"/>
+    </cs:fontRef>
+    <cs:spPr>
+      <a:ln w="9525" cap="rnd">
+        <a:solidFill>
+          <a:schemeClr val="phClr"/>
+        </a:solidFill>
+        <a:round/>
+      </a:ln>
+    </cs:spPr>
+  </cs:dataPointWireframe>
+  <cs:dataTable>
+    <cs:lnRef idx="0"/>
+    <cs:fillRef idx="0"/>
+    <cs:effectRef idx="0"/>
+    <cs:fontRef idx="minor">
+      <a:schemeClr val="tx1">
+        <a:lumMod val="65000"/>
+        <a:lumOff val="35000"/>
+      </a:schemeClr>
+    </cs:fontRef>
+    <cs:spPr>
+      <a:noFill/>
+      <a:ln w="9525" cap="flat" cmpd="sng" algn="ctr">
+        <a:solidFill>
+          <a:schemeClr val="tx1">
+            <a:lumMod val="15000"/>
+            <a:lumOff val="85000"/>
+          </a:schemeClr>
+        </a:solidFill>
+        <a:round/>
+      </a:ln>
+    </cs:spPr>
+    <cs:defRPr sz="900" kern="1200"/>
+  </cs:dataTable>
+  <cs:downBar>
+    <cs:lnRef idx="0"/>
+    <cs:fillRef idx="0"/>
+    <cs:effectRef idx="0"/>
+    <cs:fontRef idx="minor">
+      <a:schemeClr val="tx1"/>
+    </cs:fontRef>
+    <cs:spPr>
+      <a:solidFill>
+        <a:schemeClr val="dk1">
+          <a:lumMod val="75000"/>
+          <a:lumOff val="25000"/>
+        </a:schemeClr>
+      </a:solidFill>
+      <a:ln w="9525" cap="flat" cmpd="sng" algn="ctr">
+        <a:solidFill>
+          <a:schemeClr val="tx1">
+            <a:lumMod val="65000"/>
+            <a:lumOff val="35000"/>
+          </a:schemeClr>
+        </a:solidFill>
+        <a:round/>
+      </a:ln>
+    </cs:spPr>
+  </cs:downBar>
+  <cs:dropLine>
+    <cs:lnRef idx="0"/>
+    <cs:fillRef idx="0"/>
+    <cs:effectRef idx="0"/>
+    <cs:fontRef idx="minor">
+      <a:schemeClr val="tx1"/>
+    </cs:fontRef>
+    <cs:spPr>
+      <a:ln w="9525" cap="flat" cmpd="sng" algn="ctr">
+        <a:solidFill>
+          <a:schemeClr val="tx1">
+            <a:lumMod val="35000"/>
+            <a:lumOff val="65000"/>
+          </a:schemeClr>
+        </a:solidFill>
+        <a:round/>
+      </a:ln>
+    </cs:spPr>
+  </cs:dropLine>
+  <cs:errorBar>
+    <cs:lnRef idx="0"/>
+    <cs:fillRef idx="0"/>
+    <cs:effectRef idx="0"/>
+    <cs:fontRef idx="minor">
+      <a:schemeClr val="tx1"/>
+    </cs:fontRef>
+    <cs:spPr>
+      <a:ln w="9525" cap="flat" cmpd="sng" algn="ctr">
+        <a:solidFill>
+          <a:schemeClr val="tx1">
+            <a:lumMod val="65000"/>
+            <a:lumOff val="35000"/>
+          </a:schemeClr>
+        </a:solidFill>
+        <a:round/>
+      </a:ln>
+    </cs:spPr>
+  </cs:errorBar>
+  <cs:floor>
+    <cs:lnRef idx="0"/>
+    <cs:fillRef idx="0"/>
+    <cs:effectRef idx="0"/>
+    <cs:fontRef idx="minor">
+      <a:schemeClr val="tx1"/>
+    </cs:fontRef>
+    <cs:spPr>
+      <a:noFill/>
+      <a:ln>
+        <a:noFill/>
+      </a:ln>
+    </cs:spPr>
+  </cs:floor>
+  <cs:gridlineMajor>
+    <cs:lnRef idx="0"/>
+    <cs:fillRef idx="0"/>
+    <cs:effectRef idx="0"/>
+    <cs:fontRef idx="minor">
+      <a:schemeClr val="tx1"/>
+    </cs:fontRef>
+    <cs:spPr>
+      <a:ln w="9525" cap="flat" cmpd="sng" algn="ctr">
+        <a:solidFill>
+          <a:schemeClr val="tx1">
+            <a:lumMod val="15000"/>
+            <a:lumOff val="85000"/>
+          </a:schemeClr>
+        </a:solidFill>
+        <a:round/>
+      </a:ln>
+    </cs:spPr>
+  </cs:gridlineMajor>
+  <cs:gridlineMinor>
+    <cs:lnRef idx="0"/>
+    <cs:fillRef idx="0"/>
+    <cs:effectRef idx="0"/>
+    <cs:fontRef idx="minor">
+      <a:schemeClr val="tx1"/>
+    </cs:fontRef>
+    <cs:spPr>
+      <a:ln w="9525" cap="flat" cmpd="sng" algn="ctr">
+        <a:solidFill>
+          <a:schemeClr val="tx1">
+            <a:lumMod val="5000"/>
+            <a:lumOff val="95000"/>
+          </a:schemeClr>
+        </a:solidFill>
+        <a:round/>
+      </a:ln>
+    </cs:spPr>
+  </cs:gridlineMinor>
+  <cs:hiLoLine>
+    <cs:lnRef idx="0"/>
+    <cs:fillRef idx="0"/>
+    <cs:effectRef idx="0"/>
+    <cs:fontRef idx="minor">
+      <a:schemeClr val="tx1"/>
+    </cs:fontRef>
+    <cs:spPr>
+      <a:ln w="9525" cap="flat" cmpd="sng" algn="ctr">
+        <a:solidFill>
+          <a:schemeClr val="tx1">
+            <a:lumMod val="50000"/>
+            <a:lumOff val="50000"/>
+          </a:schemeClr>
+        </a:solidFill>
+        <a:round/>
+      </a:ln>
+    </cs:spPr>
+  </cs:hiLoLine>
+  <cs:leaderLine>
+    <cs:lnRef idx="0"/>
+    <cs:fillRef idx="0"/>
+    <cs:effectRef idx="0"/>
+    <cs:fontRef idx="minor">
+      <a:schemeClr val="tx1"/>
+    </cs:fontRef>
+    <cs:spPr>
+      <a:ln w="9525" cap="flat" cmpd="sng" algn="ctr">
+        <a:solidFill>
+          <a:schemeClr val="tx1">
+            <a:lumMod val="35000"/>
+            <a:lumOff val="65000"/>
+          </a:schemeClr>
+        </a:solidFill>
+        <a:round/>
+      </a:ln>
+    </cs:spPr>
+  </cs:leaderLine>
+  <cs:legend>
+    <cs:lnRef idx="0"/>
+    <cs:fillRef idx="0"/>
+    <cs:effectRef idx="0"/>
+    <cs:fontRef idx="minor">
+      <a:schemeClr val="tx1">
+        <a:lumMod val="65000"/>
+        <a:lumOff val="35000"/>
+      </a:schemeClr>
+    </cs:fontRef>
+    <cs:defRPr sz="900" kern="1200"/>
+  </cs:legend>
+  <cs:plotArea mods="allowNoFillOverride allowNoLineOverride">
+    <cs:lnRef idx="0"/>
+    <cs:fillRef idx="0"/>
+    <cs:effectRef idx="0"/>
+    <cs:fontRef idx="minor">
+      <a:schemeClr val="tx1"/>
+    </cs:fontRef>
+  </cs:plotArea>
+  <cs:plotArea3D mods="allowNoFillOverride allowNoLineOverride">
+    <cs:lnRef idx="0"/>
+    <cs:fillRef idx="0"/>
+    <cs:effectRef idx="0"/>
+    <cs:fontRef idx="minor">
+      <a:schemeClr val="tx1"/>
+    </cs:fontRef>
+  </cs:plotArea3D>
+  <cs:seriesAxis>
+    <cs:lnRef idx="0"/>
+    <cs:fillRef idx="0"/>
+    <cs:effectRef idx="0"/>
+    <cs:fontRef idx="minor">
+      <a:schemeClr val="tx1">
+        <a:lumMod val="65000"/>
+        <a:lumOff val="35000"/>
+      </a:schemeClr>
+    </cs:fontRef>
+    <cs:defRPr sz="900" kern="1200"/>
+  </cs:seriesAxis>
+  <cs:seriesLine>
+    <cs:lnRef idx="0"/>
+    <cs:fillRef idx="0"/>
+    <cs:effectRef idx="0"/>
+    <cs:fontRef idx="minor">
+      <a:schemeClr val="tx1"/>
+    </cs:fontRef>
+    <cs:spPr>
+      <a:ln w="9525" cap="flat" cmpd="sng" algn="ctr">
+        <a:solidFill>
+          <a:schemeClr val="tx1">
+            <a:lumMod val="35000"/>
+            <a:lumOff val="65000"/>
+          </a:schemeClr>
+        </a:solidFill>
+        <a:round/>
+      </a:ln>
+    </cs:spPr>
+  </cs:seriesLine>
+  <cs:title>
+    <cs:lnRef idx="0"/>
+    <cs:fillRef idx="0"/>
+    <cs:effectRef idx="0"/>
+    <cs:fontRef idx="minor">
+      <a:schemeClr val="tx1">
+        <a:lumMod val="65000"/>
+        <a:lumOff val="35000"/>
+      </a:schemeClr>
+    </cs:fontRef>
+    <cs:defRPr sz="1400" b="0" kern="1200" spc="0" baseline="0"/>
+  </cs:title>
+  <cs:trendline>
+    <cs:lnRef idx="0">
+      <cs:styleClr val="auto"/>
+    </cs:lnRef>
+    <cs:fillRef idx="0"/>
+    <cs:effectRef idx="0"/>
+    <cs:fontRef idx="minor">
+      <a:schemeClr val="tx1"/>
+    </cs:fontRef>
+    <cs:spPr>
+      <a:ln w="19050" cap="rnd">
+        <a:solidFill>
+          <a:schemeClr val="phClr"/>
+        </a:solidFill>
+        <a:prstDash val="sysDot"/>
+      </a:ln>
+    </cs:spPr>
+  </cs:trendline>
+  <cs:trendlineLabel>
+    <cs:lnRef idx="0"/>
+    <cs:fillRef idx="0"/>
+    <cs:effectRef idx="0"/>
+    <cs:fontRef idx="minor">
+      <a:schemeClr val="tx1">
+        <a:lumMod val="65000"/>
+        <a:lumOff val="35000"/>
+      </a:schemeClr>
+    </cs:fontRef>
+    <cs:defRPr sz="900" kern="1200"/>
+  </cs:trendlineLabel>
+  <cs:upBar>
+    <cs:lnRef idx="0"/>
+    <cs:fillRef idx="0"/>
+    <cs:effectRef idx="0"/>
+    <cs:fontRef idx="minor">
+      <a:schemeClr val="tx1"/>
+    </cs:fontRef>
+    <cs:spPr>
+      <a:solidFill>
+        <a:schemeClr val="lt1"/>
+      </a:solidFill>
+      <a:ln w="9525" cap="flat" cmpd="sng" algn="ctr">
+        <a:solidFill>
+          <a:schemeClr val="tx1">
+            <a:lumMod val="65000"/>
+            <a:lumOff val="35000"/>
+          </a:schemeClr>
+        </a:solidFill>
+        <a:round/>
+      </a:ln>
+    </cs:spPr>
+  </cs:upBar>
+  <cs:valueAxis>
+    <cs:lnRef idx="0"/>
+    <cs:fillRef idx="0"/>
+    <cs:effectRef idx="0"/>
+    <cs:fontRef idx="minor">
+      <a:schemeClr val="tx1">
+        <a:lumMod val="65000"/>
+        <a:lumOff val="35000"/>
+      </a:schemeClr>
+    </cs:fontRef>
+    <cs:defRPr sz="900" kern="1200"/>
+  </cs:valueAxis>
+  <cs:wall>
+    <cs:lnRef idx="0"/>
+    <cs:fillRef idx="0"/>
+    <cs:effectRef idx="0"/>
+    <cs:fontRef idx="minor">
+      <a:schemeClr val="tx1"/>
+    </cs:fontRef>
+    <cs:spPr>
+      <a:noFill/>
+      <a:ln>
+        <a:noFill/>
+      </a:ln>
+    </cs:spPr>
+  </cs:wall>
+</cs:chartStyle>
+</file>
+
 <file path=ppt/slideLayouts/slideLayout1.xml><?xml version="1.0" encoding="utf-8"?>
 <p:sldLayout xmlns:a="http://schemas.openxmlformats.org/drawingml/2006/main" xmlns:r="http://schemas.openxmlformats.org/officeDocument/2006/relationships" xmlns:p="http://schemas.openxmlformats.org/presentationml/2006/main" showMasterSp="0" type="title" preserve="1">
   <p:cSld name="Title Slide">
@@ -376,7 +2106,7 @@
           <a:p>
             <a:fld id="{3341EE12-F28E-4B03-A404-A8FCAE0F6316}" type="datetime1">
               <a:rPr lang="en-US" smtClean="0"/>
-              <a:t>4/22/23</a:t>
+              <a:t>4/23/2023</a:t>
             </a:fld>
             <a:endParaRPr lang="en-US" dirty="0"/>
           </a:p>
@@ -661,7 +2391,7 @@
           <a:p>
             <a:fld id="{B68B8189-0D9C-48A6-9FA3-862227B094CE}" type="datetime1">
               <a:rPr lang="en-US" smtClean="0"/>
-              <a:t>4/22/23</a:t>
+              <a:t>4/23/2023</a:t>
             </a:fld>
             <a:endParaRPr lang="en-US"/>
           </a:p>
@@ -1025,7 +2755,7 @@
           <a:p>
             <a:fld id="{26ADDCAE-6443-42C3-9C19-F95985500186}" type="datetime1">
               <a:rPr lang="en-US" smtClean="0"/>
-              <a:t>4/22/23</a:t>
+              <a:t>4/23/2023</a:t>
             </a:fld>
             <a:endParaRPr lang="en-US" dirty="0"/>
           </a:p>
@@ -1287,7 +3017,7 @@
           <a:p>
             <a:fld id="{1962799E-EB8E-4038-8063-81BB57C732D4}" type="datetime1">
               <a:rPr lang="en-US" smtClean="0"/>
-              <a:t>4/22/23</a:t>
+              <a:t>4/23/2023</a:t>
             </a:fld>
             <a:endParaRPr lang="en-US"/>
           </a:p>
@@ -1717,7 +3447,7 @@
           <a:p>
             <a:fld id="{217A73C3-B243-44D3-809D-EF8FDFBD85D4}" type="datetime1">
               <a:rPr lang="en-US" smtClean="0"/>
-              <a:t>4/22/23</a:t>
+              <a:t>4/23/2023</a:t>
             </a:fld>
             <a:endParaRPr lang="en-US" dirty="0"/>
           </a:p>
@@ -2048,7 +3778,7 @@
           <a:p>
             <a:fld id="{C9B6D3E3-28E2-4380-A113-67698215C5F8}" type="datetime1">
               <a:rPr lang="en-US" smtClean="0"/>
-              <a:t>4/22/23</a:t>
+              <a:t>4/23/2023</a:t>
             </a:fld>
             <a:endParaRPr lang="en-US" dirty="0"/>
           </a:p>
@@ -2481,7 +4211,7 @@
           <a:p>
             <a:fld id="{A9EFCB61-04AD-47C9-BF79-2BD8B9CEC07A}" type="datetime1">
               <a:rPr lang="en-US" smtClean="0"/>
-              <a:t>4/22/23</a:t>
+              <a:t>4/23/2023</a:t>
             </a:fld>
             <a:endParaRPr lang="en-US" dirty="0"/>
           </a:p>
@@ -2633,7 +4363,7 @@
           <a:p>
             <a:fld id="{A4535E0C-D585-492F-8146-7493F4086301}" type="datetime1">
               <a:rPr lang="en-US" smtClean="0"/>
-              <a:t>4/22/23</a:t>
+              <a:t>4/23/2023</a:t>
             </a:fld>
             <a:endParaRPr lang="en-US"/>
           </a:p>
@@ -2796,7 +4526,7 @@
           <a:p>
             <a:fld id="{8CE48390-48B5-49AB-B019-A7C8FB8C31F6}" type="datetime1">
               <a:rPr lang="en-US" smtClean="0"/>
-              <a:t>4/22/23</a:t>
+              <a:t>4/23/2023</a:t>
             </a:fld>
             <a:endParaRPr lang="en-US"/>
           </a:p>
@@ -3325,7 +5055,7 @@
           <a:p>
             <a:fld id="{962E767E-8A14-4E70-91B9-2101CBC4D7BD}" type="datetime1">
               <a:rPr lang="en-US" smtClean="0"/>
-              <a:t>4/22/23</a:t>
+              <a:t>4/23/2023</a:t>
             </a:fld>
             <a:endParaRPr lang="en-US" dirty="0"/>
           </a:p>
@@ -3846,7 +5576,7 @@
           <a:p>
             <a:fld id="{01AF0C4B-5A4A-45CA-ABEC-10F107160D33}" type="datetime1">
               <a:rPr lang="en-US" smtClean="0"/>
-              <a:t>4/22/23</a:t>
+              <a:t>4/23/2023</a:t>
             </a:fld>
             <a:endParaRPr lang="en-US" dirty="0"/>
           </a:p>
@@ -4396,7 +6126,7 @@
           <a:p>
             <a:fld id="{6989806E-8E94-473C-AEE7-BE6F15F85533}" type="datetime1">
               <a:rPr lang="en-US" smtClean="0"/>
-              <a:t>4/22/23</a:t>
+              <a:t>4/23/2023</a:t>
             </a:fld>
             <a:endParaRPr lang="en-US" dirty="0"/>
           </a:p>
@@ -5228,6 +6958,89 @@
 </p:sld>
 </file>
 
+<file path=ppt/slides/slide10.xml><?xml version="1.0" encoding="utf-8"?>
+<p:sld xmlns:a="http://schemas.openxmlformats.org/drawingml/2006/main" xmlns:r="http://schemas.openxmlformats.org/officeDocument/2006/relationships" xmlns:p="http://schemas.openxmlformats.org/presentationml/2006/main">
+  <p:cSld>
+    <p:spTree>
+      <p:nvGrpSpPr>
+        <p:cNvPr id="1" name=""/>
+        <p:cNvGrpSpPr/>
+        <p:nvPr/>
+      </p:nvGrpSpPr>
+      <p:grpSpPr>
+        <a:xfrm>
+          <a:off x="0" y="0"/>
+          <a:ext cx="0" cy="0"/>
+          <a:chOff x="0" y="0"/>
+          <a:chExt cx="0" cy="0"/>
+        </a:xfrm>
+      </p:grpSpPr>
+      <p:sp>
+        <p:nvSpPr>
+          <p:cNvPr id="2" name="Title 1">
+            <a:extLst>
+              <a:ext uri="{FF2B5EF4-FFF2-40B4-BE49-F238E27FC236}">
+                <a16:creationId xmlns:a16="http://schemas.microsoft.com/office/drawing/2014/main" id="{E6A24E04-8590-F04C-DDF9-517A2900459A}"/>
+              </a:ext>
+            </a:extLst>
+          </p:cNvPr>
+          <p:cNvSpPr>
+            <a:spLocks noGrp="1"/>
+          </p:cNvSpPr>
+          <p:nvPr>
+            <p:ph type="title"/>
+          </p:nvPr>
+        </p:nvSpPr>
+        <p:spPr/>
+        <p:txBody>
+          <a:bodyPr/>
+          <a:lstStyle/>
+          <a:p>
+            <a:r>
+              <a:rPr lang="en-US" dirty="0"/>
+              <a:t>Conclusion</a:t>
+            </a:r>
+          </a:p>
+        </p:txBody>
+      </p:sp>
+      <p:sp>
+        <p:nvSpPr>
+          <p:cNvPr id="3" name="Content Placeholder 2">
+            <a:extLst>
+              <a:ext uri="{FF2B5EF4-FFF2-40B4-BE49-F238E27FC236}">
+                <a16:creationId xmlns:a16="http://schemas.microsoft.com/office/drawing/2014/main" id="{0EDB5184-4431-E9A8-3E13-355720B096CF}"/>
+              </a:ext>
+            </a:extLst>
+          </p:cNvPr>
+          <p:cNvSpPr>
+            <a:spLocks noGrp="1"/>
+          </p:cNvSpPr>
+          <p:nvPr>
+            <p:ph idx="1"/>
+          </p:nvPr>
+        </p:nvSpPr>
+        <p:spPr/>
+        <p:txBody>
+          <a:bodyPr/>
+          <a:lstStyle/>
+          <a:p>
+            <a:endParaRPr lang="en-US"/>
+          </a:p>
+        </p:txBody>
+      </p:sp>
+    </p:spTree>
+    <p:extLst>
+      <p:ext uri="{BB962C8B-B14F-4D97-AF65-F5344CB8AC3E}">
+        <p14:creationId xmlns:p14="http://schemas.microsoft.com/office/powerpoint/2010/main" val="970218582"/>
+      </p:ext>
+    </p:extLst>
+  </p:cSld>
+  <p:clrMapOvr>
+    <a:masterClrMapping/>
+  </p:clrMapOvr>
+</p:sld>
+</file>
+
 <file path=ppt/slides/slide2.xml><?xml version="1.0" encoding="utf-8"?>
 <p:sld xmlns:a="http://schemas.openxmlformats.org/drawingml/2006/main" xmlns:r="http://schemas.openxmlformats.org/officeDocument/2006/relationships" xmlns:p="http://schemas.openxmlformats.org/presentationml/2006/main">
   <p:cSld>
@@ -5700,7 +7513,7 @@
           <a:p>
             <a:r>
               <a:rPr lang="en-US" dirty="0"/>
-              <a:t>Regression</a:t>
+              <a:t>Goals for the Dataset</a:t>
             </a:r>
           </a:p>
         </p:txBody>
@@ -5726,7 +7539,34 @@
           <a:bodyPr/>
           <a:lstStyle/>
           <a:p>
-            <a:endParaRPr lang="en-US"/>
+            <a:pPr marL="342900" indent="-342900">
+              <a:buFont typeface="Arial" panose="020B0604020202020204" pitchFamily="34" charset="0"/>
+              <a:buChar char="•"/>
+            </a:pPr>
+            <a:r>
+              <a:rPr lang="en-US" dirty="0"/>
+              <a:t>Can we predict the quality of wine based on the given variables?</a:t>
+            </a:r>
+          </a:p>
+          <a:p>
+            <a:pPr marL="342900" indent="-342900">
+              <a:buFont typeface="Arial" panose="020B0604020202020204" pitchFamily="34" charset="0"/>
+              <a:buChar char="•"/>
+            </a:pPr>
+            <a:r>
+              <a:rPr lang="en-US" dirty="0"/>
+              <a:t>What variables are most important in determining the quality of wine?</a:t>
+            </a:r>
+          </a:p>
+          <a:p>
+            <a:pPr marL="342900" indent="-342900">
+              <a:buFont typeface="Arial" panose="020B0604020202020204" pitchFamily="34" charset="0"/>
+              <a:buChar char="•"/>
+            </a:pPr>
+            <a:r>
+              <a:rPr lang="en-US" dirty="0"/>
+              <a:t>Are the important variables different for Red and White wine?</a:t>
+            </a:r>
           </a:p>
         </p:txBody>
       </p:sp>
@@ -5765,7 +7605,7 @@
           <p:cNvPr id="2" name="Title 1">
             <a:extLst>
               <a:ext uri="{FF2B5EF4-FFF2-40B4-BE49-F238E27FC236}">
-                <a16:creationId xmlns:a16="http://schemas.microsoft.com/office/drawing/2014/main" id="{458E2A23-4EC0-DD48-D58B-C597B2314E7A}"/>
+                <a16:creationId xmlns:a16="http://schemas.microsoft.com/office/drawing/2014/main" id="{B070773E-B856-5842-3666-3731F429338A}"/>
               </a:ext>
             </a:extLst>
           </p:cNvPr>
@@ -5783,7 +7623,7 @@
           <a:p>
             <a:r>
               <a:rPr lang="en-US" dirty="0"/>
-              <a:t>Classification</a:t>
+              <a:t>Variable Selection Results</a:t>
             </a:r>
           </a:p>
         </p:txBody>
@@ -5793,7 +7633,7 @@
           <p:cNvPr id="3" name="Content Placeholder 2">
             <a:extLst>
               <a:ext uri="{FF2B5EF4-FFF2-40B4-BE49-F238E27FC236}">
-                <a16:creationId xmlns:a16="http://schemas.microsoft.com/office/drawing/2014/main" id="{CB91CDDE-6488-E61C-873F-C2946E979507}"/>
+                <a16:creationId xmlns:a16="http://schemas.microsoft.com/office/drawing/2014/main" id="{47C4855C-FF08-9E91-35EC-23C785F00B64}"/>
               </a:ext>
             </a:extLst>
           </p:cNvPr>
@@ -5809,14 +7649,426 @@
           <a:bodyPr/>
           <a:lstStyle/>
           <a:p>
-            <a:endParaRPr lang="en-US"/>
-          </a:p>
-        </p:txBody>
-      </p:sp>
+            <a:r>
+              <a:rPr lang="en-US" dirty="0"/>
+              <a:t>Using SFS variable selection, we determined the following variables were significant in determining the quality of each type of wine:</a:t>
+            </a:r>
+          </a:p>
+        </p:txBody>
+      </p:sp>
+      <p:graphicFrame>
+        <p:nvGraphicFramePr>
+          <p:cNvPr id="4" name="Table 4">
+            <a:extLst>
+              <a:ext uri="{FF2B5EF4-FFF2-40B4-BE49-F238E27FC236}">
+                <a16:creationId xmlns:a16="http://schemas.microsoft.com/office/drawing/2014/main" id="{4BF806D6-6D45-7B61-72C8-0A18A0ED9282}"/>
+              </a:ext>
+            </a:extLst>
+          </p:cNvPr>
+          <p:cNvGraphicFramePr>
+            <a:graphicFrameLocks noGrp="1"/>
+          </p:cNvGraphicFramePr>
+          <p:nvPr>
+            <p:extLst>
+              <p:ext uri="{D42A27DB-BD31-4B8C-83A1-F6EECF244321}">
+                <p14:modId xmlns:p14="http://schemas.microsoft.com/office/powerpoint/2010/main" val="4085155278"/>
+              </p:ext>
+            </p:extLst>
+          </p:nvPr>
+        </p:nvGraphicFramePr>
+        <p:xfrm>
+          <a:off x="761798" y="3776046"/>
+          <a:ext cx="10380576" cy="2225040"/>
+        </p:xfrm>
+        <a:graphic>
+          <a:graphicData uri="http://schemas.openxmlformats.org/drawingml/2006/table">
+            <a:tbl>
+              <a:tblPr firstRow="1" bandRow="1">
+                <a:tableStyleId>{5C22544A-7EE6-4342-B048-85BDC9FD1C3A}</a:tableStyleId>
+              </a:tblPr>
+              <a:tblGrid>
+                <a:gridCol w="2595144">
+                  <a:extLst>
+                    <a:ext uri="{9D8B030D-6E8A-4147-A177-3AD203B41FA5}">
+                      <a16:colId xmlns:a16="http://schemas.microsoft.com/office/drawing/2014/main" val="4041653832"/>
+                    </a:ext>
+                  </a:extLst>
+                </a:gridCol>
+                <a:gridCol w="2595144">
+                  <a:extLst>
+                    <a:ext uri="{9D8B030D-6E8A-4147-A177-3AD203B41FA5}">
+                      <a16:colId xmlns:a16="http://schemas.microsoft.com/office/drawing/2014/main" val="1983625120"/>
+                    </a:ext>
+                  </a:extLst>
+                </a:gridCol>
+                <a:gridCol w="2595144">
+                  <a:extLst>
+                    <a:ext uri="{9D8B030D-6E8A-4147-A177-3AD203B41FA5}">
+                      <a16:colId xmlns:a16="http://schemas.microsoft.com/office/drawing/2014/main" val="3509838970"/>
+                    </a:ext>
+                  </a:extLst>
+                </a:gridCol>
+                <a:gridCol w="2595144">
+                  <a:extLst>
+                    <a:ext uri="{9D8B030D-6E8A-4147-A177-3AD203B41FA5}">
+                      <a16:colId xmlns:a16="http://schemas.microsoft.com/office/drawing/2014/main" val="4266810042"/>
+                    </a:ext>
+                  </a:extLst>
+                </a:gridCol>
+              </a:tblGrid>
+              <a:tr h="370840">
+                <a:tc>
+                  <a:txBody>
+                    <a:bodyPr/>
+                    <a:lstStyle/>
+                    <a:p>
+                      <a:r>
+                        <a:rPr lang="en-US" dirty="0"/>
+                        <a:t>Red Wine Only</a:t>
+                      </a:r>
+                    </a:p>
+                  </a:txBody>
+                  <a:tcPr/>
+                </a:tc>
+                <a:tc>
+                  <a:txBody>
+                    <a:bodyPr/>
+                    <a:lstStyle/>
+                    <a:p>
+                      <a:r>
+                        <a:rPr lang="en-US" dirty="0"/>
+                        <a:t>Both Types</a:t>
+                      </a:r>
+                    </a:p>
+                  </a:txBody>
+                  <a:tcPr/>
+                </a:tc>
+                <a:tc>
+                  <a:txBody>
+                    <a:bodyPr/>
+                    <a:lstStyle/>
+                    <a:p>
+                      <a:r>
+                        <a:rPr lang="en-US" dirty="0"/>
+                        <a:t>White Wine Only</a:t>
+                      </a:r>
+                    </a:p>
+                  </a:txBody>
+                  <a:tcPr/>
+                </a:tc>
+                <a:tc>
+                  <a:txBody>
+                    <a:bodyPr/>
+                    <a:lstStyle/>
+                    <a:p>
+                      <a:r>
+                        <a:rPr lang="en-US" dirty="0"/>
+                        <a:t>Neither Type</a:t>
+                      </a:r>
+                    </a:p>
+                  </a:txBody>
+                  <a:tcPr/>
+                </a:tc>
+                <a:extLst>
+                  <a:ext uri="{0D108BD9-81ED-4DB2-BD59-A6C34878D82A}">
+                    <a16:rowId xmlns:a16="http://schemas.microsoft.com/office/drawing/2014/main" val="1363942707"/>
+                  </a:ext>
+                </a:extLst>
+              </a:tr>
+              <a:tr h="370840">
+                <a:tc>
+                  <a:txBody>
+                    <a:bodyPr/>
+                    <a:lstStyle/>
+                    <a:p>
+                      <a:r>
+                        <a:rPr lang="en-US" sz="1800" b="0" i="0" kern="1200" dirty="0">
+                          <a:solidFill>
+                            <a:schemeClr val="dk1"/>
+                          </a:solidFill>
+                          <a:effectLst/>
+                          <a:latin typeface="+mn-lt"/>
+                          <a:ea typeface="+mn-ea"/>
+                          <a:cs typeface="+mn-cs"/>
+                        </a:rPr>
+                        <a:t>Chlorides</a:t>
+                      </a:r>
+                      <a:endParaRPr lang="en-US" dirty="0"/>
+                    </a:p>
+                  </a:txBody>
+                  <a:tcPr/>
+                </a:tc>
+                <a:tc>
+                  <a:txBody>
+                    <a:bodyPr/>
+                    <a:lstStyle/>
+                    <a:p>
+                      <a:r>
+                        <a:rPr lang="en-US" dirty="0"/>
+                        <a:t>Volatile Acidity</a:t>
+                      </a:r>
+                    </a:p>
+                  </a:txBody>
+                  <a:tcPr/>
+                </a:tc>
+                <a:tc>
+                  <a:txBody>
+                    <a:bodyPr/>
+                    <a:lstStyle/>
+                    <a:p>
+                      <a:r>
+                        <a:rPr lang="en-US" sz="1800" b="0" i="0" kern="1200" dirty="0">
+                          <a:solidFill>
+                            <a:schemeClr val="dk1"/>
+                          </a:solidFill>
+                          <a:effectLst/>
+                          <a:latin typeface="+mn-lt"/>
+                          <a:ea typeface="+mn-ea"/>
+                          <a:cs typeface="+mn-cs"/>
+                        </a:rPr>
+                        <a:t>Fixed acidity</a:t>
+                      </a:r>
+                      <a:endParaRPr lang="en-US" dirty="0"/>
+                    </a:p>
+                  </a:txBody>
+                  <a:tcPr/>
+                </a:tc>
+                <a:tc>
+                  <a:txBody>
+                    <a:bodyPr/>
+                    <a:lstStyle/>
+                    <a:p>
+                      <a:r>
+                        <a:rPr lang="en-US" dirty="0"/>
+                        <a:t>Citric Acid</a:t>
+                      </a:r>
+                    </a:p>
+                  </a:txBody>
+                  <a:tcPr/>
+                </a:tc>
+                <a:extLst>
+                  <a:ext uri="{0D108BD9-81ED-4DB2-BD59-A6C34878D82A}">
+                    <a16:rowId xmlns:a16="http://schemas.microsoft.com/office/drawing/2014/main" val="3433899883"/>
+                  </a:ext>
+                </a:extLst>
+              </a:tr>
+              <a:tr h="370840">
+                <a:tc>
+                  <a:txBody>
+                    <a:bodyPr/>
+                    <a:lstStyle/>
+                    <a:p>
+                      <a:r>
+                        <a:rPr lang="en-US" dirty="0"/>
+                        <a:t>Total Sulfur Dioxide</a:t>
+                      </a:r>
+                    </a:p>
+                  </a:txBody>
+                  <a:tcPr/>
+                </a:tc>
+                <a:tc>
+                  <a:txBody>
+                    <a:bodyPr/>
+                    <a:lstStyle/>
+                    <a:p>
+                      <a:r>
+                        <a:rPr lang="en-US" dirty="0"/>
+                        <a:t>Free Sulfur Dioxide</a:t>
+                      </a:r>
+                    </a:p>
+                  </a:txBody>
+                  <a:tcPr/>
+                </a:tc>
+                <a:tc>
+                  <a:txBody>
+                    <a:bodyPr/>
+                    <a:lstStyle/>
+                    <a:p>
+                      <a:r>
+                        <a:rPr lang="en-US" dirty="0"/>
+                        <a:t>Residual Sugar</a:t>
+                      </a:r>
+                    </a:p>
+                  </a:txBody>
+                  <a:tcPr/>
+                </a:tc>
+                <a:tc>
+                  <a:txBody>
+                    <a:bodyPr/>
+                    <a:lstStyle/>
+                    <a:p>
+                      <a:endParaRPr lang="en-US" dirty="0"/>
+                    </a:p>
+                  </a:txBody>
+                  <a:tcPr/>
+                </a:tc>
+                <a:extLst>
+                  <a:ext uri="{0D108BD9-81ED-4DB2-BD59-A6C34878D82A}">
+                    <a16:rowId xmlns:a16="http://schemas.microsoft.com/office/drawing/2014/main" val="3437726293"/>
+                  </a:ext>
+                </a:extLst>
+              </a:tr>
+              <a:tr h="370840">
+                <a:tc>
+                  <a:txBody>
+                    <a:bodyPr/>
+                    <a:lstStyle/>
+                    <a:p>
+                      <a:endParaRPr lang="en-US" dirty="0"/>
+                    </a:p>
+                  </a:txBody>
+                  <a:tcPr/>
+                </a:tc>
+                <a:tc>
+                  <a:txBody>
+                    <a:bodyPr/>
+                    <a:lstStyle/>
+                    <a:p>
+                      <a:r>
+                        <a:rPr lang="en-US" dirty="0"/>
+                        <a:t>pH</a:t>
+                      </a:r>
+                    </a:p>
+                  </a:txBody>
+                  <a:tcPr/>
+                </a:tc>
+                <a:tc>
+                  <a:txBody>
+                    <a:bodyPr/>
+                    <a:lstStyle/>
+                    <a:p>
+                      <a:r>
+                        <a:rPr lang="en-US" dirty="0"/>
+                        <a:t>Density</a:t>
+                      </a:r>
+                    </a:p>
+                  </a:txBody>
+                  <a:tcPr/>
+                </a:tc>
+                <a:tc>
+                  <a:txBody>
+                    <a:bodyPr/>
+                    <a:lstStyle/>
+                    <a:p>
+                      <a:endParaRPr lang="en-US" dirty="0"/>
+                    </a:p>
+                  </a:txBody>
+                  <a:tcPr/>
+                </a:tc>
+                <a:extLst>
+                  <a:ext uri="{0D108BD9-81ED-4DB2-BD59-A6C34878D82A}">
+                    <a16:rowId xmlns:a16="http://schemas.microsoft.com/office/drawing/2014/main" val="994604888"/>
+                  </a:ext>
+                </a:extLst>
+              </a:tr>
+              <a:tr h="370840">
+                <a:tc>
+                  <a:txBody>
+                    <a:bodyPr/>
+                    <a:lstStyle/>
+                    <a:p>
+                      <a:endParaRPr lang="en-US" dirty="0"/>
+                    </a:p>
+                  </a:txBody>
+                  <a:tcPr/>
+                </a:tc>
+                <a:tc>
+                  <a:txBody>
+                    <a:bodyPr/>
+                    <a:lstStyle/>
+                    <a:p>
+                      <a:r>
+                        <a:rPr lang="en-US" dirty="0"/>
+                        <a:t>Sulphates</a:t>
+                      </a:r>
+                    </a:p>
+                  </a:txBody>
+                  <a:tcPr/>
+                </a:tc>
+                <a:tc>
+                  <a:txBody>
+                    <a:bodyPr/>
+                    <a:lstStyle/>
+                    <a:p>
+                      <a:endParaRPr lang="en-US" dirty="0"/>
+                    </a:p>
+                  </a:txBody>
+                  <a:tcPr/>
+                </a:tc>
+                <a:tc>
+                  <a:txBody>
+                    <a:bodyPr/>
+                    <a:lstStyle/>
+                    <a:p>
+                      <a:endParaRPr lang="en-US" dirty="0"/>
+                    </a:p>
+                  </a:txBody>
+                  <a:tcPr/>
+                </a:tc>
+                <a:extLst>
+                  <a:ext uri="{0D108BD9-81ED-4DB2-BD59-A6C34878D82A}">
+                    <a16:rowId xmlns:a16="http://schemas.microsoft.com/office/drawing/2014/main" val="3286593713"/>
+                  </a:ext>
+                </a:extLst>
+              </a:tr>
+              <a:tr h="370840">
+                <a:tc>
+                  <a:txBody>
+                    <a:bodyPr/>
+                    <a:lstStyle/>
+                    <a:p>
+                      <a:endParaRPr lang="en-US" dirty="0"/>
+                    </a:p>
+                  </a:txBody>
+                  <a:tcPr/>
+                </a:tc>
+                <a:tc>
+                  <a:txBody>
+                    <a:bodyPr/>
+                    <a:lstStyle/>
+                    <a:p>
+                      <a:r>
+                        <a:rPr lang="en-US" dirty="0"/>
+                        <a:t>Alcohol</a:t>
+                      </a:r>
+                    </a:p>
+                  </a:txBody>
+                  <a:tcPr/>
+                </a:tc>
+                <a:tc>
+                  <a:txBody>
+                    <a:bodyPr/>
+                    <a:lstStyle/>
+                    <a:p>
+                      <a:endParaRPr lang="en-US" dirty="0"/>
+                    </a:p>
+                  </a:txBody>
+                  <a:tcPr/>
+                </a:tc>
+                <a:tc>
+                  <a:txBody>
+                    <a:bodyPr/>
+                    <a:lstStyle/>
+                    <a:p>
+                      <a:endParaRPr lang="en-US" dirty="0"/>
+                    </a:p>
+                  </a:txBody>
+                  <a:tcPr/>
+                </a:tc>
+                <a:extLst>
+                  <a:ext uri="{0D108BD9-81ED-4DB2-BD59-A6C34878D82A}">
+                    <a16:rowId xmlns:a16="http://schemas.microsoft.com/office/drawing/2014/main" val="2007140302"/>
+                  </a:ext>
+                </a:extLst>
+              </a:tr>
+            </a:tbl>
+          </a:graphicData>
+        </a:graphic>
+      </p:graphicFrame>
     </p:spTree>
     <p:extLst>
       <p:ext uri="{BB962C8B-B14F-4D97-AF65-F5344CB8AC3E}">
-        <p14:creationId xmlns:p14="http://schemas.microsoft.com/office/powerpoint/2010/main" val="2625553828"/>
+        <p14:creationId xmlns:p14="http://schemas.microsoft.com/office/powerpoint/2010/main" val="2391416589"/>
       </p:ext>
     </p:extLst>
   </p:cSld>
@@ -5848,7 +8100,7 @@
           <p:cNvPr id="2" name="Title 1">
             <a:extLst>
               <a:ext uri="{FF2B5EF4-FFF2-40B4-BE49-F238E27FC236}">
-                <a16:creationId xmlns:a16="http://schemas.microsoft.com/office/drawing/2014/main" id="{93A61788-529C-EFC1-BCAC-7334FE1E783F}"/>
+                <a16:creationId xmlns:a16="http://schemas.microsoft.com/office/drawing/2014/main" id="{B813E60A-AD1E-D0C7-7401-421FF53CE0DD}"/>
               </a:ext>
             </a:extLst>
           </p:cNvPr>
@@ -5866,40 +8118,158 @@
           <a:p>
             <a:r>
               <a:rPr lang="en-US" dirty="0"/>
-              <a:t>Comparison</a:t>
-            </a:r>
-          </a:p>
-        </p:txBody>
-      </p:sp>
+              <a:t>Regression Results</a:t>
+            </a:r>
+          </a:p>
+        </p:txBody>
+      </p:sp>
+      <p:graphicFrame>
+        <p:nvGraphicFramePr>
+          <p:cNvPr id="4" name="Content Placeholder 3">
+            <a:extLst>
+              <a:ext uri="{FF2B5EF4-FFF2-40B4-BE49-F238E27FC236}">
+                <a16:creationId xmlns:a16="http://schemas.microsoft.com/office/drawing/2014/main" id="{E5BFEC1D-1294-4CE7-B9B1-D2F27165305E}"/>
+              </a:ext>
+            </a:extLst>
+          </p:cNvPr>
+          <p:cNvGraphicFramePr>
+            <a:graphicFrameLocks noGrp="1"/>
+          </p:cNvGraphicFramePr>
+          <p:nvPr>
+            <p:ph idx="1"/>
+            <p:extLst>
+              <p:ext uri="{D42A27DB-BD31-4B8C-83A1-F6EECF244321}">
+                <p14:modId xmlns:p14="http://schemas.microsoft.com/office/powerpoint/2010/main" val="1060322578"/>
+              </p:ext>
+            </p:extLst>
+          </p:nvPr>
+        </p:nvGraphicFramePr>
+        <p:xfrm>
+          <a:off x="762001" y="2749551"/>
+          <a:ext cx="3872144" cy="3002756"/>
+        </p:xfrm>
+        <a:graphic>
+          <a:graphicData uri="http://schemas.openxmlformats.org/drawingml/2006/chart">
+            <c:chart xmlns:c="http://schemas.openxmlformats.org/drawingml/2006/chart" xmlns:r="http://schemas.openxmlformats.org/officeDocument/2006/relationships" r:id="rId2"/>
+          </a:graphicData>
+        </a:graphic>
+      </p:graphicFrame>
+      <p:graphicFrame>
+        <p:nvGraphicFramePr>
+          <p:cNvPr id="5" name="Chart 4">
+            <a:extLst>
+              <a:ext uri="{FF2B5EF4-FFF2-40B4-BE49-F238E27FC236}">
+                <a16:creationId xmlns:a16="http://schemas.microsoft.com/office/drawing/2014/main" id="{B7217A29-6965-107E-4189-FD8ED1CF082A}"/>
+              </a:ext>
+            </a:extLst>
+          </p:cNvPr>
+          <p:cNvGraphicFramePr>
+            <a:graphicFrameLocks/>
+          </p:cNvGraphicFramePr>
+          <p:nvPr>
+            <p:extLst>
+              <p:ext uri="{D42A27DB-BD31-4B8C-83A1-F6EECF244321}">
+                <p14:modId xmlns:p14="http://schemas.microsoft.com/office/powerpoint/2010/main" val="1085295637"/>
+              </p:ext>
+            </p:extLst>
+          </p:nvPr>
+        </p:nvGraphicFramePr>
+        <p:xfrm>
+          <a:off x="6096000" y="2749550"/>
+          <a:ext cx="3872144" cy="3002756"/>
+        </p:xfrm>
+        <a:graphic>
+          <a:graphicData uri="http://schemas.openxmlformats.org/drawingml/2006/chart">
+            <c:chart xmlns:c="http://schemas.openxmlformats.org/drawingml/2006/chart" xmlns:r="http://schemas.openxmlformats.org/officeDocument/2006/relationships" r:id="rId3"/>
+          </a:graphicData>
+        </a:graphic>
+      </p:graphicFrame>
       <p:sp>
         <p:nvSpPr>
-          <p:cNvPr id="3" name="Content Placeholder 2">
-            <a:extLst>
-              <a:ext uri="{FF2B5EF4-FFF2-40B4-BE49-F238E27FC236}">
-                <a16:creationId xmlns:a16="http://schemas.microsoft.com/office/drawing/2014/main" id="{C17DBF7A-6F8E-1914-4278-74227E17BB5E}"/>
-              </a:ext>
-            </a:extLst>
-          </p:cNvPr>
-          <p:cNvSpPr>
-            <a:spLocks noGrp="1"/>
-          </p:cNvSpPr>
-          <p:nvPr>
-            <p:ph idx="1"/>
-          </p:nvPr>
-        </p:nvSpPr>
-        <p:spPr/>
-        <p:txBody>
-          <a:bodyPr/>
+          <p:cNvPr id="6" name="TextBox 5">
+            <a:extLst>
+              <a:ext uri="{FF2B5EF4-FFF2-40B4-BE49-F238E27FC236}">
+                <a16:creationId xmlns:a16="http://schemas.microsoft.com/office/drawing/2014/main" id="{FC84DC7E-20B8-BCD6-C504-8DD63A674070}"/>
+              </a:ext>
+            </a:extLst>
+          </p:cNvPr>
+          <p:cNvSpPr txBox="1"/>
+          <p:nvPr/>
+        </p:nvSpPr>
+        <p:spPr>
+          <a:xfrm>
+            <a:off x="970961" y="5752306"/>
+            <a:ext cx="3223967" cy="646331"/>
+          </a:xfrm>
+          <a:prstGeom prst="rect">
+            <a:avLst/>
+          </a:prstGeom>
+          <a:noFill/>
+        </p:spPr>
+        <p:txBody>
+          <a:bodyPr wrap="square" rtlCol="0">
+            <a:spAutoFit/>
+          </a:bodyPr>
           <a:lstStyle/>
           <a:p>
-            <a:endParaRPr lang="en-US"/>
+            <a:r>
+              <a:rPr lang="en-US" dirty="0"/>
+              <a:t>1225 Test Data Points</a:t>
+            </a:r>
+          </a:p>
+          <a:p>
+            <a:r>
+              <a:rPr lang="en-US" dirty="0"/>
+              <a:t>52% Correct, 95% within ±1</a:t>
+            </a:r>
+          </a:p>
+        </p:txBody>
+      </p:sp>
+      <p:sp>
+        <p:nvSpPr>
+          <p:cNvPr id="8" name="TextBox 7">
+            <a:extLst>
+              <a:ext uri="{FF2B5EF4-FFF2-40B4-BE49-F238E27FC236}">
+                <a16:creationId xmlns:a16="http://schemas.microsoft.com/office/drawing/2014/main" id="{0F530E82-1372-B5FE-3088-EDBC1A495AF1}"/>
+              </a:ext>
+            </a:extLst>
+          </p:cNvPr>
+          <p:cNvSpPr txBox="1"/>
+          <p:nvPr/>
+        </p:nvSpPr>
+        <p:spPr>
+          <a:xfrm>
+            <a:off x="6096000" y="5752306"/>
+            <a:ext cx="3223967" cy="646331"/>
+          </a:xfrm>
+          <a:prstGeom prst="rect">
+            <a:avLst/>
+          </a:prstGeom>
+          <a:noFill/>
+        </p:spPr>
+        <p:txBody>
+          <a:bodyPr wrap="square" rtlCol="0">
+            <a:spAutoFit/>
+          </a:bodyPr>
+          <a:lstStyle/>
+          <a:p>
+            <a:r>
+              <a:rPr lang="en-US" dirty="0"/>
+              <a:t>402 Test Data Points</a:t>
+            </a:r>
+          </a:p>
+          <a:p>
+            <a:r>
+              <a:rPr lang="en-US" dirty="0"/>
+              <a:t>61% Correct, 97% within ±1</a:t>
+            </a:r>
           </a:p>
         </p:txBody>
       </p:sp>
     </p:spTree>
     <p:extLst>
       <p:ext uri="{BB962C8B-B14F-4D97-AF65-F5344CB8AC3E}">
-        <p14:creationId xmlns:p14="http://schemas.microsoft.com/office/powerpoint/2010/main" val="3966302403"/>
+        <p14:creationId xmlns:p14="http://schemas.microsoft.com/office/powerpoint/2010/main" val="209354220"/>
       </p:ext>
     </p:extLst>
   </p:cSld>
@@ -5931,7 +8301,7 @@
           <p:cNvPr id="2" name="Title 1">
             <a:extLst>
               <a:ext uri="{FF2B5EF4-FFF2-40B4-BE49-F238E27FC236}">
-                <a16:creationId xmlns:a16="http://schemas.microsoft.com/office/drawing/2014/main" id="{E6A24E04-8590-F04C-DDF9-517A2900459A}"/>
+                <a16:creationId xmlns:a16="http://schemas.microsoft.com/office/drawing/2014/main" id="{458E2A23-4EC0-DD48-D58B-C597B2314E7A}"/>
               </a:ext>
             </a:extLst>
           </p:cNvPr>
@@ -5949,7 +8319,7 @@
           <a:p>
             <a:r>
               <a:rPr lang="en-US" dirty="0"/>
-              <a:t>Conclusion</a:t>
+              <a:t>Classification</a:t>
             </a:r>
           </a:p>
         </p:txBody>
@@ -5959,7 +8329,7 @@
           <p:cNvPr id="3" name="Content Placeholder 2">
             <a:extLst>
               <a:ext uri="{FF2B5EF4-FFF2-40B4-BE49-F238E27FC236}">
-                <a16:creationId xmlns:a16="http://schemas.microsoft.com/office/drawing/2014/main" id="{0EDB5184-4431-E9A8-3E13-355720B096CF}"/>
+                <a16:creationId xmlns:a16="http://schemas.microsoft.com/office/drawing/2014/main" id="{CB91CDDE-6488-E61C-873F-C2946E979507}"/>
               </a:ext>
             </a:extLst>
           </p:cNvPr>
@@ -5982,7 +8352,90 @@
     </p:spTree>
     <p:extLst>
       <p:ext uri="{BB962C8B-B14F-4D97-AF65-F5344CB8AC3E}">
-        <p14:creationId xmlns:p14="http://schemas.microsoft.com/office/powerpoint/2010/main" val="970218582"/>
+        <p14:creationId xmlns:p14="http://schemas.microsoft.com/office/powerpoint/2010/main" val="2625553828"/>
+      </p:ext>
+    </p:extLst>
+  </p:cSld>
+  <p:clrMapOvr>
+    <a:masterClrMapping/>
+  </p:clrMapOvr>
+</p:sld>
+</file>
+
+<file path=ppt/slides/slide9.xml><?xml version="1.0" encoding="utf-8"?>
+<p:sld xmlns:a="http://schemas.openxmlformats.org/drawingml/2006/main" xmlns:r="http://schemas.openxmlformats.org/officeDocument/2006/relationships" xmlns:p="http://schemas.openxmlformats.org/presentationml/2006/main">
+  <p:cSld>
+    <p:spTree>
+      <p:nvGrpSpPr>
+        <p:cNvPr id="1" name=""/>
+        <p:cNvGrpSpPr/>
+        <p:nvPr/>
+      </p:nvGrpSpPr>
+      <p:grpSpPr>
+        <a:xfrm>
+          <a:off x="0" y="0"/>
+          <a:ext cx="0" cy="0"/>
+          <a:chOff x="0" y="0"/>
+          <a:chExt cx="0" cy="0"/>
+        </a:xfrm>
+      </p:grpSpPr>
+      <p:sp>
+        <p:nvSpPr>
+          <p:cNvPr id="2" name="Title 1">
+            <a:extLst>
+              <a:ext uri="{FF2B5EF4-FFF2-40B4-BE49-F238E27FC236}">
+                <a16:creationId xmlns:a16="http://schemas.microsoft.com/office/drawing/2014/main" id="{93A61788-529C-EFC1-BCAC-7334FE1E783F}"/>
+              </a:ext>
+            </a:extLst>
+          </p:cNvPr>
+          <p:cNvSpPr>
+            <a:spLocks noGrp="1"/>
+          </p:cNvSpPr>
+          <p:nvPr>
+            <p:ph type="title"/>
+          </p:nvPr>
+        </p:nvSpPr>
+        <p:spPr/>
+        <p:txBody>
+          <a:bodyPr/>
+          <a:lstStyle/>
+          <a:p>
+            <a:r>
+              <a:rPr lang="en-US" dirty="0"/>
+              <a:t>Comparison</a:t>
+            </a:r>
+          </a:p>
+        </p:txBody>
+      </p:sp>
+      <p:sp>
+        <p:nvSpPr>
+          <p:cNvPr id="3" name="Content Placeholder 2">
+            <a:extLst>
+              <a:ext uri="{FF2B5EF4-FFF2-40B4-BE49-F238E27FC236}">
+                <a16:creationId xmlns:a16="http://schemas.microsoft.com/office/drawing/2014/main" id="{C17DBF7A-6F8E-1914-4278-74227E17BB5E}"/>
+              </a:ext>
+            </a:extLst>
+          </p:cNvPr>
+          <p:cNvSpPr>
+            <a:spLocks noGrp="1"/>
+          </p:cNvSpPr>
+          <p:nvPr>
+            <p:ph idx="1"/>
+          </p:nvPr>
+        </p:nvSpPr>
+        <p:spPr/>
+        <p:txBody>
+          <a:bodyPr/>
+          <a:lstStyle/>
+          <a:p>
+            <a:endParaRPr lang="en-US"/>
+          </a:p>
+        </p:txBody>
+      </p:sp>
+    </p:spTree>
+    <p:extLst>
+      <p:ext uri="{BB962C8B-B14F-4D97-AF65-F5344CB8AC3E}">
+        <p14:creationId xmlns:p14="http://schemas.microsoft.com/office/powerpoint/2010/main" val="3966302403"/>
       </p:ext>
     </p:extLst>
   </p:cSld>

</xml_diff>

<commit_message>
Payton Commit 4/24 2
</commit_message>
<xml_diff>
--- a/wine_presentation.pptx
+++ b/wine_presentation.pptx
@@ -13,8 +13,9 @@
     <p:sldId id="265" r:id="rId7"/>
     <p:sldId id="266" r:id="rId8"/>
     <p:sldId id="260" r:id="rId9"/>
-    <p:sldId id="261" r:id="rId10"/>
-    <p:sldId id="262" r:id="rId11"/>
+    <p:sldId id="267" r:id="rId10"/>
+    <p:sldId id="261" r:id="rId11"/>
+    <p:sldId id="262" r:id="rId12"/>
   </p:sldIdLst>
   <p:sldSz cx="12192000" cy="6858000"/>
   <p:notesSz cx="6858000" cy="9144000"/>
@@ -1850,7 +1851,7 @@
 </file>
 
 <file path=ppt/slideLayouts/slideLayout1.xml><?xml version="1.0" encoding="utf-8"?>
-<p:sldLayout xmlns:a="http://schemas.openxmlformats.org/drawingml/2006/main" xmlns:r="http://schemas.openxmlformats.org/officeDocument/2006/relationships" xmlns:p="http://schemas.openxmlformats.org/presentationml/2006/main" showMasterSp="0" type="title" preserve="1">
+<p:sldLayout xmlns:a="http://schemas.openxmlformats.org/drawingml/2006/main" xmlns:r="http://schemas.openxmlformats.org/officeDocument/2006/relationships" xmlns:p="http://schemas.openxmlformats.org/presentationml/2006/main" type="title" preserve="1">
   <p:cSld name="Title Slide">
     <p:spTree>
       <p:nvGrpSpPr>
@@ -2106,7 +2107,7 @@
           <a:p>
             <a:fld id="{3341EE12-F28E-4B03-A404-A8FCAE0F6316}" type="datetime1">
               <a:rPr lang="en-US" smtClean="0"/>
-              <a:t>4/23/2023</a:t>
+              <a:t>4/24/2023</a:t>
             </a:fld>
             <a:endParaRPr lang="en-US" dirty="0"/>
           </a:p>
@@ -2391,7 +2392,7 @@
           <a:p>
             <a:fld id="{B68B8189-0D9C-48A6-9FA3-862227B094CE}" type="datetime1">
               <a:rPr lang="en-US" smtClean="0"/>
-              <a:t>4/23/2023</a:t>
+              <a:t>4/24/2023</a:t>
             </a:fld>
             <a:endParaRPr lang="en-US"/>
           </a:p>
@@ -2465,7 +2466,7 @@
 </file>
 
 <file path=ppt/slideLayouts/slideLayout11.xml><?xml version="1.0" encoding="utf-8"?>
-<p:sldLayout xmlns:a="http://schemas.openxmlformats.org/drawingml/2006/main" xmlns:r="http://schemas.openxmlformats.org/officeDocument/2006/relationships" xmlns:p="http://schemas.openxmlformats.org/presentationml/2006/main" showMasterSp="0" type="vertTitleAndTx" preserve="1">
+<p:sldLayout xmlns:a="http://schemas.openxmlformats.org/drawingml/2006/main" xmlns:r="http://schemas.openxmlformats.org/officeDocument/2006/relationships" xmlns:p="http://schemas.openxmlformats.org/presentationml/2006/main" type="vertTitleAndTx" preserve="1">
   <p:cSld name="Vertical Title and Text">
     <p:spTree>
       <p:nvGrpSpPr>
@@ -2755,7 +2756,7 @@
           <a:p>
             <a:fld id="{26ADDCAE-6443-42C3-9C19-F95985500186}" type="datetime1">
               <a:rPr lang="en-US" smtClean="0"/>
-              <a:t>4/23/2023</a:t>
+              <a:t>4/24/2023</a:t>
             </a:fld>
             <a:endParaRPr lang="en-US" dirty="0"/>
           </a:p>
@@ -3017,7 +3018,7 @@
           <a:p>
             <a:fld id="{1962799E-EB8E-4038-8063-81BB57C732D4}" type="datetime1">
               <a:rPr lang="en-US" smtClean="0"/>
-              <a:t>4/23/2023</a:t>
+              <a:t>4/24/2023</a:t>
             </a:fld>
             <a:endParaRPr lang="en-US"/>
           </a:p>
@@ -3091,7 +3092,7 @@
 </file>
 
 <file path=ppt/slideLayouts/slideLayout3.xml><?xml version="1.0" encoding="utf-8"?>
-<p:sldLayout xmlns:a="http://schemas.openxmlformats.org/drawingml/2006/main" xmlns:r="http://schemas.openxmlformats.org/officeDocument/2006/relationships" xmlns:p="http://schemas.openxmlformats.org/presentationml/2006/main" showMasterSp="0" type="secHead" preserve="1">
+<p:sldLayout xmlns:a="http://schemas.openxmlformats.org/drawingml/2006/main" xmlns:r="http://schemas.openxmlformats.org/officeDocument/2006/relationships" xmlns:p="http://schemas.openxmlformats.org/presentationml/2006/main" type="secHead" preserve="1">
   <p:cSld name="Section Header">
     <p:spTree>
       <p:nvGrpSpPr>
@@ -3447,7 +3448,7 @@
           <a:p>
             <a:fld id="{217A73C3-B243-44D3-809D-EF8FDFBD85D4}" type="datetime1">
               <a:rPr lang="en-US" smtClean="0"/>
-              <a:t>4/23/2023</a:t>
+              <a:t>4/24/2023</a:t>
             </a:fld>
             <a:endParaRPr lang="en-US" dirty="0"/>
           </a:p>
@@ -3778,7 +3779,7 @@
           <a:p>
             <a:fld id="{C9B6D3E3-28E2-4380-A113-67698215C5F8}" type="datetime1">
               <a:rPr lang="en-US" smtClean="0"/>
-              <a:t>4/23/2023</a:t>
+              <a:t>4/24/2023</a:t>
             </a:fld>
             <a:endParaRPr lang="en-US" dirty="0"/>
           </a:p>
@@ -4211,7 +4212,7 @@
           <a:p>
             <a:fld id="{A9EFCB61-04AD-47C9-BF79-2BD8B9CEC07A}" type="datetime1">
               <a:rPr lang="en-US" smtClean="0"/>
-              <a:t>4/23/2023</a:t>
+              <a:t>4/24/2023</a:t>
             </a:fld>
             <a:endParaRPr lang="en-US" dirty="0"/>
           </a:p>
@@ -4363,7 +4364,7 @@
           <a:p>
             <a:fld id="{A4535E0C-D585-492F-8146-7493F4086301}" type="datetime1">
               <a:rPr lang="en-US" smtClean="0"/>
-              <a:t>4/23/2023</a:t>
+              <a:t>4/24/2023</a:t>
             </a:fld>
             <a:endParaRPr lang="en-US"/>
           </a:p>
@@ -4437,7 +4438,7 @@
 </file>
 
 <file path=ppt/slideLayouts/slideLayout7.xml><?xml version="1.0" encoding="utf-8"?>
-<p:sldLayout xmlns:a="http://schemas.openxmlformats.org/drawingml/2006/main" xmlns:r="http://schemas.openxmlformats.org/officeDocument/2006/relationships" xmlns:p="http://schemas.openxmlformats.org/presentationml/2006/main" showMasterSp="0" type="blank" preserve="1">
+<p:sldLayout xmlns:a="http://schemas.openxmlformats.org/drawingml/2006/main" xmlns:r="http://schemas.openxmlformats.org/officeDocument/2006/relationships" xmlns:p="http://schemas.openxmlformats.org/presentationml/2006/main" type="blank" preserve="1">
   <p:cSld name="Blank">
     <p:spTree>
       <p:nvGrpSpPr>
@@ -4526,7 +4527,7 @@
           <a:p>
             <a:fld id="{8CE48390-48B5-49AB-B019-A7C8FB8C31F6}" type="datetime1">
               <a:rPr lang="en-US" smtClean="0"/>
-              <a:t>4/23/2023</a:t>
+              <a:t>4/24/2023</a:t>
             </a:fld>
             <a:endParaRPr lang="en-US"/>
           </a:p>
@@ -4643,7 +4644,7 @@
 </file>
 
 <file path=ppt/slideLayouts/slideLayout8.xml><?xml version="1.0" encoding="utf-8"?>
-<p:sldLayout xmlns:a="http://schemas.openxmlformats.org/drawingml/2006/main" xmlns:r="http://schemas.openxmlformats.org/officeDocument/2006/relationships" xmlns:p="http://schemas.openxmlformats.org/presentationml/2006/main" showMasterSp="0" type="objTx" preserve="1">
+<p:sldLayout xmlns:a="http://schemas.openxmlformats.org/drawingml/2006/main" xmlns:r="http://schemas.openxmlformats.org/officeDocument/2006/relationships" xmlns:p="http://schemas.openxmlformats.org/presentationml/2006/main" type="objTx" preserve="1">
   <p:cSld name="Content with Caption">
     <p:spTree>
       <p:nvGrpSpPr>
@@ -5055,7 +5056,7 @@
           <a:p>
             <a:fld id="{962E767E-8A14-4E70-91B9-2101CBC4D7BD}" type="datetime1">
               <a:rPr lang="en-US" smtClean="0"/>
-              <a:t>4/23/2023</a:t>
+              <a:t>4/24/2023</a:t>
             </a:fld>
             <a:endParaRPr lang="en-US" dirty="0"/>
           </a:p>
@@ -5229,7 +5230,7 @@
 </file>
 
 <file path=ppt/slideLayouts/slideLayout9.xml><?xml version="1.0" encoding="utf-8"?>
-<p:sldLayout xmlns:a="http://schemas.openxmlformats.org/drawingml/2006/main" xmlns:r="http://schemas.openxmlformats.org/officeDocument/2006/relationships" xmlns:p="http://schemas.openxmlformats.org/presentationml/2006/main" showMasterSp="0" type="picTx" preserve="1">
+<p:sldLayout xmlns:a="http://schemas.openxmlformats.org/drawingml/2006/main" xmlns:r="http://schemas.openxmlformats.org/officeDocument/2006/relationships" xmlns:p="http://schemas.openxmlformats.org/presentationml/2006/main" type="picTx" preserve="1">
   <p:cSld name="Picture with Caption">
     <p:spTree>
       <p:nvGrpSpPr>
@@ -5576,7 +5577,7 @@
           <a:p>
             <a:fld id="{01AF0C4B-5A4A-45CA-ABEC-10F107160D33}" type="datetime1">
               <a:rPr lang="en-US" smtClean="0"/>
-              <a:t>4/23/2023</a:t>
+              <a:t>4/24/2023</a:t>
             </a:fld>
             <a:endParaRPr lang="en-US" dirty="0"/>
           </a:p>
@@ -5753,9 +5754,12 @@
 <p:sldMaster xmlns:a="http://schemas.openxmlformats.org/drawingml/2006/main" xmlns:r="http://schemas.openxmlformats.org/officeDocument/2006/relationships" xmlns:p="http://schemas.openxmlformats.org/presentationml/2006/main">
   <p:cSld>
     <p:bg>
-      <p:bgRef idx="1001">
-        <a:schemeClr val="bg1"/>
-      </p:bgRef>
+      <p:bgPr>
+        <a:solidFill>
+          <a:srgbClr val="7030A0"/>
+        </a:solidFill>
+        <a:effectLst/>
+      </p:bgPr>
     </p:bg>
     <p:spTree>
       <p:nvGrpSpPr>
@@ -6126,7 +6130,7 @@
           <a:p>
             <a:fld id="{6989806E-8E94-473C-AEE7-BE6F15F85533}" type="datetime1">
               <a:rPr lang="en-US" smtClean="0"/>
-              <a:t>4/23/2023</a:t>
+              <a:t>4/24/2023</a:t>
             </a:fld>
             <a:endParaRPr lang="en-US" dirty="0"/>
           </a:p>
@@ -6616,14 +6620,6 @@
 <file path=ppt/slides/slide1.xml><?xml version="1.0" encoding="utf-8"?>
 <p:sld xmlns:a="http://schemas.openxmlformats.org/drawingml/2006/main" xmlns:r="http://schemas.openxmlformats.org/officeDocument/2006/relationships" xmlns:p="http://schemas.openxmlformats.org/presentationml/2006/main">
   <p:cSld>
-    <p:bg>
-      <p:bgPr>
-        <a:solidFill>
-          <a:schemeClr val="bg1"/>
-        </a:solidFill>
-        <a:effectLst/>
-      </p:bgPr>
-    </p:bg>
     <p:spTree>
       <p:nvGrpSpPr>
         <p:cNvPr id="1" name=""/>
@@ -6980,6 +6976,90 @@
           <p:cNvPr id="2" name="Title 1">
             <a:extLst>
               <a:ext uri="{FF2B5EF4-FFF2-40B4-BE49-F238E27FC236}">
+                <a16:creationId xmlns:a16="http://schemas.microsoft.com/office/drawing/2014/main" id="{93A61788-529C-EFC1-BCAC-7334FE1E783F}"/>
+              </a:ext>
+            </a:extLst>
+          </p:cNvPr>
+          <p:cNvSpPr>
+            <a:spLocks noGrp="1"/>
+          </p:cNvSpPr>
+          <p:nvPr>
+            <p:ph type="title"/>
+          </p:nvPr>
+        </p:nvSpPr>
+        <p:spPr/>
+        <p:txBody>
+          <a:bodyPr/>
+          <a:lstStyle/>
+          <a:p>
+            <a:r>
+              <a:rPr lang="en-US"/>
+              <a:t>Comparison</a:t>
+            </a:r>
+            <a:endParaRPr lang="en-US" dirty="0"/>
+          </a:p>
+        </p:txBody>
+      </p:sp>
+      <p:sp>
+        <p:nvSpPr>
+          <p:cNvPr id="3" name="Content Placeholder 2">
+            <a:extLst>
+              <a:ext uri="{FF2B5EF4-FFF2-40B4-BE49-F238E27FC236}">
+                <a16:creationId xmlns:a16="http://schemas.microsoft.com/office/drawing/2014/main" id="{C17DBF7A-6F8E-1914-4278-74227E17BB5E}"/>
+              </a:ext>
+            </a:extLst>
+          </p:cNvPr>
+          <p:cNvSpPr>
+            <a:spLocks noGrp="1"/>
+          </p:cNvSpPr>
+          <p:nvPr>
+            <p:ph idx="1"/>
+          </p:nvPr>
+        </p:nvSpPr>
+        <p:spPr/>
+        <p:txBody>
+          <a:bodyPr/>
+          <a:lstStyle/>
+          <a:p>
+            <a:endParaRPr lang="en-US"/>
+          </a:p>
+        </p:txBody>
+      </p:sp>
+    </p:spTree>
+    <p:extLst>
+      <p:ext uri="{BB962C8B-B14F-4D97-AF65-F5344CB8AC3E}">
+        <p14:creationId xmlns:p14="http://schemas.microsoft.com/office/powerpoint/2010/main" val="3966302403"/>
+      </p:ext>
+    </p:extLst>
+  </p:cSld>
+  <p:clrMapOvr>
+    <a:masterClrMapping/>
+  </p:clrMapOvr>
+</p:sld>
+</file>
+
+<file path=ppt/slides/slide11.xml><?xml version="1.0" encoding="utf-8"?>
+<p:sld xmlns:a="http://schemas.openxmlformats.org/drawingml/2006/main" xmlns:r="http://schemas.openxmlformats.org/officeDocument/2006/relationships" xmlns:p="http://schemas.openxmlformats.org/presentationml/2006/main">
+  <p:cSld>
+    <p:spTree>
+      <p:nvGrpSpPr>
+        <p:cNvPr id="1" name=""/>
+        <p:cNvGrpSpPr/>
+        <p:nvPr/>
+      </p:nvGrpSpPr>
+      <p:grpSpPr>
+        <a:xfrm>
+          <a:off x="0" y="0"/>
+          <a:ext cx="0" cy="0"/>
+          <a:chOff x="0" y="0"/>
+          <a:chExt cx="0" cy="0"/>
+        </a:xfrm>
+      </p:grpSpPr>
+      <p:sp>
+        <p:nvSpPr>
+          <p:cNvPr id="2" name="Title 1">
+            <a:extLst>
+              <a:ext uri="{FF2B5EF4-FFF2-40B4-BE49-F238E27FC236}">
                 <a16:creationId xmlns:a16="http://schemas.microsoft.com/office/drawing/2014/main" id="{E6A24E04-8590-F04C-DDF9-517A2900459A}"/>
               </a:ext>
             </a:extLst>
@@ -7150,8 +7230,16 @@
 </file>
 
 <file path=ppt/slides/slide3.xml><?xml version="1.0" encoding="utf-8"?>
-<p:sld xmlns:a="http://schemas.openxmlformats.org/drawingml/2006/main" xmlns:r="http://schemas.openxmlformats.org/officeDocument/2006/relationships" xmlns:p="http://schemas.openxmlformats.org/presentationml/2006/main">
+<p:sld xmlns:a="http://schemas.openxmlformats.org/drawingml/2006/main" xmlns:r="http://schemas.openxmlformats.org/officeDocument/2006/relationships" xmlns:p="http://schemas.openxmlformats.org/presentationml/2006/main" showMasterSp="0">
   <p:cSld>
+    <p:bg>
+      <p:bgPr>
+        <a:solidFill>
+          <a:srgbClr val="FFFFCC"/>
+        </a:solidFill>
+        <a:effectLst/>
+      </p:bgPr>
+    </p:bg>
     <p:spTree>
       <p:nvGrpSpPr>
         <p:cNvPr id="1" name=""/>
@@ -7317,8 +7405,16 @@
 </file>
 
 <file path=ppt/slides/slide4.xml><?xml version="1.0" encoding="utf-8"?>
-<p:sld xmlns:a="http://schemas.openxmlformats.org/drawingml/2006/main" xmlns:r="http://schemas.openxmlformats.org/officeDocument/2006/relationships" xmlns:p="http://schemas.openxmlformats.org/presentationml/2006/main">
+<p:sld xmlns:a="http://schemas.openxmlformats.org/drawingml/2006/main" xmlns:r="http://schemas.openxmlformats.org/officeDocument/2006/relationships" xmlns:p="http://schemas.openxmlformats.org/presentationml/2006/main" showMasterSp="0">
   <p:cSld>
+    <p:bg>
+      <p:bgPr>
+        <a:solidFill>
+          <a:srgbClr val="660033"/>
+        </a:solidFill>
+        <a:effectLst/>
+      </p:bgPr>
+    </p:bg>
     <p:spTree>
       <p:nvGrpSpPr>
         <p:cNvPr id="1" name=""/>
@@ -8280,8 +8376,16 @@
 </file>
 
 <file path=ppt/slides/slide8.xml><?xml version="1.0" encoding="utf-8"?>
-<p:sld xmlns:a="http://schemas.openxmlformats.org/drawingml/2006/main" xmlns:r="http://schemas.openxmlformats.org/officeDocument/2006/relationships" xmlns:p="http://schemas.openxmlformats.org/presentationml/2006/main">
+<p:sld xmlns:a="http://schemas.openxmlformats.org/drawingml/2006/main" xmlns:r="http://schemas.openxmlformats.org/officeDocument/2006/relationships" xmlns:p="http://schemas.openxmlformats.org/presentationml/2006/main" showMasterSp="0">
   <p:cSld>
+    <p:bg>
+      <p:bgPr>
+        <a:solidFill>
+          <a:srgbClr val="FFFFCC"/>
+        </a:solidFill>
+        <a:effectLst/>
+      </p:bgPr>
+    </p:bg>
     <p:spTree>
       <p:nvGrpSpPr>
         <p:cNvPr id="1" name=""/>
@@ -8296,6 +8400,517 @@
           <a:chExt cx="0" cy="0"/>
         </a:xfrm>
       </p:grpSpPr>
+      <p:sp useBgFill="1">
+        <p:nvSpPr>
+          <p:cNvPr id="12" name="Rectangle 11">
+            <a:extLst>
+              <a:ext uri="{FF2B5EF4-FFF2-40B4-BE49-F238E27FC236}">
+                <a16:creationId xmlns:a16="http://schemas.microsoft.com/office/drawing/2014/main" id="{D284A420-F50C-4C2C-B88E-E6F4EF504B6E}"/>
+              </a:ext>
+              <a:ext uri="{C183D7F6-B498-43B3-948B-1728B52AA6E4}">
+                <adec:decorative xmlns:adec="http://schemas.microsoft.com/office/drawing/2017/decorative" val="1"/>
+              </a:ext>
+            </a:extLst>
+          </p:cNvPr>
+          <p:cNvSpPr>
+            <a:spLocks noGrp="1" noRot="1" noChangeAspect="1" noMove="1" noResize="1" noEditPoints="1" noAdjustHandles="1" noChangeArrowheads="1" noChangeShapeType="1" noTextEdit="1"/>
+          </p:cNvSpPr>
+          <p:nvPr>
+            <p:extLst>
+              <p:ext uri="{386F3935-93C4-4BCD-93E2-E3B085C9AB24}">
+                <p16:designElem xmlns:p16="http://schemas.microsoft.com/office/powerpoint/2015/main" val="1"/>
+              </p:ext>
+            </p:extLst>
+          </p:nvPr>
+        </p:nvSpPr>
+        <p:spPr>
+          <a:xfrm>
+            <a:off x="0" y="0"/>
+            <a:ext cx="12188952" cy="6858000"/>
+          </a:xfrm>
+          <a:prstGeom prst="rect">
+            <a:avLst/>
+          </a:prstGeom>
+          <a:ln>
+            <a:noFill/>
+          </a:ln>
+          <a:effectLst/>
+        </p:spPr>
+        <p:style>
+          <a:lnRef idx="2">
+            <a:schemeClr val="accent1">
+              <a:shade val="50000"/>
+            </a:schemeClr>
+          </a:lnRef>
+          <a:fillRef idx="1">
+            <a:schemeClr val="accent1"/>
+          </a:fillRef>
+          <a:effectRef idx="0">
+            <a:schemeClr val="accent1"/>
+          </a:effectRef>
+          <a:fontRef idx="minor">
+            <a:schemeClr val="lt1"/>
+          </a:fontRef>
+        </p:style>
+        <p:txBody>
+          <a:bodyPr rtlCol="0" anchor="ctr"/>
+          <a:lstStyle/>
+          <a:p>
+            <a:pPr algn="ctr"/>
+            <a:endParaRPr lang="en-US"/>
+          </a:p>
+        </p:txBody>
+      </p:sp>
+      <p:sp useBgFill="1">
+        <p:nvSpPr>
+          <p:cNvPr id="14" name="Rectangle 13">
+            <a:extLst>
+              <a:ext uri="{FF2B5EF4-FFF2-40B4-BE49-F238E27FC236}">
+                <a16:creationId xmlns:a16="http://schemas.microsoft.com/office/drawing/2014/main" id="{893A6D2E-5228-4998-9E24-EFCCA024675E}"/>
+              </a:ext>
+              <a:ext uri="{C183D7F6-B498-43B3-948B-1728B52AA6E4}">
+                <adec:decorative xmlns:adec="http://schemas.microsoft.com/office/drawing/2017/decorative" val="1"/>
+              </a:ext>
+            </a:extLst>
+          </p:cNvPr>
+          <p:cNvSpPr>
+            <a:spLocks noGrp="1" noRot="1" noChangeAspect="1" noMove="1" noResize="1" noEditPoints="1" noAdjustHandles="1" noChangeArrowheads="1" noChangeShapeType="1" noTextEdit="1"/>
+          </p:cNvSpPr>
+          <p:nvPr>
+            <p:extLst>
+              <p:ext uri="{386F3935-93C4-4BCD-93E2-E3B085C9AB24}">
+                <p16:designElem xmlns:p16="http://schemas.microsoft.com/office/powerpoint/2015/main" val="1"/>
+              </p:ext>
+            </p:extLst>
+          </p:nvPr>
+        </p:nvSpPr>
+        <p:spPr>
+          <a:xfrm>
+            <a:off x="0" y="-2"/>
+            <a:ext cx="12188952" cy="3567547"/>
+          </a:xfrm>
+          <a:prstGeom prst="rect">
+            <a:avLst/>
+          </a:prstGeom>
+          <a:ln>
+            <a:noFill/>
+          </a:ln>
+          <a:effectLst>
+            <a:outerShdw blurRad="228600" dist="152400" dir="5460000" sx="95000" sy="95000" algn="t" rotWithShape="0">
+              <a:srgbClr val="000000">
+                <a:alpha val="30000"/>
+              </a:srgbClr>
+            </a:outerShdw>
+          </a:effectLst>
+        </p:spPr>
+        <p:style>
+          <a:lnRef idx="2">
+            <a:schemeClr val="accent1">
+              <a:shade val="50000"/>
+            </a:schemeClr>
+          </a:lnRef>
+          <a:fillRef idx="1">
+            <a:schemeClr val="accent1"/>
+          </a:fillRef>
+          <a:effectRef idx="0">
+            <a:schemeClr val="accent1"/>
+          </a:effectRef>
+          <a:fontRef idx="minor">
+            <a:schemeClr val="lt1"/>
+          </a:fontRef>
+        </p:style>
+        <p:txBody>
+          <a:bodyPr rtlCol="0" anchor="ctr"/>
+          <a:lstStyle/>
+          <a:p>
+            <a:pPr algn="ctr"/>
+            <a:endParaRPr lang="en-US" dirty="0"/>
+          </a:p>
+        </p:txBody>
+      </p:sp>
+      <p:cxnSp>
+        <p:nvCxnSpPr>
+          <p:cNvPr id="16" name="Straight Connector 15">
+            <a:extLst>
+              <a:ext uri="{FF2B5EF4-FFF2-40B4-BE49-F238E27FC236}">
+                <a16:creationId xmlns:a16="http://schemas.microsoft.com/office/drawing/2014/main" id="{3ADB48DB-8E25-4F2F-8C02-5B793937255F}"/>
+              </a:ext>
+              <a:ext uri="{C183D7F6-B498-43B3-948B-1728B52AA6E4}">
+                <adec:decorative xmlns:adec="http://schemas.microsoft.com/office/drawing/2017/decorative" val="1"/>
+              </a:ext>
+            </a:extLst>
+          </p:cNvPr>
+          <p:cNvCxnSpPr>
+            <a:cxnSpLocks noGrp="1" noRot="1" noChangeAspect="1" noMove="1" noResize="1" noEditPoints="1" noAdjustHandles="1" noChangeArrowheads="1" noChangeShapeType="1"/>
+          </p:cNvCxnSpPr>
+          <p:nvPr>
+            <p:extLst>
+              <p:ext uri="{386F3935-93C4-4BCD-93E2-E3B085C9AB24}">
+                <p16:designElem xmlns:p16="http://schemas.microsoft.com/office/powerpoint/2015/main" val="1"/>
+              </p:ext>
+            </p:extLst>
+          </p:nvPr>
+        </p:nvCxnSpPr>
+        <p:spPr>
+          <a:xfrm>
+            <a:off x="11668155" y="5641010"/>
+            <a:ext cx="0" cy="599069"/>
+          </a:xfrm>
+          <a:prstGeom prst="line">
+            <a:avLst/>
+          </a:prstGeom>
+          <a:ln w="38100">
+            <a:solidFill>
+              <a:schemeClr val="tx1"/>
+            </a:solidFill>
+          </a:ln>
+        </p:spPr>
+        <p:style>
+          <a:lnRef idx="1">
+            <a:schemeClr val="accent1"/>
+          </a:lnRef>
+          <a:fillRef idx="0">
+            <a:schemeClr val="accent1"/>
+          </a:fillRef>
+          <a:effectRef idx="0">
+            <a:schemeClr val="accent1"/>
+          </a:effectRef>
+          <a:fontRef idx="minor">
+            <a:schemeClr val="tx1"/>
+          </a:fontRef>
+        </p:style>
+      </p:cxnSp>
+      <p:cxnSp>
+        <p:nvCxnSpPr>
+          <p:cNvPr id="18" name="Straight Connector 17">
+            <a:extLst>
+              <a:ext uri="{FF2B5EF4-FFF2-40B4-BE49-F238E27FC236}">
+                <a16:creationId xmlns:a16="http://schemas.microsoft.com/office/drawing/2014/main" id="{C32BA7E3-7313-49C8-A245-A85BDEB13EB3}"/>
+              </a:ext>
+              <a:ext uri="{C183D7F6-B498-43B3-948B-1728B52AA6E4}">
+                <adec:decorative xmlns:adec="http://schemas.microsoft.com/office/drawing/2017/decorative" val="1"/>
+              </a:ext>
+            </a:extLst>
+          </p:cNvPr>
+          <p:cNvCxnSpPr>
+            <a:cxnSpLocks noGrp="1" noRot="1" noChangeAspect="1" noMove="1" noResize="1" noEditPoints="1" noAdjustHandles="1" noChangeArrowheads="1" noChangeShapeType="1"/>
+          </p:cNvCxnSpPr>
+          <p:nvPr>
+            <p:extLst>
+              <p:ext uri="{386F3935-93C4-4BCD-93E2-E3B085C9AB24}">
+                <p16:designElem xmlns:p16="http://schemas.microsoft.com/office/powerpoint/2015/main" val="1"/>
+              </p:ext>
+            </p:extLst>
+          </p:nvPr>
+        </p:nvCxnSpPr>
+        <p:spPr>
+          <a:xfrm>
+            <a:off x="11668155" y="5641010"/>
+            <a:ext cx="0" cy="599069"/>
+          </a:xfrm>
+          <a:prstGeom prst="line">
+            <a:avLst/>
+          </a:prstGeom>
+          <a:ln w="38100">
+            <a:solidFill>
+              <a:schemeClr val="tx1"/>
+            </a:solidFill>
+          </a:ln>
+        </p:spPr>
+        <p:style>
+          <a:lnRef idx="1">
+            <a:schemeClr val="accent1"/>
+          </a:lnRef>
+          <a:fillRef idx="0">
+            <a:schemeClr val="accent1"/>
+          </a:fillRef>
+          <a:effectRef idx="0">
+            <a:schemeClr val="accent1"/>
+          </a:effectRef>
+          <a:fontRef idx="minor">
+            <a:schemeClr val="tx1"/>
+          </a:fontRef>
+        </p:style>
+      </p:cxnSp>
+      <p:sp useBgFill="1">
+        <p:nvSpPr>
+          <p:cNvPr id="20" name="Slide Background">
+            <a:extLst>
+              <a:ext uri="{FF2B5EF4-FFF2-40B4-BE49-F238E27FC236}">
+                <a16:creationId xmlns:a16="http://schemas.microsoft.com/office/drawing/2014/main" id="{699EBD07-7968-467C-82EE-7283E46512DF}"/>
+              </a:ext>
+              <a:ext uri="{C183D7F6-B498-43B3-948B-1728B52AA6E4}">
+                <adec:decorative xmlns:adec="http://schemas.microsoft.com/office/drawing/2017/decorative" val="1"/>
+              </a:ext>
+            </a:extLst>
+          </p:cNvPr>
+          <p:cNvSpPr>
+            <a:spLocks noGrp="1" noRot="1" noChangeAspect="1" noMove="1" noResize="1" noEditPoints="1" noAdjustHandles="1" noChangeArrowheads="1" noChangeShapeType="1" noTextEdit="1"/>
+          </p:cNvSpPr>
+          <p:nvPr>
+            <p:extLst>
+              <p:ext uri="{386F3935-93C4-4BCD-93E2-E3B085C9AB24}">
+                <p16:designElem xmlns:p16="http://schemas.microsoft.com/office/powerpoint/2015/main" val="1"/>
+              </p:ext>
+            </p:extLst>
+          </p:nvPr>
+        </p:nvSpPr>
+        <p:spPr bwMode="white">
+          <a:xfrm>
+            <a:off x="-1" y="0"/>
+            <a:ext cx="12191999" cy="6858000"/>
+          </a:xfrm>
+          <a:prstGeom prst="rect">
+            <a:avLst/>
+          </a:prstGeom>
+          <a:ln>
+            <a:noFill/>
+          </a:ln>
+        </p:spPr>
+        <p:style>
+          <a:lnRef idx="2">
+            <a:schemeClr val="accent1">
+              <a:shade val="50000"/>
+            </a:schemeClr>
+          </a:lnRef>
+          <a:fillRef idx="1">
+            <a:schemeClr val="accent1"/>
+          </a:fillRef>
+          <a:effectRef idx="0">
+            <a:schemeClr val="accent1"/>
+          </a:effectRef>
+          <a:fontRef idx="minor">
+            <a:schemeClr val="lt1"/>
+          </a:fontRef>
+        </p:style>
+        <p:txBody>
+          <a:bodyPr rtlCol="0" anchor="ctr"/>
+          <a:lstStyle>
+            <a:defPPr>
+              <a:defRPr lang="en-US"/>
+            </a:defPPr>
+            <a:lvl1pPr marL="0" algn="l" defTabSz="914400" rtl="0" eaLnBrk="1" latinLnBrk="0" hangingPunct="1">
+              <a:defRPr sz="1800" kern="1200">
+                <a:solidFill>
+                  <a:schemeClr val="lt1"/>
+                </a:solidFill>
+                <a:latin typeface="+mn-lt"/>
+                <a:ea typeface="+mn-ea"/>
+                <a:cs typeface="+mn-cs"/>
+              </a:defRPr>
+            </a:lvl1pPr>
+            <a:lvl2pPr marL="457200" algn="l" defTabSz="914400" rtl="0" eaLnBrk="1" latinLnBrk="0" hangingPunct="1">
+              <a:defRPr sz="1800" kern="1200">
+                <a:solidFill>
+                  <a:schemeClr val="lt1"/>
+                </a:solidFill>
+                <a:latin typeface="+mn-lt"/>
+                <a:ea typeface="+mn-ea"/>
+                <a:cs typeface="+mn-cs"/>
+              </a:defRPr>
+            </a:lvl2pPr>
+            <a:lvl3pPr marL="914400" algn="l" defTabSz="914400" rtl="0" eaLnBrk="1" latinLnBrk="0" hangingPunct="1">
+              <a:defRPr sz="1800" kern="1200">
+                <a:solidFill>
+                  <a:schemeClr val="lt1"/>
+                </a:solidFill>
+                <a:latin typeface="+mn-lt"/>
+                <a:ea typeface="+mn-ea"/>
+                <a:cs typeface="+mn-cs"/>
+              </a:defRPr>
+            </a:lvl3pPr>
+            <a:lvl4pPr marL="1371600" algn="l" defTabSz="914400" rtl="0" eaLnBrk="1" latinLnBrk="0" hangingPunct="1">
+              <a:defRPr sz="1800" kern="1200">
+                <a:solidFill>
+                  <a:schemeClr val="lt1"/>
+                </a:solidFill>
+                <a:latin typeface="+mn-lt"/>
+                <a:ea typeface="+mn-ea"/>
+                <a:cs typeface="+mn-cs"/>
+              </a:defRPr>
+            </a:lvl4pPr>
+            <a:lvl5pPr marL="1828800" algn="l" defTabSz="914400" rtl="0" eaLnBrk="1" latinLnBrk="0" hangingPunct="1">
+              <a:defRPr sz="1800" kern="1200">
+                <a:solidFill>
+                  <a:schemeClr val="lt1"/>
+                </a:solidFill>
+                <a:latin typeface="+mn-lt"/>
+                <a:ea typeface="+mn-ea"/>
+                <a:cs typeface="+mn-cs"/>
+              </a:defRPr>
+            </a:lvl5pPr>
+            <a:lvl6pPr marL="2286000" algn="l" defTabSz="914400" rtl="0" eaLnBrk="1" latinLnBrk="0" hangingPunct="1">
+              <a:defRPr sz="1800" kern="1200">
+                <a:solidFill>
+                  <a:schemeClr val="lt1"/>
+                </a:solidFill>
+                <a:latin typeface="+mn-lt"/>
+                <a:ea typeface="+mn-ea"/>
+                <a:cs typeface="+mn-cs"/>
+              </a:defRPr>
+            </a:lvl6pPr>
+            <a:lvl7pPr marL="2743200" algn="l" defTabSz="914400" rtl="0" eaLnBrk="1" latinLnBrk="0" hangingPunct="1">
+              <a:defRPr sz="1800" kern="1200">
+                <a:solidFill>
+                  <a:schemeClr val="lt1"/>
+                </a:solidFill>
+                <a:latin typeface="+mn-lt"/>
+                <a:ea typeface="+mn-ea"/>
+                <a:cs typeface="+mn-cs"/>
+              </a:defRPr>
+            </a:lvl7pPr>
+            <a:lvl8pPr marL="3200400" algn="l" defTabSz="914400" rtl="0" eaLnBrk="1" latinLnBrk="0" hangingPunct="1">
+              <a:defRPr sz="1800" kern="1200">
+                <a:solidFill>
+                  <a:schemeClr val="lt1"/>
+                </a:solidFill>
+                <a:latin typeface="+mn-lt"/>
+                <a:ea typeface="+mn-ea"/>
+                <a:cs typeface="+mn-cs"/>
+              </a:defRPr>
+            </a:lvl8pPr>
+            <a:lvl9pPr marL="3657600" algn="l" defTabSz="914400" rtl="0" eaLnBrk="1" latinLnBrk="0" hangingPunct="1">
+              <a:defRPr sz="1800" kern="1200">
+                <a:solidFill>
+                  <a:schemeClr val="lt1"/>
+                </a:solidFill>
+                <a:latin typeface="+mn-lt"/>
+                <a:ea typeface="+mn-ea"/>
+                <a:cs typeface="+mn-cs"/>
+              </a:defRPr>
+            </a:lvl9pPr>
+          </a:lstStyle>
+          <a:p>
+            <a:pPr algn="ctr"/>
+            <a:endParaRPr lang="en-US"/>
+          </a:p>
+        </p:txBody>
+      </p:sp>
+      <p:pic>
+        <p:nvPicPr>
+          <p:cNvPr id="7" name="Picture 6" descr="Calendar&#10;&#10;Description automatically generated">
+            <a:extLst>
+              <a:ext uri="{FF2B5EF4-FFF2-40B4-BE49-F238E27FC236}">
+                <a16:creationId xmlns:a16="http://schemas.microsoft.com/office/drawing/2014/main" id="{9EA29564-DDDB-FEFC-9462-2E365A53EAF3}"/>
+              </a:ext>
+            </a:extLst>
+          </p:cNvPr>
+          <p:cNvPicPr>
+            <a:picLocks noChangeAspect="1"/>
+          </p:cNvPicPr>
+          <p:nvPr/>
+        </p:nvPicPr>
+        <p:blipFill rotWithShape="1">
+          <a:blip r:embed="rId2"/>
+          <a:srcRect b="746"/>
+          <a:stretch/>
+        </p:blipFill>
+        <p:spPr>
+          <a:xfrm>
+            <a:off x="20" y="2320119"/>
+            <a:ext cx="6095979" cy="4537881"/>
+          </a:xfrm>
+          <a:prstGeom prst="rect">
+            <a:avLst/>
+          </a:prstGeom>
+        </p:spPr>
+      </p:pic>
+      <p:pic>
+        <p:nvPicPr>
+          <p:cNvPr id="5" name="Picture 4" descr="Chart, scatter chart&#10;&#10;Description automatically generated">
+            <a:extLst>
+              <a:ext uri="{FF2B5EF4-FFF2-40B4-BE49-F238E27FC236}">
+                <a16:creationId xmlns:a16="http://schemas.microsoft.com/office/drawing/2014/main" id="{B8B8DBE4-658F-3C66-AE4C-A5728C644117}"/>
+              </a:ext>
+            </a:extLst>
+          </p:cNvPr>
+          <p:cNvPicPr>
+            <a:picLocks noChangeAspect="1"/>
+          </p:cNvPicPr>
+          <p:nvPr/>
+        </p:nvPicPr>
+        <p:blipFill rotWithShape="1">
+          <a:blip r:embed="rId3"/>
+          <a:srcRect l="5965" r="2" b="2"/>
+          <a:stretch/>
+        </p:blipFill>
+        <p:spPr>
+          <a:xfrm>
+            <a:off x="6096000" y="2320119"/>
+            <a:ext cx="6095999" cy="4537881"/>
+          </a:xfrm>
+          <a:prstGeom prst="rect">
+            <a:avLst/>
+          </a:prstGeom>
+        </p:spPr>
+      </p:pic>
+      <p:sp useBgFill="1">
+        <p:nvSpPr>
+          <p:cNvPr id="22" name="Rectangle 21">
+            <a:extLst>
+              <a:ext uri="{FF2B5EF4-FFF2-40B4-BE49-F238E27FC236}">
+                <a16:creationId xmlns:a16="http://schemas.microsoft.com/office/drawing/2014/main" id="{F489C2E0-4895-4B72-85EA-7EE9FAFFDC7E}"/>
+              </a:ext>
+              <a:ext uri="{C183D7F6-B498-43B3-948B-1728B52AA6E4}">
+                <adec:decorative xmlns:adec="http://schemas.microsoft.com/office/drawing/2017/decorative" val="1"/>
+              </a:ext>
+            </a:extLst>
+          </p:cNvPr>
+          <p:cNvSpPr>
+            <a:spLocks noGrp="1" noRot="1" noChangeAspect="1" noMove="1" noResize="1" noEditPoints="1" noAdjustHandles="1" noChangeArrowheads="1" noChangeShapeType="1" noTextEdit="1"/>
+          </p:cNvSpPr>
+          <p:nvPr>
+            <p:extLst>
+              <p:ext uri="{386F3935-93C4-4BCD-93E2-E3B085C9AB24}">
+                <p16:designElem xmlns:p16="http://schemas.microsoft.com/office/powerpoint/2015/main" val="1"/>
+              </p:ext>
+            </p:extLst>
+          </p:nvPr>
+        </p:nvSpPr>
+        <p:spPr>
+          <a:xfrm>
+            <a:off x="-1" y="0"/>
+            <a:ext cx="12192000" cy="2320119"/>
+          </a:xfrm>
+          <a:prstGeom prst="rect">
+            <a:avLst/>
+          </a:prstGeom>
+          <a:ln>
+            <a:noFill/>
+          </a:ln>
+          <a:effectLst>
+            <a:outerShdw blurRad="596900" dist="330200" dir="7140000" sx="87000" sy="87000" algn="t" rotWithShape="0">
+              <a:srgbClr val="000000">
+                <a:alpha val="26667"/>
+              </a:srgbClr>
+            </a:outerShdw>
+          </a:effectLst>
+        </p:spPr>
+        <p:style>
+          <a:lnRef idx="2">
+            <a:schemeClr val="accent1">
+              <a:shade val="50000"/>
+            </a:schemeClr>
+          </a:lnRef>
+          <a:fillRef idx="1">
+            <a:schemeClr val="accent1"/>
+          </a:fillRef>
+          <a:effectRef idx="0">
+            <a:schemeClr val="accent1"/>
+          </a:effectRef>
+          <a:fontRef idx="minor">
+            <a:schemeClr val="lt1"/>
+          </a:fontRef>
+        </p:style>
+        <p:txBody>
+          <a:bodyPr rtlCol="0" anchor="ctr"/>
+          <a:lstStyle/>
+          <a:p>
+            <a:pPr algn="ctr"/>
+            <a:endParaRPr lang="en-US" dirty="0"/>
+          </a:p>
+        </p:txBody>
+      </p:sp>
       <p:sp>
         <p:nvSpPr>
           <p:cNvPr id="2" name="Title 1">
@@ -8312,43 +8927,77 @@
             <p:ph type="title"/>
           </p:nvPr>
         </p:nvSpPr>
-        <p:spPr/>
-        <p:txBody>
-          <a:bodyPr/>
+        <p:spPr>
+          <a:xfrm>
+            <a:off x="589558" y="293428"/>
+            <a:ext cx="5474257" cy="1815151"/>
+          </a:xfrm>
+        </p:spPr>
+        <p:txBody>
+          <a:bodyPr vert="horz" lIns="91440" tIns="45720" rIns="91440" bIns="45720" rtlCol="0" anchor="ctr">
+            <a:normAutofit/>
+          </a:bodyPr>
           <a:lstStyle/>
           <a:p>
             <a:r>
-              <a:rPr lang="en-US" dirty="0"/>
-              <a:t>Classification</a:t>
+              <a:rPr lang="en-US" sz="3600"/>
+              <a:t>White Wine Classification</a:t>
             </a:r>
           </a:p>
         </p:txBody>
       </p:sp>
-      <p:sp>
-        <p:nvSpPr>
-          <p:cNvPr id="3" name="Content Placeholder 2">
-            <a:extLst>
-              <a:ext uri="{FF2B5EF4-FFF2-40B4-BE49-F238E27FC236}">
-                <a16:creationId xmlns:a16="http://schemas.microsoft.com/office/drawing/2014/main" id="{CB91CDDE-6488-E61C-873F-C2946E979507}"/>
-              </a:ext>
-            </a:extLst>
-          </p:cNvPr>
-          <p:cNvSpPr>
-            <a:spLocks noGrp="1"/>
-          </p:cNvSpPr>
-          <p:nvPr>
-            <p:ph idx="1"/>
-          </p:nvPr>
-        </p:nvSpPr>
-        <p:spPr/>
-        <p:txBody>
-          <a:bodyPr/>
-          <a:lstStyle/>
-          <a:p>
-            <a:endParaRPr lang="en-US"/>
-          </a:p>
-        </p:txBody>
-      </p:sp>
+      <p:cxnSp>
+        <p:nvCxnSpPr>
+          <p:cNvPr id="24" name="Straight Connector 23">
+            <a:extLst>
+              <a:ext uri="{FF2B5EF4-FFF2-40B4-BE49-F238E27FC236}">
+                <a16:creationId xmlns:a16="http://schemas.microsoft.com/office/drawing/2014/main" id="{2E6B6C39-3A8E-4EAF-A0CD-4FE0CDFCD7DB}"/>
+              </a:ext>
+              <a:ext uri="{C183D7F6-B498-43B3-948B-1728B52AA6E4}">
+                <adec:decorative xmlns:adec="http://schemas.microsoft.com/office/drawing/2017/decorative" val="1"/>
+              </a:ext>
+            </a:extLst>
+          </p:cNvPr>
+          <p:cNvCxnSpPr>
+            <a:cxnSpLocks noGrp="1" noRot="1" noChangeAspect="1" noMove="1" noResize="1" noEditPoints="1" noAdjustHandles="1" noChangeArrowheads="1" noChangeShapeType="1"/>
+          </p:cNvCxnSpPr>
+          <p:nvPr>
+            <p:extLst>
+              <p:ext uri="{386F3935-93C4-4BCD-93E2-E3B085C9AB24}">
+                <p16:designElem xmlns:p16="http://schemas.microsoft.com/office/powerpoint/2015/main" val="1"/>
+              </p:ext>
+            </p:extLst>
+          </p:nvPr>
+        </p:nvCxnSpPr>
+        <p:spPr>
+          <a:xfrm>
+            <a:off x="11668155" y="985882"/>
+            <a:ext cx="0" cy="599069"/>
+          </a:xfrm>
+          <a:prstGeom prst="line">
+            <a:avLst/>
+          </a:prstGeom>
+          <a:ln w="38100">
+            <a:solidFill>
+              <a:schemeClr val="tx1"/>
+            </a:solidFill>
+          </a:ln>
+        </p:spPr>
+        <p:style>
+          <a:lnRef idx="1">
+            <a:schemeClr val="accent1"/>
+          </a:lnRef>
+          <a:fillRef idx="0">
+            <a:schemeClr val="accent1"/>
+          </a:fillRef>
+          <a:effectRef idx="0">
+            <a:schemeClr val="accent1"/>
+          </a:effectRef>
+          <a:fontRef idx="minor">
+            <a:schemeClr val="tx1"/>
+          </a:fontRef>
+        </p:style>
+      </p:cxnSp>
     </p:spTree>
     <p:extLst>
       <p:ext uri="{BB962C8B-B14F-4D97-AF65-F5344CB8AC3E}">
@@ -8363,8 +9012,16 @@
 </file>
 
 <file path=ppt/slides/slide9.xml><?xml version="1.0" encoding="utf-8"?>
-<p:sld xmlns:a="http://schemas.openxmlformats.org/drawingml/2006/main" xmlns:r="http://schemas.openxmlformats.org/officeDocument/2006/relationships" xmlns:p="http://schemas.openxmlformats.org/presentationml/2006/main">
+<p:sld xmlns:a="http://schemas.openxmlformats.org/drawingml/2006/main" xmlns:r="http://schemas.openxmlformats.org/officeDocument/2006/relationships" xmlns:p="http://schemas.openxmlformats.org/presentationml/2006/main" showMasterSp="0">
   <p:cSld>
+    <p:bg>
+      <p:bgPr>
+        <a:solidFill>
+          <a:srgbClr val="660033"/>
+        </a:solidFill>
+        <a:effectLst/>
+      </p:bgPr>
+    </p:bg>
     <p:spTree>
       <p:nvGrpSpPr>
         <p:cNvPr id="1" name=""/>
@@ -8379,12 +9036,523 @@
           <a:chExt cx="0" cy="0"/>
         </a:xfrm>
       </p:grpSpPr>
+      <p:sp useBgFill="1">
+        <p:nvSpPr>
+          <p:cNvPr id="29" name="Rectangle 28">
+            <a:extLst>
+              <a:ext uri="{FF2B5EF4-FFF2-40B4-BE49-F238E27FC236}">
+                <a16:creationId xmlns:a16="http://schemas.microsoft.com/office/drawing/2014/main" id="{D284A420-F50C-4C2C-B88E-E6F4EF504B6E}"/>
+              </a:ext>
+              <a:ext uri="{C183D7F6-B498-43B3-948B-1728B52AA6E4}">
+                <adec:decorative xmlns:adec="http://schemas.microsoft.com/office/drawing/2017/decorative" val="1"/>
+              </a:ext>
+            </a:extLst>
+          </p:cNvPr>
+          <p:cNvSpPr>
+            <a:spLocks noGrp="1" noRot="1" noChangeAspect="1" noMove="1" noResize="1" noEditPoints="1" noAdjustHandles="1" noChangeArrowheads="1" noChangeShapeType="1" noTextEdit="1"/>
+          </p:cNvSpPr>
+          <p:nvPr>
+            <p:extLst>
+              <p:ext uri="{386F3935-93C4-4BCD-93E2-E3B085C9AB24}">
+                <p16:designElem xmlns:p16="http://schemas.microsoft.com/office/powerpoint/2015/main" val="1"/>
+              </p:ext>
+            </p:extLst>
+          </p:nvPr>
+        </p:nvSpPr>
+        <p:spPr>
+          <a:xfrm>
+            <a:off x="0" y="0"/>
+            <a:ext cx="12188952" cy="6858000"/>
+          </a:xfrm>
+          <a:prstGeom prst="rect">
+            <a:avLst/>
+          </a:prstGeom>
+          <a:ln>
+            <a:noFill/>
+          </a:ln>
+          <a:effectLst/>
+        </p:spPr>
+        <p:style>
+          <a:lnRef idx="2">
+            <a:schemeClr val="accent1">
+              <a:shade val="50000"/>
+            </a:schemeClr>
+          </a:lnRef>
+          <a:fillRef idx="1">
+            <a:schemeClr val="accent1"/>
+          </a:fillRef>
+          <a:effectRef idx="0">
+            <a:schemeClr val="accent1"/>
+          </a:effectRef>
+          <a:fontRef idx="minor">
+            <a:schemeClr val="lt1"/>
+          </a:fontRef>
+        </p:style>
+        <p:txBody>
+          <a:bodyPr rtlCol="0" anchor="ctr"/>
+          <a:lstStyle/>
+          <a:p>
+            <a:pPr algn="ctr"/>
+            <a:endParaRPr lang="en-US"/>
+          </a:p>
+        </p:txBody>
+      </p:sp>
+      <p:sp useBgFill="1">
+        <p:nvSpPr>
+          <p:cNvPr id="31" name="Rectangle 30">
+            <a:extLst>
+              <a:ext uri="{FF2B5EF4-FFF2-40B4-BE49-F238E27FC236}">
+                <a16:creationId xmlns:a16="http://schemas.microsoft.com/office/drawing/2014/main" id="{893A6D2E-5228-4998-9E24-EFCCA024675E}"/>
+              </a:ext>
+              <a:ext uri="{C183D7F6-B498-43B3-948B-1728B52AA6E4}">
+                <adec:decorative xmlns:adec="http://schemas.microsoft.com/office/drawing/2017/decorative" val="1"/>
+              </a:ext>
+            </a:extLst>
+          </p:cNvPr>
+          <p:cNvSpPr>
+            <a:spLocks noGrp="1" noRot="1" noChangeAspect="1" noMove="1" noResize="1" noEditPoints="1" noAdjustHandles="1" noChangeArrowheads="1" noChangeShapeType="1" noTextEdit="1"/>
+          </p:cNvSpPr>
+          <p:nvPr>
+            <p:extLst>
+              <p:ext uri="{386F3935-93C4-4BCD-93E2-E3B085C9AB24}">
+                <p16:designElem xmlns:p16="http://schemas.microsoft.com/office/powerpoint/2015/main" val="1"/>
+              </p:ext>
+            </p:extLst>
+          </p:nvPr>
+        </p:nvSpPr>
+        <p:spPr>
+          <a:xfrm>
+            <a:off x="0" y="-2"/>
+            <a:ext cx="12188952" cy="3567547"/>
+          </a:xfrm>
+          <a:prstGeom prst="rect">
+            <a:avLst/>
+          </a:prstGeom>
+          <a:ln>
+            <a:noFill/>
+          </a:ln>
+          <a:effectLst>
+            <a:outerShdw blurRad="228600" dist="152400" dir="5460000" sx="95000" sy="95000" algn="t" rotWithShape="0">
+              <a:srgbClr val="000000">
+                <a:alpha val="30000"/>
+              </a:srgbClr>
+            </a:outerShdw>
+          </a:effectLst>
+        </p:spPr>
+        <p:style>
+          <a:lnRef idx="2">
+            <a:schemeClr val="accent1">
+              <a:shade val="50000"/>
+            </a:schemeClr>
+          </a:lnRef>
+          <a:fillRef idx="1">
+            <a:schemeClr val="accent1"/>
+          </a:fillRef>
+          <a:effectRef idx="0">
+            <a:schemeClr val="accent1"/>
+          </a:effectRef>
+          <a:fontRef idx="minor">
+            <a:schemeClr val="lt1"/>
+          </a:fontRef>
+        </p:style>
+        <p:txBody>
+          <a:bodyPr rtlCol="0" anchor="ctr"/>
+          <a:lstStyle/>
+          <a:p>
+            <a:pPr algn="ctr"/>
+            <a:endParaRPr lang="en-US" dirty="0"/>
+          </a:p>
+        </p:txBody>
+      </p:sp>
+      <p:cxnSp>
+        <p:nvCxnSpPr>
+          <p:cNvPr id="33" name="Straight Connector 32">
+            <a:extLst>
+              <a:ext uri="{FF2B5EF4-FFF2-40B4-BE49-F238E27FC236}">
+                <a16:creationId xmlns:a16="http://schemas.microsoft.com/office/drawing/2014/main" id="{3ADB48DB-8E25-4F2F-8C02-5B793937255F}"/>
+              </a:ext>
+              <a:ext uri="{C183D7F6-B498-43B3-948B-1728B52AA6E4}">
+                <adec:decorative xmlns:adec="http://schemas.microsoft.com/office/drawing/2017/decorative" val="1"/>
+              </a:ext>
+            </a:extLst>
+          </p:cNvPr>
+          <p:cNvCxnSpPr>
+            <a:cxnSpLocks noGrp="1" noRot="1" noChangeAspect="1" noMove="1" noResize="1" noEditPoints="1" noAdjustHandles="1" noChangeArrowheads="1" noChangeShapeType="1"/>
+          </p:cNvCxnSpPr>
+          <p:nvPr>
+            <p:extLst>
+              <p:ext uri="{386F3935-93C4-4BCD-93E2-E3B085C9AB24}">
+                <p16:designElem xmlns:p16="http://schemas.microsoft.com/office/powerpoint/2015/main" val="1"/>
+              </p:ext>
+            </p:extLst>
+          </p:nvPr>
+        </p:nvCxnSpPr>
+        <p:spPr>
+          <a:xfrm>
+            <a:off x="11668155" y="5641010"/>
+            <a:ext cx="0" cy="599069"/>
+          </a:xfrm>
+          <a:prstGeom prst="line">
+            <a:avLst/>
+          </a:prstGeom>
+          <a:ln w="38100">
+            <a:solidFill>
+              <a:schemeClr val="tx1"/>
+            </a:solidFill>
+          </a:ln>
+        </p:spPr>
+        <p:style>
+          <a:lnRef idx="1">
+            <a:schemeClr val="accent1"/>
+          </a:lnRef>
+          <a:fillRef idx="0">
+            <a:schemeClr val="accent1"/>
+          </a:fillRef>
+          <a:effectRef idx="0">
+            <a:schemeClr val="accent1"/>
+          </a:effectRef>
+          <a:fontRef idx="minor">
+            <a:schemeClr val="tx1"/>
+          </a:fontRef>
+        </p:style>
+      </p:cxnSp>
+      <p:cxnSp>
+        <p:nvCxnSpPr>
+          <p:cNvPr id="35" name="Straight Connector 34">
+            <a:extLst>
+              <a:ext uri="{FF2B5EF4-FFF2-40B4-BE49-F238E27FC236}">
+                <a16:creationId xmlns:a16="http://schemas.microsoft.com/office/drawing/2014/main" id="{C32BA7E3-7313-49C8-A245-A85BDEB13EB3}"/>
+              </a:ext>
+              <a:ext uri="{C183D7F6-B498-43B3-948B-1728B52AA6E4}">
+                <adec:decorative xmlns:adec="http://schemas.microsoft.com/office/drawing/2017/decorative" val="1"/>
+              </a:ext>
+            </a:extLst>
+          </p:cNvPr>
+          <p:cNvCxnSpPr>
+            <a:cxnSpLocks noGrp="1" noRot="1" noChangeAspect="1" noMove="1" noResize="1" noEditPoints="1" noAdjustHandles="1" noChangeArrowheads="1" noChangeShapeType="1"/>
+          </p:cNvCxnSpPr>
+          <p:nvPr>
+            <p:extLst>
+              <p:ext uri="{386F3935-93C4-4BCD-93E2-E3B085C9AB24}">
+                <p16:designElem xmlns:p16="http://schemas.microsoft.com/office/powerpoint/2015/main" val="1"/>
+              </p:ext>
+            </p:extLst>
+          </p:nvPr>
+        </p:nvCxnSpPr>
+        <p:spPr>
+          <a:xfrm>
+            <a:off x="11668155" y="5641010"/>
+            <a:ext cx="0" cy="599069"/>
+          </a:xfrm>
+          <a:prstGeom prst="line">
+            <a:avLst/>
+          </a:prstGeom>
+          <a:ln w="38100">
+            <a:solidFill>
+              <a:schemeClr val="tx1"/>
+            </a:solidFill>
+          </a:ln>
+        </p:spPr>
+        <p:style>
+          <a:lnRef idx="1">
+            <a:schemeClr val="accent1"/>
+          </a:lnRef>
+          <a:fillRef idx="0">
+            <a:schemeClr val="accent1"/>
+          </a:fillRef>
+          <a:effectRef idx="0">
+            <a:schemeClr val="accent1"/>
+          </a:effectRef>
+          <a:fontRef idx="minor">
+            <a:schemeClr val="tx1"/>
+          </a:fontRef>
+        </p:style>
+      </p:cxnSp>
+      <p:sp useBgFill="1">
+        <p:nvSpPr>
+          <p:cNvPr id="37" name="Slide Background">
+            <a:extLst>
+              <a:ext uri="{FF2B5EF4-FFF2-40B4-BE49-F238E27FC236}">
+                <a16:creationId xmlns:a16="http://schemas.microsoft.com/office/drawing/2014/main" id="{699EBD07-7968-467C-82EE-7283E46512DF}"/>
+              </a:ext>
+              <a:ext uri="{C183D7F6-B498-43B3-948B-1728B52AA6E4}">
+                <adec:decorative xmlns:adec="http://schemas.microsoft.com/office/drawing/2017/decorative" val="1"/>
+              </a:ext>
+            </a:extLst>
+          </p:cNvPr>
+          <p:cNvSpPr>
+            <a:spLocks noGrp="1" noRot="1" noChangeAspect="1" noMove="1" noResize="1" noEditPoints="1" noAdjustHandles="1" noChangeArrowheads="1" noChangeShapeType="1" noTextEdit="1"/>
+          </p:cNvSpPr>
+          <p:nvPr>
+            <p:extLst>
+              <p:ext uri="{386F3935-93C4-4BCD-93E2-E3B085C9AB24}">
+                <p16:designElem xmlns:p16="http://schemas.microsoft.com/office/powerpoint/2015/main" val="1"/>
+              </p:ext>
+            </p:extLst>
+          </p:nvPr>
+        </p:nvSpPr>
+        <p:spPr bwMode="white">
+          <a:xfrm>
+            <a:off x="-1" y="0"/>
+            <a:ext cx="12191999" cy="6858000"/>
+          </a:xfrm>
+          <a:prstGeom prst="rect">
+            <a:avLst/>
+          </a:prstGeom>
+          <a:ln>
+            <a:noFill/>
+          </a:ln>
+        </p:spPr>
+        <p:style>
+          <a:lnRef idx="2">
+            <a:schemeClr val="accent1">
+              <a:shade val="50000"/>
+            </a:schemeClr>
+          </a:lnRef>
+          <a:fillRef idx="1">
+            <a:schemeClr val="accent1"/>
+          </a:fillRef>
+          <a:effectRef idx="0">
+            <a:schemeClr val="accent1"/>
+          </a:effectRef>
+          <a:fontRef idx="minor">
+            <a:schemeClr val="lt1"/>
+          </a:fontRef>
+        </p:style>
+        <p:txBody>
+          <a:bodyPr rtlCol="0" anchor="ctr"/>
+          <a:lstStyle>
+            <a:defPPr>
+              <a:defRPr lang="en-US"/>
+            </a:defPPr>
+            <a:lvl1pPr marL="0" algn="l" defTabSz="914400" rtl="0" eaLnBrk="1" latinLnBrk="0" hangingPunct="1">
+              <a:defRPr sz="1800" kern="1200">
+                <a:solidFill>
+                  <a:schemeClr val="lt1"/>
+                </a:solidFill>
+                <a:latin typeface="+mn-lt"/>
+                <a:ea typeface="+mn-ea"/>
+                <a:cs typeface="+mn-cs"/>
+              </a:defRPr>
+            </a:lvl1pPr>
+            <a:lvl2pPr marL="457200" algn="l" defTabSz="914400" rtl="0" eaLnBrk="1" latinLnBrk="0" hangingPunct="1">
+              <a:defRPr sz="1800" kern="1200">
+                <a:solidFill>
+                  <a:schemeClr val="lt1"/>
+                </a:solidFill>
+                <a:latin typeface="+mn-lt"/>
+                <a:ea typeface="+mn-ea"/>
+                <a:cs typeface="+mn-cs"/>
+              </a:defRPr>
+            </a:lvl2pPr>
+            <a:lvl3pPr marL="914400" algn="l" defTabSz="914400" rtl="0" eaLnBrk="1" latinLnBrk="0" hangingPunct="1">
+              <a:defRPr sz="1800" kern="1200">
+                <a:solidFill>
+                  <a:schemeClr val="lt1"/>
+                </a:solidFill>
+                <a:latin typeface="+mn-lt"/>
+                <a:ea typeface="+mn-ea"/>
+                <a:cs typeface="+mn-cs"/>
+              </a:defRPr>
+            </a:lvl3pPr>
+            <a:lvl4pPr marL="1371600" algn="l" defTabSz="914400" rtl="0" eaLnBrk="1" latinLnBrk="0" hangingPunct="1">
+              <a:defRPr sz="1800" kern="1200">
+                <a:solidFill>
+                  <a:schemeClr val="lt1"/>
+                </a:solidFill>
+                <a:latin typeface="+mn-lt"/>
+                <a:ea typeface="+mn-ea"/>
+                <a:cs typeface="+mn-cs"/>
+              </a:defRPr>
+            </a:lvl4pPr>
+            <a:lvl5pPr marL="1828800" algn="l" defTabSz="914400" rtl="0" eaLnBrk="1" latinLnBrk="0" hangingPunct="1">
+              <a:defRPr sz="1800" kern="1200">
+                <a:solidFill>
+                  <a:schemeClr val="lt1"/>
+                </a:solidFill>
+                <a:latin typeface="+mn-lt"/>
+                <a:ea typeface="+mn-ea"/>
+                <a:cs typeface="+mn-cs"/>
+              </a:defRPr>
+            </a:lvl5pPr>
+            <a:lvl6pPr marL="2286000" algn="l" defTabSz="914400" rtl="0" eaLnBrk="1" latinLnBrk="0" hangingPunct="1">
+              <a:defRPr sz="1800" kern="1200">
+                <a:solidFill>
+                  <a:schemeClr val="lt1"/>
+                </a:solidFill>
+                <a:latin typeface="+mn-lt"/>
+                <a:ea typeface="+mn-ea"/>
+                <a:cs typeface="+mn-cs"/>
+              </a:defRPr>
+            </a:lvl6pPr>
+            <a:lvl7pPr marL="2743200" algn="l" defTabSz="914400" rtl="0" eaLnBrk="1" latinLnBrk="0" hangingPunct="1">
+              <a:defRPr sz="1800" kern="1200">
+                <a:solidFill>
+                  <a:schemeClr val="lt1"/>
+                </a:solidFill>
+                <a:latin typeface="+mn-lt"/>
+                <a:ea typeface="+mn-ea"/>
+                <a:cs typeface="+mn-cs"/>
+              </a:defRPr>
+            </a:lvl7pPr>
+            <a:lvl8pPr marL="3200400" algn="l" defTabSz="914400" rtl="0" eaLnBrk="1" latinLnBrk="0" hangingPunct="1">
+              <a:defRPr sz="1800" kern="1200">
+                <a:solidFill>
+                  <a:schemeClr val="lt1"/>
+                </a:solidFill>
+                <a:latin typeface="+mn-lt"/>
+                <a:ea typeface="+mn-ea"/>
+                <a:cs typeface="+mn-cs"/>
+              </a:defRPr>
+            </a:lvl8pPr>
+            <a:lvl9pPr marL="3657600" algn="l" defTabSz="914400" rtl="0" eaLnBrk="1" latinLnBrk="0" hangingPunct="1">
+              <a:defRPr sz="1800" kern="1200">
+                <a:solidFill>
+                  <a:schemeClr val="lt1"/>
+                </a:solidFill>
+                <a:latin typeface="+mn-lt"/>
+                <a:ea typeface="+mn-ea"/>
+                <a:cs typeface="+mn-cs"/>
+              </a:defRPr>
+            </a:lvl9pPr>
+          </a:lstStyle>
+          <a:p>
+            <a:pPr algn="ctr"/>
+            <a:endParaRPr lang="en-US"/>
+          </a:p>
+        </p:txBody>
+      </p:sp>
+      <p:pic>
+        <p:nvPicPr>
+          <p:cNvPr id="4" name="Picture 3" descr="Calendar&#10;&#10;Description automatically generated">
+            <a:extLst>
+              <a:ext uri="{FF2B5EF4-FFF2-40B4-BE49-F238E27FC236}">
+                <a16:creationId xmlns:a16="http://schemas.microsoft.com/office/drawing/2014/main" id="{B39E4FB7-35A7-FEF1-80D5-6134D92E58BC}"/>
+              </a:ext>
+            </a:extLst>
+          </p:cNvPr>
+          <p:cNvPicPr>
+            <a:picLocks noChangeAspect="1"/>
+          </p:cNvPicPr>
+          <p:nvPr/>
+        </p:nvPicPr>
+        <p:blipFill rotWithShape="1">
+          <a:blip r:embed="rId2"/>
+          <a:srcRect b="746"/>
+          <a:stretch/>
+        </p:blipFill>
+        <p:spPr>
+          <a:xfrm>
+            <a:off x="20" y="2320119"/>
+            <a:ext cx="6095979" cy="4537881"/>
+          </a:xfrm>
+          <a:prstGeom prst="rect">
+            <a:avLst/>
+          </a:prstGeom>
+        </p:spPr>
+      </p:pic>
+      <p:pic>
+        <p:nvPicPr>
+          <p:cNvPr id="8" name="Picture 7" descr="Chart, scatter chart&#10;&#10;Description automatically generated">
+            <a:extLst>
+              <a:ext uri="{FF2B5EF4-FFF2-40B4-BE49-F238E27FC236}">
+                <a16:creationId xmlns:a16="http://schemas.microsoft.com/office/drawing/2014/main" id="{145BF2DE-52BB-D98F-0CDC-94E0B1A438B3}"/>
+              </a:ext>
+            </a:extLst>
+          </p:cNvPr>
+          <p:cNvPicPr>
+            <a:picLocks noChangeAspect="1"/>
+          </p:cNvPicPr>
+          <p:nvPr/>
+        </p:nvPicPr>
+        <p:blipFill rotWithShape="1">
+          <a:blip r:embed="rId3"/>
+          <a:srcRect l="5424" r="542" b="2"/>
+          <a:stretch/>
+        </p:blipFill>
+        <p:spPr>
+          <a:xfrm>
+            <a:off x="6096000" y="2320119"/>
+            <a:ext cx="6095999" cy="4537881"/>
+          </a:xfrm>
+          <a:prstGeom prst="rect">
+            <a:avLst/>
+          </a:prstGeom>
+        </p:spPr>
+      </p:pic>
+      <p:sp useBgFill="1">
+        <p:nvSpPr>
+          <p:cNvPr id="39" name="Rectangle 38">
+            <a:extLst>
+              <a:ext uri="{FF2B5EF4-FFF2-40B4-BE49-F238E27FC236}">
+                <a16:creationId xmlns:a16="http://schemas.microsoft.com/office/drawing/2014/main" id="{F489C2E0-4895-4B72-85EA-7EE9FAFFDC7E}"/>
+              </a:ext>
+              <a:ext uri="{C183D7F6-B498-43B3-948B-1728B52AA6E4}">
+                <adec:decorative xmlns:adec="http://schemas.microsoft.com/office/drawing/2017/decorative" val="1"/>
+              </a:ext>
+            </a:extLst>
+          </p:cNvPr>
+          <p:cNvSpPr>
+            <a:spLocks noGrp="1" noRot="1" noChangeAspect="1" noMove="1" noResize="1" noEditPoints="1" noAdjustHandles="1" noChangeArrowheads="1" noChangeShapeType="1" noTextEdit="1"/>
+          </p:cNvSpPr>
+          <p:nvPr>
+            <p:extLst>
+              <p:ext uri="{386F3935-93C4-4BCD-93E2-E3B085C9AB24}">
+                <p16:designElem xmlns:p16="http://schemas.microsoft.com/office/powerpoint/2015/main" val="1"/>
+              </p:ext>
+            </p:extLst>
+          </p:nvPr>
+        </p:nvSpPr>
+        <p:spPr>
+          <a:xfrm>
+            <a:off x="-1" y="0"/>
+            <a:ext cx="12192000" cy="2320119"/>
+          </a:xfrm>
+          <a:prstGeom prst="rect">
+            <a:avLst/>
+          </a:prstGeom>
+          <a:ln>
+            <a:noFill/>
+          </a:ln>
+          <a:effectLst>
+            <a:outerShdw blurRad="596900" dist="330200" dir="7140000" sx="87000" sy="87000" algn="t" rotWithShape="0">
+              <a:srgbClr val="000000">
+                <a:alpha val="26667"/>
+              </a:srgbClr>
+            </a:outerShdw>
+          </a:effectLst>
+        </p:spPr>
+        <p:style>
+          <a:lnRef idx="2">
+            <a:schemeClr val="accent1">
+              <a:shade val="50000"/>
+            </a:schemeClr>
+          </a:lnRef>
+          <a:fillRef idx="1">
+            <a:schemeClr val="accent1"/>
+          </a:fillRef>
+          <a:effectRef idx="0">
+            <a:schemeClr val="accent1"/>
+          </a:effectRef>
+          <a:fontRef idx="minor">
+            <a:schemeClr val="lt1"/>
+          </a:fontRef>
+        </p:style>
+        <p:txBody>
+          <a:bodyPr rtlCol="0" anchor="ctr"/>
+          <a:lstStyle/>
+          <a:p>
+            <a:pPr algn="ctr"/>
+            <a:endParaRPr lang="en-US" dirty="0"/>
+          </a:p>
+        </p:txBody>
+      </p:sp>
       <p:sp>
         <p:nvSpPr>
           <p:cNvPr id="2" name="Title 1">
             <a:extLst>
               <a:ext uri="{FF2B5EF4-FFF2-40B4-BE49-F238E27FC236}">
-                <a16:creationId xmlns:a16="http://schemas.microsoft.com/office/drawing/2014/main" id="{93A61788-529C-EFC1-BCAC-7334FE1E783F}"/>
+                <a16:creationId xmlns:a16="http://schemas.microsoft.com/office/drawing/2014/main" id="{458E2A23-4EC0-DD48-D58B-C597B2314E7A}"/>
               </a:ext>
             </a:extLst>
           </p:cNvPr>
@@ -8395,47 +9563,81 @@
             <p:ph type="title"/>
           </p:nvPr>
         </p:nvSpPr>
-        <p:spPr/>
-        <p:txBody>
-          <a:bodyPr/>
+        <p:spPr>
+          <a:xfrm>
+            <a:off x="589558" y="293428"/>
+            <a:ext cx="5474257" cy="1815151"/>
+          </a:xfrm>
+        </p:spPr>
+        <p:txBody>
+          <a:bodyPr vert="horz" lIns="91440" tIns="45720" rIns="91440" bIns="45720" rtlCol="0" anchor="ctr">
+            <a:normAutofit/>
+          </a:bodyPr>
           <a:lstStyle/>
           <a:p>
             <a:r>
-              <a:rPr lang="en-US" dirty="0"/>
-              <a:t>Comparison</a:t>
+              <a:rPr lang="en-US" sz="3600" dirty="0"/>
+              <a:t>Red Wine Classification</a:t>
             </a:r>
           </a:p>
         </p:txBody>
       </p:sp>
-      <p:sp>
-        <p:nvSpPr>
-          <p:cNvPr id="3" name="Content Placeholder 2">
-            <a:extLst>
-              <a:ext uri="{FF2B5EF4-FFF2-40B4-BE49-F238E27FC236}">
-                <a16:creationId xmlns:a16="http://schemas.microsoft.com/office/drawing/2014/main" id="{C17DBF7A-6F8E-1914-4278-74227E17BB5E}"/>
-              </a:ext>
-            </a:extLst>
-          </p:cNvPr>
-          <p:cNvSpPr>
-            <a:spLocks noGrp="1"/>
-          </p:cNvSpPr>
-          <p:nvPr>
-            <p:ph idx="1"/>
-          </p:nvPr>
-        </p:nvSpPr>
-        <p:spPr/>
-        <p:txBody>
-          <a:bodyPr/>
-          <a:lstStyle/>
-          <a:p>
-            <a:endParaRPr lang="en-US"/>
-          </a:p>
-        </p:txBody>
-      </p:sp>
+      <p:cxnSp>
+        <p:nvCxnSpPr>
+          <p:cNvPr id="41" name="Straight Connector 40">
+            <a:extLst>
+              <a:ext uri="{FF2B5EF4-FFF2-40B4-BE49-F238E27FC236}">
+                <a16:creationId xmlns:a16="http://schemas.microsoft.com/office/drawing/2014/main" id="{2E6B6C39-3A8E-4EAF-A0CD-4FE0CDFCD7DB}"/>
+              </a:ext>
+              <a:ext uri="{C183D7F6-B498-43B3-948B-1728B52AA6E4}">
+                <adec:decorative xmlns:adec="http://schemas.microsoft.com/office/drawing/2017/decorative" val="1"/>
+              </a:ext>
+            </a:extLst>
+          </p:cNvPr>
+          <p:cNvCxnSpPr>
+            <a:cxnSpLocks noGrp="1" noRot="1" noChangeAspect="1" noMove="1" noResize="1" noEditPoints="1" noAdjustHandles="1" noChangeArrowheads="1" noChangeShapeType="1"/>
+          </p:cNvCxnSpPr>
+          <p:nvPr>
+            <p:extLst>
+              <p:ext uri="{386F3935-93C4-4BCD-93E2-E3B085C9AB24}">
+                <p16:designElem xmlns:p16="http://schemas.microsoft.com/office/powerpoint/2015/main" val="1"/>
+              </p:ext>
+            </p:extLst>
+          </p:nvPr>
+        </p:nvCxnSpPr>
+        <p:spPr>
+          <a:xfrm>
+            <a:off x="11668155" y="985882"/>
+            <a:ext cx="0" cy="599069"/>
+          </a:xfrm>
+          <a:prstGeom prst="line">
+            <a:avLst/>
+          </a:prstGeom>
+          <a:ln w="38100">
+            <a:solidFill>
+              <a:schemeClr val="tx1"/>
+            </a:solidFill>
+          </a:ln>
+        </p:spPr>
+        <p:style>
+          <a:lnRef idx="1">
+            <a:schemeClr val="accent1"/>
+          </a:lnRef>
+          <a:fillRef idx="0">
+            <a:schemeClr val="accent1"/>
+          </a:fillRef>
+          <a:effectRef idx="0">
+            <a:schemeClr val="accent1"/>
+          </a:effectRef>
+          <a:fontRef idx="minor">
+            <a:schemeClr val="tx1"/>
+          </a:fontRef>
+        </p:style>
+      </p:cxnSp>
     </p:spTree>
     <p:extLst>
       <p:ext uri="{BB962C8B-B14F-4D97-AF65-F5344CB8AC3E}">
-        <p14:creationId xmlns:p14="http://schemas.microsoft.com/office/powerpoint/2010/main" val="3966302403"/>
+        <p14:creationId xmlns:p14="http://schemas.microsoft.com/office/powerpoint/2010/main" val="3362188807"/>
       </p:ext>
     </p:extLst>
   </p:cSld>

</xml_diff>